<commit_message>
Refined Factory Method pattern releated document.
</commit_message>
<xml_diff>
--- a/_Doc/Design Pattern (C#) - Part 1.pptx
+++ b/_Doc/Design Pattern (C#) - Part 1.pptx
@@ -5,7 +5,7 @@
     <p:sldMasterId id="2147483648" r:id="rId1"/>
   </p:sldMasterIdLst>
   <p:notesMasterIdLst>
-    <p:notesMasterId r:id="rId33"/>
+    <p:notesMasterId r:id="rId35"/>
   </p:notesMasterIdLst>
   <p:sldIdLst>
     <p:sldId id="256" r:id="rId2"/>
@@ -26,19 +26,21 @@
     <p:sldId id="308" r:id="rId17"/>
     <p:sldId id="294" r:id="rId18"/>
     <p:sldId id="313" r:id="rId19"/>
-    <p:sldId id="288" r:id="rId20"/>
-    <p:sldId id="291" r:id="rId21"/>
-    <p:sldId id="295" r:id="rId22"/>
-    <p:sldId id="293" r:id="rId23"/>
-    <p:sldId id="292" r:id="rId24"/>
-    <p:sldId id="309" r:id="rId25"/>
-    <p:sldId id="310" r:id="rId26"/>
-    <p:sldId id="311" r:id="rId27"/>
-    <p:sldId id="312" r:id="rId28"/>
-    <p:sldId id="289" r:id="rId29"/>
-    <p:sldId id="290" r:id="rId30"/>
-    <p:sldId id="280" r:id="rId31"/>
-    <p:sldId id="281" r:id="rId32"/>
+    <p:sldId id="314" r:id="rId20"/>
+    <p:sldId id="315" r:id="rId21"/>
+    <p:sldId id="288" r:id="rId22"/>
+    <p:sldId id="291" r:id="rId23"/>
+    <p:sldId id="295" r:id="rId24"/>
+    <p:sldId id="293" r:id="rId25"/>
+    <p:sldId id="292" r:id="rId26"/>
+    <p:sldId id="309" r:id="rId27"/>
+    <p:sldId id="310" r:id="rId28"/>
+    <p:sldId id="311" r:id="rId29"/>
+    <p:sldId id="312" r:id="rId30"/>
+    <p:sldId id="289" r:id="rId31"/>
+    <p:sldId id="290" r:id="rId32"/>
+    <p:sldId id="280" r:id="rId33"/>
+    <p:sldId id="281" r:id="rId34"/>
   </p:sldIdLst>
   <p:sldSz cx="9144000" cy="6858000" type="screen4x3"/>
   <p:notesSz cx="6858000" cy="9144000"/>
@@ -222,7 +224,7 @@
           <a:p>
             <a:fld id="{E18479FA-1253-41AA-8ABD-DCCC0F2E9FAF}" type="datetimeFigureOut">
               <a:rPr lang="en-US" smtClean="0"/>
-              <a:t>3/24/2015</a:t>
+              <a:t>3/25/2015</a:t>
             </a:fld>
             <a:endParaRPr lang="en-US"/>
           </a:p>
@@ -1694,7 +1696,7 @@
           <a:p>
             <a:fld id="{530820CF-B880-4189-942D-D702A7CBA730}" type="datetimeFigureOut">
               <a:rPr lang="zh-CN" altLang="en-US" smtClean="0"/>
-              <a:t>2015/3/24</a:t>
+              <a:t>2015/3/25</a:t>
             </a:fld>
             <a:endParaRPr lang="zh-CN" altLang="en-US"/>
           </a:p>
@@ -1859,7 +1861,7 @@
           <a:p>
             <a:fld id="{530820CF-B880-4189-942D-D702A7CBA730}" type="datetimeFigureOut">
               <a:rPr lang="zh-CN" altLang="en-US" smtClean="0"/>
-              <a:t>2015/3/24</a:t>
+              <a:t>2015/3/25</a:t>
             </a:fld>
             <a:endParaRPr lang="zh-CN" altLang="en-US"/>
           </a:p>
@@ -2034,7 +2036,7 @@
           <a:p>
             <a:fld id="{530820CF-B880-4189-942D-D702A7CBA730}" type="datetimeFigureOut">
               <a:rPr lang="zh-CN" altLang="en-US" smtClean="0"/>
-              <a:t>2015/3/24</a:t>
+              <a:t>2015/3/25</a:t>
             </a:fld>
             <a:endParaRPr lang="zh-CN" altLang="en-US"/>
           </a:p>
@@ -2199,7 +2201,7 @@
           <a:p>
             <a:fld id="{530820CF-B880-4189-942D-D702A7CBA730}" type="datetimeFigureOut">
               <a:rPr lang="zh-CN" altLang="en-US" smtClean="0"/>
-              <a:t>2015/3/24</a:t>
+              <a:t>2015/3/25</a:t>
             </a:fld>
             <a:endParaRPr lang="zh-CN" altLang="en-US"/>
           </a:p>
@@ -2440,7 +2442,7 @@
           <a:p>
             <a:fld id="{530820CF-B880-4189-942D-D702A7CBA730}" type="datetimeFigureOut">
               <a:rPr lang="zh-CN" altLang="en-US" smtClean="0"/>
-              <a:t>2015/3/24</a:t>
+              <a:t>2015/3/25</a:t>
             </a:fld>
             <a:endParaRPr lang="zh-CN" altLang="en-US"/>
           </a:p>
@@ -2723,7 +2725,7 @@
           <a:p>
             <a:fld id="{530820CF-B880-4189-942D-D702A7CBA730}" type="datetimeFigureOut">
               <a:rPr lang="zh-CN" altLang="en-US" smtClean="0"/>
-              <a:t>2015/3/24</a:t>
+              <a:t>2015/3/25</a:t>
             </a:fld>
             <a:endParaRPr lang="zh-CN" altLang="en-US"/>
           </a:p>
@@ -3140,7 +3142,7 @@
           <a:p>
             <a:fld id="{530820CF-B880-4189-942D-D702A7CBA730}" type="datetimeFigureOut">
               <a:rPr lang="zh-CN" altLang="en-US" smtClean="0"/>
-              <a:t>2015/3/24</a:t>
+              <a:t>2015/3/25</a:t>
             </a:fld>
             <a:endParaRPr lang="zh-CN" altLang="en-US"/>
           </a:p>
@@ -3253,7 +3255,7 @@
           <a:p>
             <a:fld id="{530820CF-B880-4189-942D-D702A7CBA730}" type="datetimeFigureOut">
               <a:rPr lang="zh-CN" altLang="en-US" smtClean="0"/>
-              <a:t>2015/3/24</a:t>
+              <a:t>2015/3/25</a:t>
             </a:fld>
             <a:endParaRPr lang="zh-CN" altLang="en-US"/>
           </a:p>
@@ -3343,7 +3345,7 @@
           <a:p>
             <a:fld id="{530820CF-B880-4189-942D-D702A7CBA730}" type="datetimeFigureOut">
               <a:rPr lang="zh-CN" altLang="en-US" smtClean="0"/>
-              <a:t>2015/3/24</a:t>
+              <a:t>2015/3/25</a:t>
             </a:fld>
             <a:endParaRPr lang="zh-CN" altLang="en-US"/>
           </a:p>
@@ -3615,7 +3617,7 @@
           <a:p>
             <a:fld id="{530820CF-B880-4189-942D-D702A7CBA730}" type="datetimeFigureOut">
               <a:rPr lang="zh-CN" altLang="en-US" smtClean="0"/>
-              <a:t>2015/3/24</a:t>
+              <a:t>2015/3/25</a:t>
             </a:fld>
             <a:endParaRPr lang="zh-CN" altLang="en-US"/>
           </a:p>
@@ -3863,7 +3865,7 @@
           <a:p>
             <a:fld id="{530820CF-B880-4189-942D-D702A7CBA730}" type="datetimeFigureOut">
               <a:rPr lang="zh-CN" altLang="en-US" smtClean="0"/>
-              <a:t>2015/3/24</a:t>
+              <a:t>2015/3/25</a:t>
             </a:fld>
             <a:endParaRPr lang="zh-CN" altLang="en-US"/>
           </a:p>
@@ -4071,7 +4073,7 @@
           <a:p>
             <a:fld id="{530820CF-B880-4189-942D-D702A7CBA730}" type="datetimeFigureOut">
               <a:rPr lang="zh-CN" altLang="en-US" smtClean="0"/>
-              <a:t>2015/3/24</a:t>
+              <a:t>2015/3/25</a:t>
             </a:fld>
             <a:endParaRPr lang="zh-CN" altLang="en-US"/>
           </a:p>
@@ -4605,18 +4607,7 @@
                 <a:latin typeface="+mn-ea"/>
                 <a:ea typeface="+mn-ea"/>
               </a:rPr>
-              <a:t>What &amp; Why &amp; </a:t>
-            </a:r>
-            <a:r>
-              <a:rPr lang="en-US" altLang="zh-CN" sz="1400" dirty="0" smtClean="0">
-                <a:solidFill>
-                  <a:srgbClr val="002060"/>
-                </a:solidFill>
-                <a:effectLst/>
-                <a:latin typeface="+mn-ea"/>
-                <a:ea typeface="+mn-ea"/>
-              </a:rPr>
-              <a:t>How</a:t>
+              <a:t>What &amp; Why &amp; How</a:t>
             </a:r>
           </a:p>
           <a:p>
@@ -4759,17 +4750,7 @@
                 <a:effectLst/>
                 <a:latin typeface="+mn-ea"/>
               </a:rPr>
-              <a:t>Factory</a:t>
-            </a:r>
-            <a:r>
-              <a:rPr lang="en-US" altLang="zh-CN" sz="1400" dirty="0" smtClean="0">
-                <a:solidFill>
-                  <a:srgbClr val="002060"/>
-                </a:solidFill>
-                <a:effectLst/>
-                <a:latin typeface="+mn-ea"/>
-              </a:rPr>
-              <a:t>)</a:t>
+              <a:t>Factory)</a:t>
             </a:r>
           </a:p>
           <a:p>
@@ -4790,17 +4771,7 @@
                 <a:effectLst/>
                 <a:latin typeface="+mn-ea"/>
               </a:rPr>
-              <a:t>	Abstract </a:t>
-            </a:r>
-            <a:r>
-              <a:rPr lang="en-US" altLang="zh-CN" sz="1400" dirty="0" smtClean="0">
-                <a:solidFill>
-                  <a:srgbClr val="002060"/>
-                </a:solidFill>
-                <a:effectLst/>
-                <a:latin typeface="+mn-ea"/>
-              </a:rPr>
-              <a:t>Factory</a:t>
+              <a:t>	Abstract Factory</a:t>
             </a:r>
             <a:endParaRPr lang="en-US" altLang="zh-CN" sz="1400" dirty="0">
               <a:solidFill>
@@ -5587,13 +5558,7 @@
               <a:rPr lang="en-US" altLang="zh-CN" sz="1900" dirty="0" smtClean="0">
                 <a:effectLst/>
               </a:rPr>
-              <a:t>	</a:t>
-            </a:r>
-            <a:r>
-              <a:rPr lang="en-US" altLang="zh-CN" sz="1900" dirty="0" smtClean="0">
-                <a:effectLst/>
-              </a:rPr>
-              <a:t>…</a:t>
+              <a:t>	…</a:t>
             </a:r>
           </a:p>
           <a:p>
@@ -6717,8 +6682,8 @@
         </p:nvSpPr>
         <p:spPr>
           <a:xfrm>
-            <a:off x="683568" y="1412776"/>
-            <a:ext cx="7776864" cy="4752528"/>
+            <a:off x="683568" y="1916832"/>
+            <a:ext cx="7776864" cy="4176464"/>
           </a:xfrm>
           <a:prstGeom prst="rect">
             <a:avLst/>
@@ -7034,7 +6999,7 @@
                 <a:spcPct val="0"/>
               </a:spcBef>
             </a:pPr>
-            <a:endParaRPr lang="zh-CN" altLang="en-US" sz="1900" b="1" spc="50" dirty="0">
+            <a:endParaRPr lang="en-US" altLang="zh-CN" sz="1900" b="1" spc="50" dirty="0" smtClean="0">
               <a:ln w="12700">
                 <a:noFill/>
                 <a:prstDash val="solid"/>
@@ -7053,36 +7018,18 @@
                 <a:spcPct val="0"/>
               </a:spcBef>
             </a:pPr>
-            <a:r>
-              <a:rPr lang="zh-CN" altLang="en-US" sz="1900" b="1" spc="50" dirty="0">
-                <a:ln w="12700">
-                  <a:noFill/>
-                  <a:prstDash val="solid"/>
-                </a:ln>
-                <a:solidFill>
-                  <a:schemeClr val="accent4"/>
-                </a:solidFill>
-                <a:latin typeface="+mj-lt"/>
-                <a:ea typeface="+mj-ea"/>
-                <a:cs typeface="+mj-cs"/>
-              </a:rPr>
-              <a:t>意图</a:t>
-            </a:r>
-            <a:r>
-              <a:rPr lang="en-US" altLang="zh-CN" sz="1900" b="1" spc="50" dirty="0">
-                <a:ln w="12700">
-                  <a:noFill/>
-                  <a:prstDash val="solid"/>
-                </a:ln>
-                <a:solidFill>
-                  <a:schemeClr val="accent4"/>
-                </a:solidFill>
-                <a:latin typeface="+mj-lt"/>
-                <a:ea typeface="+mj-ea"/>
-                <a:cs typeface="+mj-cs"/>
-              </a:rPr>
-              <a:t>(Intent):</a:t>
-            </a:r>
+            <a:endParaRPr lang="en-US" altLang="zh-CN" sz="1900" b="1" spc="50" dirty="0">
+              <a:ln w="12700">
+                <a:noFill/>
+                <a:prstDash val="solid"/>
+              </a:ln>
+              <a:solidFill>
+                <a:schemeClr val="accent4"/>
+              </a:solidFill>
+              <a:latin typeface="+mj-lt"/>
+              <a:ea typeface="+mj-ea"/>
+              <a:cs typeface="+mj-cs"/>
+            </a:endParaRPr>
           </a:p>
           <a:p>
             <a:pPr>
@@ -7110,7 +7057,7 @@
               </a:spcBef>
             </a:pPr>
             <a:r>
-              <a:rPr lang="zh-CN" altLang="en-US" sz="1600" b="1" spc="50" dirty="0">
+              <a:rPr lang="zh-CN" altLang="en-US" sz="1900" b="1" spc="50" dirty="0">
                 <a:ln w="12700">
                   <a:noFill/>
                   <a:prstDash val="solid"/>
@@ -7122,10 +7069,10 @@
                 <a:ea typeface="+mj-ea"/>
                 <a:cs typeface="+mj-cs"/>
               </a:rPr>
-              <a:t>    定义一个用户创建对象的接口，让子类决定实例哪一个类。</a:t>
-            </a:r>
-            <a:r>
-              <a:rPr lang="en-US" altLang="zh-CN" sz="1600" b="1" spc="50" dirty="0">
+              <a:t>意图</a:t>
+            </a:r>
+            <a:r>
+              <a:rPr lang="en-US" altLang="zh-CN" sz="1900" b="1" spc="50" dirty="0">
                 <a:ln w="12700">
                   <a:noFill/>
                   <a:prstDash val="solid"/>
@@ -7137,39 +7084,16 @@
                 <a:ea typeface="+mj-ea"/>
                 <a:cs typeface="+mj-cs"/>
               </a:rPr>
-              <a:t>Factory Method</a:t>
-            </a:r>
-            <a:r>
-              <a:rPr lang="zh-CN" altLang="en-US" sz="1600" b="1" spc="50" dirty="0">
-                <a:ln w="12700">
-                  <a:noFill/>
-                  <a:prstDash val="solid"/>
-                </a:ln>
-                <a:solidFill>
-                  <a:schemeClr val="accent4"/>
-                </a:solidFill>
-                <a:latin typeface="+mj-lt"/>
-                <a:ea typeface="+mj-ea"/>
-                <a:cs typeface="+mj-cs"/>
-              </a:rPr>
-              <a:t>使一个类的实例化延迟到子类</a:t>
-            </a:r>
-            <a:r>
-              <a:rPr lang="zh-CN" altLang="en-US" sz="1600" b="1" spc="50" dirty="0" smtClean="0">
-                <a:ln w="12700">
-                  <a:noFill/>
-                  <a:prstDash val="solid"/>
-                </a:ln>
-                <a:solidFill>
-                  <a:schemeClr val="accent4"/>
-                </a:solidFill>
-                <a:latin typeface="+mj-lt"/>
-                <a:ea typeface="+mj-ea"/>
-                <a:cs typeface="+mj-cs"/>
-              </a:rPr>
-              <a:t>。</a:t>
-            </a:r>
-            <a:endParaRPr lang="en-US" altLang="zh-CN" sz="1600" b="1" spc="50" dirty="0" smtClean="0">
+              <a:t>(Intent):</a:t>
+            </a:r>
+          </a:p>
+          <a:p>
+            <a:pPr>
+              <a:spcBef>
+                <a:spcPct val="0"/>
+              </a:spcBef>
+            </a:pPr>
+            <a:endParaRPr lang="zh-CN" altLang="en-US" sz="1900" b="1" spc="50" dirty="0">
               <a:ln w="12700">
                 <a:noFill/>
                 <a:prstDash val="solid"/>
@@ -7188,27 +7112,8 @@
                 <a:spcPct val="0"/>
               </a:spcBef>
             </a:pPr>
-            <a:endParaRPr lang="en-US" altLang="zh-CN" sz="1600" b="1" spc="50" dirty="0">
-              <a:ln w="12700">
-                <a:noFill/>
-                <a:prstDash val="solid"/>
-              </a:ln>
-              <a:solidFill>
-                <a:schemeClr val="accent4"/>
-              </a:solidFill>
-              <a:latin typeface="+mj-lt"/>
-              <a:ea typeface="+mj-ea"/>
-              <a:cs typeface="+mj-cs"/>
-            </a:endParaRPr>
-          </a:p>
-          <a:p>
-            <a:pPr>
-              <a:spcBef>
-                <a:spcPct val="0"/>
-              </a:spcBef>
-            </a:pPr>
-            <a:r>
-              <a:rPr lang="zh-CN" altLang="en-US" sz="1900" b="1" spc="50" dirty="0" smtClean="0">
+            <a:r>
+              <a:rPr lang="zh-CN" altLang="en-US" sz="1600" b="1" spc="50" dirty="0">
                 <a:ln w="12700">
                   <a:noFill/>
                   <a:prstDash val="solid"/>
@@ -7220,10 +7125,10 @@
                 <a:ea typeface="+mj-ea"/>
                 <a:cs typeface="+mj-cs"/>
               </a:rPr>
-              <a:t>结构</a:t>
-            </a:r>
-            <a:r>
-              <a:rPr lang="en-US" altLang="zh-CN" sz="1900" b="1" spc="50" dirty="0" smtClean="0">
+              <a:t>    定义一个用户创建对象的接口，让子类决定实例哪一个类。</a:t>
+            </a:r>
+            <a:r>
+              <a:rPr lang="en-US" altLang="zh-CN" sz="1600" b="1" spc="50" dirty="0">
                 <a:ln w="12700">
                   <a:noFill/>
                   <a:prstDash val="solid"/>
@@ -7235,10 +7140,10 @@
                 <a:ea typeface="+mj-ea"/>
                 <a:cs typeface="+mj-cs"/>
               </a:rPr>
-              <a:t>(Structure)</a:t>
-            </a:r>
-            <a:r>
-              <a:rPr lang="zh-CN" altLang="en-US" sz="1900" b="1" spc="50" dirty="0" smtClean="0">
+              <a:t>Factory Method</a:t>
+            </a:r>
+            <a:r>
+              <a:rPr lang="zh-CN" altLang="en-US" sz="1600" b="1" spc="50" dirty="0">
                 <a:ln w="12700">
                   <a:noFill/>
                   <a:prstDash val="solid"/>
@@ -7250,141 +7155,23 @@
                 <a:ea typeface="+mj-ea"/>
                 <a:cs typeface="+mj-cs"/>
               </a:rPr>
-              <a:t>：</a:t>
-            </a:r>
-            <a:endParaRPr lang="en-US" altLang="zh-CN" sz="1900" b="1" spc="50" dirty="0" smtClean="0">
-              <a:ln w="12700">
-                <a:noFill/>
-                <a:prstDash val="solid"/>
-              </a:ln>
-              <a:solidFill>
-                <a:schemeClr val="accent4"/>
-              </a:solidFill>
-              <a:latin typeface="+mj-lt"/>
-              <a:ea typeface="+mj-ea"/>
-              <a:cs typeface="+mj-cs"/>
-            </a:endParaRPr>
-          </a:p>
-          <a:p>
-            <a:pPr>
-              <a:spcBef>
-                <a:spcPct val="0"/>
-              </a:spcBef>
-            </a:pPr>
-            <a:endParaRPr lang="en-US" altLang="zh-CN" sz="1900" b="1" spc="50" dirty="0">
-              <a:ln w="12700">
-                <a:noFill/>
-                <a:prstDash val="solid"/>
-              </a:ln>
-              <a:solidFill>
-                <a:schemeClr val="accent4"/>
-              </a:solidFill>
-              <a:latin typeface="+mj-lt"/>
-              <a:ea typeface="+mj-ea"/>
-              <a:cs typeface="+mj-cs"/>
-            </a:endParaRPr>
-          </a:p>
-          <a:p>
-            <a:pPr>
-              <a:spcBef>
-                <a:spcPct val="0"/>
-              </a:spcBef>
-            </a:pPr>
-            <a:endParaRPr lang="en-US" altLang="zh-CN" sz="1600" b="1" spc="50" dirty="0" smtClean="0">
-              <a:ln w="12700">
-                <a:noFill/>
-                <a:prstDash val="solid"/>
-              </a:ln>
-              <a:solidFill>
-                <a:schemeClr val="accent4"/>
-              </a:solidFill>
-              <a:latin typeface="+mj-lt"/>
-              <a:ea typeface="+mj-ea"/>
-              <a:cs typeface="+mj-cs"/>
-            </a:endParaRPr>
-          </a:p>
-          <a:p>
-            <a:pPr>
-              <a:spcBef>
-                <a:spcPct val="0"/>
-              </a:spcBef>
-            </a:pPr>
-            <a:endParaRPr lang="en-US" altLang="zh-CN" sz="1600" b="1" spc="50" dirty="0">
-              <a:ln w="12700">
-                <a:noFill/>
-                <a:prstDash val="solid"/>
-              </a:ln>
-              <a:solidFill>
-                <a:schemeClr val="accent4"/>
-              </a:solidFill>
-              <a:latin typeface="+mj-lt"/>
-              <a:ea typeface="+mj-ea"/>
-              <a:cs typeface="+mj-cs"/>
-            </a:endParaRPr>
-          </a:p>
-          <a:p>
-            <a:pPr>
-              <a:spcBef>
-                <a:spcPct val="0"/>
-              </a:spcBef>
-            </a:pPr>
-            <a:endParaRPr lang="en-US" altLang="zh-CN" sz="1600" b="1" spc="50" dirty="0" smtClean="0">
-              <a:ln w="12700">
-                <a:noFill/>
-                <a:prstDash val="solid"/>
-              </a:ln>
-              <a:solidFill>
-                <a:schemeClr val="accent4"/>
-              </a:solidFill>
-              <a:latin typeface="+mj-lt"/>
-              <a:ea typeface="+mj-ea"/>
-              <a:cs typeface="+mj-cs"/>
-            </a:endParaRPr>
-          </a:p>
-          <a:p>
-            <a:pPr>
-              <a:spcBef>
-                <a:spcPct val="0"/>
-              </a:spcBef>
-            </a:pPr>
-            <a:endParaRPr lang="en-US" altLang="zh-CN" sz="1600" b="1" spc="50" dirty="0" smtClean="0">
-              <a:ln w="12700">
-                <a:noFill/>
-                <a:prstDash val="solid"/>
-              </a:ln>
-              <a:solidFill>
-                <a:schemeClr val="accent4"/>
-              </a:solidFill>
-              <a:latin typeface="+mj-lt"/>
-              <a:ea typeface="+mj-ea"/>
-              <a:cs typeface="+mj-cs"/>
-            </a:endParaRPr>
-          </a:p>
-          <a:p>
-            <a:pPr>
-              <a:spcBef>
-                <a:spcPct val="0"/>
-              </a:spcBef>
-            </a:pPr>
-            <a:endParaRPr lang="en-US" altLang="zh-CN" sz="1600" b="1" spc="50" dirty="0">
-              <a:ln w="12700">
-                <a:noFill/>
-                <a:prstDash val="solid"/>
-              </a:ln>
-              <a:solidFill>
-                <a:schemeClr val="accent4"/>
-              </a:solidFill>
-              <a:latin typeface="+mj-lt"/>
-              <a:ea typeface="+mj-ea"/>
-              <a:cs typeface="+mj-cs"/>
-            </a:endParaRPr>
-          </a:p>
-          <a:p>
-            <a:pPr>
-              <a:spcBef>
-                <a:spcPct val="0"/>
-              </a:spcBef>
-            </a:pPr>
+              <a:t>使一个类的实例化延迟到子类</a:t>
+            </a:r>
+            <a:r>
+              <a:rPr lang="zh-CN" altLang="en-US" sz="1600" b="1" spc="50" dirty="0" smtClean="0">
+                <a:ln w="12700">
+                  <a:noFill/>
+                  <a:prstDash val="solid"/>
+                </a:ln>
+                <a:solidFill>
+                  <a:schemeClr val="accent4"/>
+                </a:solidFill>
+                <a:latin typeface="+mj-lt"/>
+                <a:ea typeface="+mj-ea"/>
+                <a:cs typeface="+mj-cs"/>
+              </a:rPr>
+              <a:t>。</a:t>
+            </a:r>
             <a:endParaRPr lang="zh-CN" altLang="en-US" sz="1600" b="1" spc="50" dirty="0">
               <a:ln w="12700">
                 <a:noFill/>
@@ -7446,70 +7233,6 @@
           </a:p>
         </p:txBody>
       </p:sp>
-      <p:pic>
-        <p:nvPicPr>
-          <p:cNvPr id="5" name="Picture 2"/>
-          <p:cNvPicPr>
-            <a:picLocks noChangeAspect="1" noChangeArrowheads="1"/>
-          </p:cNvPicPr>
-          <p:nvPr/>
-        </p:nvPicPr>
-        <p:blipFill>
-          <a:blip r:embed="rId2">
-            <a:extLst>
-              <a:ext uri="{28A0092B-C50C-407E-A947-70E740481C1C}">
-                <a14:useLocalDpi xmlns:a14="http://schemas.microsoft.com/office/drawing/2010/main" val="0"/>
-              </a:ext>
-            </a:extLst>
-          </a:blip>
-          <a:srcRect/>
-          <a:stretch>
-            <a:fillRect/>
-          </a:stretch>
-        </p:blipFill>
-        <p:spPr bwMode="auto">
-          <a:xfrm>
-            <a:off x="899592" y="4869160"/>
-            <a:ext cx="4710578" cy="1709365"/>
-          </a:xfrm>
-          <a:prstGeom prst="rect">
-            <a:avLst/>
-          </a:prstGeom>
-          <a:noFill/>
-          <a:ln>
-            <a:noFill/>
-          </a:ln>
-          <a:effectLst/>
-          <a:extLst>
-            <a:ext uri="{909E8E84-426E-40DD-AFC4-6F175D3DCCD1}">
-              <a14:hiddenFill xmlns:a14="http://schemas.microsoft.com/office/drawing/2010/main">
-                <a:solidFill>
-                  <a:schemeClr val="accent1"/>
-                </a:solidFill>
-              </a14:hiddenFill>
-            </a:ext>
-            <a:ext uri="{91240B29-F687-4F45-9708-019B960494DF}">
-              <a14:hiddenLine xmlns:a14="http://schemas.microsoft.com/office/drawing/2010/main" w="9525">
-                <a:solidFill>
-                  <a:schemeClr val="tx1"/>
-                </a:solidFill>
-                <a:miter lim="800000"/>
-                <a:headEnd/>
-                <a:tailEnd/>
-              </a14:hiddenLine>
-            </a:ext>
-            <a:ext uri="{AF507438-7753-43E0-B8FC-AC1667EBCBE1}">
-              <a14:hiddenEffects xmlns:a14="http://schemas.microsoft.com/office/drawing/2010/main">
-                <a:effectLst>
-                  <a:outerShdw dist="35921" dir="2700000" algn="ctr" rotWithShape="0">
-                    <a:schemeClr val="bg2"/>
-                  </a:outerShdw>
-                </a:effectLst>
-              </a14:hiddenEffects>
-            </a:ext>
-          </a:extLst>
-        </p:spPr>
-      </p:pic>
     </p:spTree>
     <p:extLst>
       <p:ext uri="{BB962C8B-B14F-4D97-AF65-F5344CB8AC3E}">
@@ -7556,7 +7279,7 @@
         <p:spPr>
           <a:xfrm>
             <a:off x="683568" y="1412776"/>
-            <a:ext cx="7776864" cy="4752528"/>
+            <a:ext cx="7776864" cy="5256584"/>
           </a:xfrm>
           <a:prstGeom prst="rect">
             <a:avLst/>
@@ -7564,7 +7287,7 @@
         </p:spPr>
         <p:txBody>
           <a:bodyPr vert="horz" rtlCol="0" anchor="ctr">
-            <a:normAutofit/>
+            <a:normAutofit fontScale="85000" lnSpcReduction="20000"/>
             <a:scene3d>
               <a:camera prst="orthographicFront"/>
               <a:lightRig rig="soft" dir="t"/>
@@ -7581,7 +7304,7 @@
               </a:spcBef>
             </a:pPr>
             <a:r>
-              <a:rPr lang="zh-CN" altLang="en-US" sz="1900" b="1" spc="50" dirty="0" smtClean="0">
+              <a:rPr lang="zh-CN" altLang="en-US" sz="2200" b="1" spc="50" dirty="0" smtClean="0">
                 <a:ln w="12700">
                   <a:noFill/>
                   <a:prstDash val="solid"/>
@@ -7589,6 +7312,220 @@
                 <a:solidFill>
                   <a:schemeClr val="accent4"/>
                 </a:solidFill>
+              </a:rPr>
+              <a:t>结构</a:t>
+            </a:r>
+            <a:r>
+              <a:rPr lang="en-US" altLang="zh-CN" sz="2200" b="1" spc="50" dirty="0">
+                <a:ln w="12700">
+                  <a:noFill/>
+                  <a:prstDash val="solid"/>
+                </a:ln>
+                <a:solidFill>
+                  <a:schemeClr val="accent4"/>
+                </a:solidFill>
+              </a:rPr>
+              <a:t>(Structure)</a:t>
+            </a:r>
+            <a:r>
+              <a:rPr lang="zh-CN" altLang="en-US" sz="2200" b="1" spc="50" dirty="0">
+                <a:ln w="12700">
+                  <a:noFill/>
+                  <a:prstDash val="solid"/>
+                </a:ln>
+                <a:solidFill>
+                  <a:schemeClr val="accent4"/>
+                </a:solidFill>
+              </a:rPr>
+              <a:t>：</a:t>
+            </a:r>
+          </a:p>
+          <a:p>
+            <a:pPr>
+              <a:spcBef>
+                <a:spcPct val="0"/>
+              </a:spcBef>
+            </a:pPr>
+            <a:endParaRPr lang="en-US" altLang="zh-CN" sz="1900" b="1" spc="50" dirty="0" smtClean="0">
+              <a:ln w="12700">
+                <a:noFill/>
+                <a:prstDash val="solid"/>
+              </a:ln>
+              <a:solidFill>
+                <a:schemeClr val="accent4"/>
+              </a:solidFill>
+              <a:latin typeface="+mj-lt"/>
+              <a:ea typeface="+mj-ea"/>
+              <a:cs typeface="+mj-cs"/>
+            </a:endParaRPr>
+          </a:p>
+          <a:p>
+            <a:pPr>
+              <a:spcBef>
+                <a:spcPct val="0"/>
+              </a:spcBef>
+            </a:pPr>
+            <a:endParaRPr lang="en-US" altLang="zh-CN" sz="1900" b="1" spc="50" dirty="0">
+              <a:ln w="12700">
+                <a:noFill/>
+                <a:prstDash val="solid"/>
+              </a:ln>
+              <a:solidFill>
+                <a:schemeClr val="accent4"/>
+              </a:solidFill>
+              <a:latin typeface="+mj-lt"/>
+              <a:ea typeface="+mj-ea"/>
+              <a:cs typeface="+mj-cs"/>
+            </a:endParaRPr>
+          </a:p>
+          <a:p>
+            <a:pPr>
+              <a:spcBef>
+                <a:spcPct val="0"/>
+              </a:spcBef>
+            </a:pPr>
+            <a:endParaRPr lang="en-US" altLang="zh-CN" sz="1900" b="1" spc="50" dirty="0" smtClean="0">
+              <a:ln w="12700">
+                <a:noFill/>
+                <a:prstDash val="solid"/>
+              </a:ln>
+              <a:solidFill>
+                <a:schemeClr val="accent4"/>
+              </a:solidFill>
+              <a:latin typeface="+mj-lt"/>
+              <a:ea typeface="+mj-ea"/>
+              <a:cs typeface="+mj-cs"/>
+            </a:endParaRPr>
+          </a:p>
+          <a:p>
+            <a:pPr>
+              <a:spcBef>
+                <a:spcPct val="0"/>
+              </a:spcBef>
+            </a:pPr>
+            <a:endParaRPr lang="en-US" altLang="zh-CN" sz="1900" b="1" spc="50" dirty="0" smtClean="0">
+              <a:ln w="12700">
+                <a:noFill/>
+                <a:prstDash val="solid"/>
+              </a:ln>
+              <a:solidFill>
+                <a:schemeClr val="accent4"/>
+              </a:solidFill>
+              <a:latin typeface="+mj-lt"/>
+              <a:ea typeface="+mj-ea"/>
+              <a:cs typeface="+mj-cs"/>
+            </a:endParaRPr>
+          </a:p>
+          <a:p>
+            <a:pPr>
+              <a:spcBef>
+                <a:spcPct val="0"/>
+              </a:spcBef>
+            </a:pPr>
+            <a:endParaRPr lang="en-US" altLang="zh-CN" sz="1900" b="1" spc="50" dirty="0">
+              <a:ln w="12700">
+                <a:noFill/>
+                <a:prstDash val="solid"/>
+              </a:ln>
+              <a:solidFill>
+                <a:schemeClr val="accent4"/>
+              </a:solidFill>
+              <a:latin typeface="+mj-lt"/>
+              <a:ea typeface="+mj-ea"/>
+              <a:cs typeface="+mj-cs"/>
+            </a:endParaRPr>
+          </a:p>
+          <a:p>
+            <a:pPr>
+              <a:spcBef>
+                <a:spcPct val="0"/>
+              </a:spcBef>
+            </a:pPr>
+            <a:endParaRPr lang="en-US" altLang="zh-CN" sz="1900" b="1" spc="50" dirty="0" smtClean="0">
+              <a:ln w="12700">
+                <a:noFill/>
+                <a:prstDash val="solid"/>
+              </a:ln>
+              <a:solidFill>
+                <a:schemeClr val="accent4"/>
+              </a:solidFill>
+              <a:latin typeface="+mj-lt"/>
+              <a:ea typeface="+mj-ea"/>
+              <a:cs typeface="+mj-cs"/>
+            </a:endParaRPr>
+          </a:p>
+          <a:p>
+            <a:pPr>
+              <a:spcBef>
+                <a:spcPct val="0"/>
+              </a:spcBef>
+            </a:pPr>
+            <a:endParaRPr lang="en-US" altLang="zh-CN" sz="1900" b="1" spc="50" dirty="0">
+              <a:ln w="12700">
+                <a:noFill/>
+                <a:prstDash val="solid"/>
+              </a:ln>
+              <a:solidFill>
+                <a:schemeClr val="accent4"/>
+              </a:solidFill>
+              <a:latin typeface="+mj-lt"/>
+              <a:ea typeface="+mj-ea"/>
+              <a:cs typeface="+mj-cs"/>
+            </a:endParaRPr>
+          </a:p>
+          <a:p>
+            <a:pPr>
+              <a:spcBef>
+                <a:spcPct val="0"/>
+              </a:spcBef>
+            </a:pPr>
+            <a:endParaRPr lang="en-US" altLang="zh-CN" sz="1900" b="1" spc="50" dirty="0">
+              <a:ln w="12700">
+                <a:noFill/>
+                <a:prstDash val="solid"/>
+              </a:ln>
+              <a:solidFill>
+                <a:schemeClr val="accent4"/>
+              </a:solidFill>
+              <a:latin typeface="+mj-lt"/>
+              <a:ea typeface="+mj-ea"/>
+              <a:cs typeface="+mj-cs"/>
+            </a:endParaRPr>
+          </a:p>
+          <a:p>
+            <a:pPr>
+              <a:spcBef>
+                <a:spcPct val="0"/>
+              </a:spcBef>
+            </a:pPr>
+            <a:endParaRPr lang="en-US" altLang="zh-CN" sz="1900" b="1" spc="50" dirty="0" smtClean="0">
+              <a:ln w="12700">
+                <a:noFill/>
+                <a:prstDash val="solid"/>
+              </a:ln>
+              <a:solidFill>
+                <a:schemeClr val="accent4"/>
+              </a:solidFill>
+              <a:latin typeface="+mj-lt"/>
+              <a:ea typeface="+mj-ea"/>
+              <a:cs typeface="+mj-cs"/>
+            </a:endParaRPr>
+          </a:p>
+          <a:p>
+            <a:pPr>
+              <a:spcBef>
+                <a:spcPct val="0"/>
+              </a:spcBef>
+            </a:pPr>
+            <a:r>
+              <a:rPr lang="zh-CN" altLang="en-US" sz="2200" b="1" spc="50" dirty="0" smtClean="0">
+                <a:ln w="12700">
+                  <a:noFill/>
+                  <a:prstDash val="solid"/>
+                </a:ln>
+                <a:solidFill>
+                  <a:schemeClr val="accent4"/>
+                </a:solidFill>
                 <a:latin typeface="+mj-lt"/>
                 <a:ea typeface="+mj-ea"/>
                 <a:cs typeface="+mj-cs"/>
@@ -7596,7 +7533,7 @@
               <a:t>参与者</a:t>
             </a:r>
             <a:r>
-              <a:rPr lang="en-US" altLang="zh-CN" sz="1900" b="1" spc="50" dirty="0" smtClean="0">
+              <a:rPr lang="en-US" altLang="zh-CN" sz="2200" b="1" spc="50" dirty="0" smtClean="0">
                 <a:ln w="12700">
                   <a:noFill/>
                   <a:prstDash val="solid"/>
@@ -7639,22 +7576,7 @@
                 <a:ea typeface="+mj-ea"/>
                 <a:cs typeface="+mj-cs"/>
               </a:rPr>
-              <a:t>• </a:t>
-            </a:r>
-            <a:r>
-              <a:rPr lang="pt-BR" sz="1400" b="1" spc="50" dirty="0">
-                <a:ln w="12700">
-                  <a:noFill/>
-                  <a:prstDash val="solid"/>
-                </a:ln>
-                <a:solidFill>
-                  <a:schemeClr val="accent4"/>
-                </a:solidFill>
-                <a:latin typeface="+mj-lt"/>
-                <a:ea typeface="+mj-ea"/>
-                <a:cs typeface="+mj-cs"/>
-              </a:rPr>
-              <a:t>P r o d u c </a:t>
+              <a:t>• P r o d u c </a:t>
             </a:r>
             <a:r>
               <a:rPr lang="pt-BR" sz="1400" b="1" spc="50" dirty="0" smtClean="0">
@@ -7754,22 +7676,7 @@
                 <a:ea typeface="+mj-ea"/>
                 <a:cs typeface="+mj-cs"/>
               </a:rPr>
-              <a:t>定义工厂方法所创建的对象的</a:t>
-            </a:r>
-            <a:r>
-              <a:rPr lang="zh-CN" altLang="en-US" sz="1400" b="1" spc="50" dirty="0">
-                <a:ln w="12700">
-                  <a:noFill/>
-                  <a:prstDash val="solid"/>
-                </a:ln>
-                <a:solidFill>
-                  <a:schemeClr val="accent4"/>
-                </a:solidFill>
-                <a:latin typeface="+mj-lt"/>
-                <a:ea typeface="+mj-ea"/>
-                <a:cs typeface="+mj-cs"/>
-              </a:rPr>
-              <a:t>接口</a:t>
+              <a:t>定义工厂方法所创建的对象的接口</a:t>
             </a:r>
             <a:endParaRPr lang="en-US" altLang="zh-CN" sz="1400" b="1" spc="50" dirty="0">
               <a:ln w="12700">
@@ -7812,22 +7719,7 @@
                 <a:ea typeface="+mj-ea"/>
                 <a:cs typeface="+mj-cs"/>
               </a:rPr>
-              <a:t>• C o n c r e t e P r o d u c </a:t>
-            </a:r>
-            <a:r>
-              <a:rPr lang="pt-BR" sz="1400" b="1" spc="50" dirty="0">
-                <a:ln w="12700">
-                  <a:noFill/>
-                  <a:prstDash val="solid"/>
-                </a:ln>
-                <a:solidFill>
-                  <a:schemeClr val="accent4"/>
-                </a:solidFill>
-                <a:latin typeface="+mj-lt"/>
-                <a:ea typeface="+mj-ea"/>
-                <a:cs typeface="+mj-cs"/>
-              </a:rPr>
-              <a:t>t（MailWorkArea, CalendarWorkArea, ContactWorkArea）</a:t>
+              <a:t>• C o n c r e t e P r o d u c t（MailWorkArea, CalendarWorkArea, ContactWorkArea）</a:t>
             </a:r>
           </a:p>
           <a:p>
@@ -7946,22 +7838,7 @@
                 <a:ea typeface="+mj-ea"/>
                 <a:cs typeface="+mj-cs"/>
               </a:rPr>
-              <a:t>• C r e a t o </a:t>
-            </a:r>
-            <a:r>
-              <a:rPr lang="pt-BR" sz="1400" b="1" spc="50" dirty="0">
-                <a:ln w="12700">
-                  <a:noFill/>
-                  <a:prstDash val="solid"/>
-                </a:ln>
-                <a:solidFill>
-                  <a:schemeClr val="accent4"/>
-                </a:solidFill>
-                <a:latin typeface="+mj-lt"/>
-                <a:ea typeface="+mj-ea"/>
-                <a:cs typeface="+mj-cs"/>
-              </a:rPr>
-              <a:t>r（Component）</a:t>
+              <a:t>• C r e a t o r（Component）</a:t>
             </a:r>
           </a:p>
           <a:p>
@@ -8037,8 +7914,37 @@
                 <a:ea typeface="+mj-ea"/>
                 <a:cs typeface="+mj-cs"/>
               </a:rPr>
-              <a:t>类型的对象。</a:t>
-            </a:r>
+              <a:t>类型的</a:t>
+            </a:r>
+            <a:r>
+              <a:rPr lang="zh-CN" altLang="en-US" sz="1400" b="1" spc="50" dirty="0" smtClean="0">
+                <a:ln w="12700">
+                  <a:noFill/>
+                  <a:prstDash val="solid"/>
+                </a:ln>
+                <a:solidFill>
+                  <a:schemeClr val="accent4"/>
+                </a:solidFill>
+                <a:latin typeface="+mj-lt"/>
+                <a:ea typeface="+mj-ea"/>
+                <a:cs typeface="+mj-cs"/>
+              </a:rPr>
+              <a:t>对象</a:t>
+            </a:r>
+            <a:endParaRPr lang="en-US" altLang="zh-CN" sz="1400" b="1" spc="50" dirty="0" smtClean="0">
+              <a:ln w="12700">
+                <a:noFill/>
+                <a:prstDash val="solid"/>
+              </a:ln>
+              <a:solidFill>
+                <a:schemeClr val="accent4"/>
+              </a:solidFill>
+              <a:latin typeface="+mj-lt"/>
+              <a:ea typeface="+mj-ea"/>
+              <a:cs typeface="+mj-cs"/>
+            </a:endParaRPr>
+          </a:p>
+          <a:p>
             <a:r>
               <a:rPr lang="en-US" sz="1400" b="1" spc="50" dirty="0">
                 <a:ln w="12700">
@@ -8052,6 +7958,36 @@
                 <a:ea typeface="+mj-ea"/>
                 <a:cs typeface="+mj-cs"/>
               </a:rPr>
+              <a:t>	</a:t>
+            </a:r>
+            <a:r>
+              <a:rPr lang="en-US" sz="1400" b="1" spc="50" dirty="0" smtClean="0">
+                <a:ln w="12700">
+                  <a:noFill/>
+                  <a:prstDash val="solid"/>
+                </a:ln>
+                <a:solidFill>
+                  <a:schemeClr val="accent4"/>
+                </a:solidFill>
+                <a:latin typeface="+mj-lt"/>
+                <a:ea typeface="+mj-ea"/>
+                <a:cs typeface="+mj-cs"/>
+              </a:rPr>
+              <a:t>    </a:t>
+            </a:r>
+            <a:r>
+              <a:rPr lang="en-US" sz="1400" b="1" spc="50" dirty="0" smtClean="0">
+                <a:ln w="12700">
+                  <a:noFill/>
+                  <a:prstDash val="solid"/>
+                </a:ln>
+                <a:solidFill>
+                  <a:schemeClr val="accent4"/>
+                </a:solidFill>
+                <a:latin typeface="+mj-lt"/>
+                <a:ea typeface="+mj-ea"/>
+                <a:cs typeface="+mj-cs"/>
+              </a:rPr>
               <a:t>Creator</a:t>
             </a:r>
             <a:r>
@@ -8067,37 +8003,7 @@
                 <a:ea typeface="+mj-ea"/>
                 <a:cs typeface="+mj-cs"/>
               </a:rPr>
-              <a:t>也可以定义一</a:t>
-            </a:r>
-            <a:r>
-              <a:rPr lang="zh-CN" altLang="en-US" sz="1400" b="1" spc="50" dirty="0">
-                <a:ln w="12700">
-                  <a:noFill/>
-                  <a:prstDash val="solid"/>
-                </a:ln>
-                <a:solidFill>
-                  <a:schemeClr val="accent4"/>
-                </a:solidFill>
-                <a:latin typeface="+mj-lt"/>
-                <a:ea typeface="+mj-ea"/>
-                <a:cs typeface="+mj-cs"/>
-              </a:rPr>
-              <a:t>个工厂方法</a:t>
-            </a:r>
-            <a:r>
-              <a:rPr lang="zh-CN" altLang="en-US" sz="1400" b="1" spc="50" dirty="0">
-                <a:ln w="12700">
-                  <a:noFill/>
-                  <a:prstDash val="solid"/>
-                </a:ln>
-                <a:solidFill>
-                  <a:schemeClr val="accent4"/>
-                </a:solidFill>
-                <a:latin typeface="+mj-lt"/>
-                <a:ea typeface="+mj-ea"/>
-                <a:cs typeface="+mj-cs"/>
-              </a:rPr>
-              <a:t>的缺省实现，它返回一个缺省的</a:t>
+              <a:t>也可以定义一个工厂方法的缺省实现，它返回一个缺省的</a:t>
             </a:r>
             <a:r>
               <a:rPr lang="en-US" sz="1400" b="1" spc="50" dirty="0" err="1">
@@ -8258,82 +8164,7 @@
                 <a:ea typeface="+mj-ea"/>
                 <a:cs typeface="+mj-cs"/>
               </a:rPr>
-              <a:t>• C o n c r e t e C r e a t o </a:t>
-            </a:r>
-            <a:r>
-              <a:rPr lang="pt-BR" sz="1400" b="1" spc="50" dirty="0">
-                <a:ln w="12700">
-                  <a:noFill/>
-                  <a:prstDash val="solid"/>
-                </a:ln>
-                <a:solidFill>
-                  <a:schemeClr val="accent4"/>
-                </a:solidFill>
-                <a:latin typeface="+mj-lt"/>
-                <a:ea typeface="+mj-ea"/>
-                <a:cs typeface="+mj-cs"/>
-              </a:rPr>
-              <a:t>r（MailComponent, Calendar</a:t>
-            </a:r>
-            <a:r>
-              <a:rPr lang="pt-BR" sz="1400" b="1" spc="50" dirty="0">
-                <a:ln w="12700">
-                  <a:noFill/>
-                  <a:prstDash val="solid"/>
-                </a:ln>
-                <a:solidFill>
-                  <a:schemeClr val="accent4"/>
-                </a:solidFill>
-                <a:latin typeface="+mj-lt"/>
-                <a:ea typeface="+mj-ea"/>
-                <a:cs typeface="+mj-cs"/>
-              </a:rPr>
-              <a:t>Component</a:t>
-            </a:r>
-            <a:r>
-              <a:rPr lang="pt-BR" sz="1400" b="1" spc="50" dirty="0">
-                <a:ln w="12700">
-                  <a:noFill/>
-                  <a:prstDash val="solid"/>
-                </a:ln>
-                <a:solidFill>
-                  <a:schemeClr val="accent4"/>
-                </a:solidFill>
-                <a:latin typeface="+mj-lt"/>
-                <a:ea typeface="+mj-ea"/>
-                <a:cs typeface="+mj-cs"/>
-              </a:rPr>
-              <a:t>, Contact</a:t>
-            </a:r>
-            <a:r>
-              <a:rPr lang="pt-BR" sz="1400" b="1" spc="50" dirty="0">
-                <a:ln w="12700">
-                  <a:noFill/>
-                  <a:prstDash val="solid"/>
-                </a:ln>
-                <a:solidFill>
-                  <a:schemeClr val="accent4"/>
-                </a:solidFill>
-                <a:latin typeface="+mj-lt"/>
-                <a:ea typeface="+mj-ea"/>
-                <a:cs typeface="+mj-cs"/>
-              </a:rPr>
-              <a:t>Component</a:t>
-            </a:r>
-            <a:r>
-              <a:rPr lang="pt-BR" sz="1400" b="1" spc="50" dirty="0">
-                <a:ln w="12700">
-                  <a:noFill/>
-                  <a:prstDash val="solid"/>
-                </a:ln>
-                <a:solidFill>
-                  <a:schemeClr val="accent4"/>
-                </a:solidFill>
-                <a:latin typeface="+mj-lt"/>
-                <a:ea typeface="+mj-ea"/>
-                <a:cs typeface="+mj-cs"/>
-              </a:rPr>
-              <a:t>）</a:t>
+              <a:t>• C o n c r e t e C r e a t o r（MailComponent, CalendarComponent, ContactComponent）</a:t>
             </a:r>
           </a:p>
           <a:p>
@@ -8472,6 +8303,70 @@
           </a:p>
         </p:txBody>
       </p:sp>
+      <p:pic>
+        <p:nvPicPr>
+          <p:cNvPr id="1026" name="Picture 2"/>
+          <p:cNvPicPr>
+            <a:picLocks noChangeAspect="1" noChangeArrowheads="1"/>
+          </p:cNvPicPr>
+          <p:nvPr/>
+        </p:nvPicPr>
+        <p:blipFill>
+          <a:blip r:embed="rId2">
+            <a:extLst>
+              <a:ext uri="{28A0092B-C50C-407E-A947-70E740481C1C}">
+                <a14:useLocalDpi xmlns:a14="http://schemas.microsoft.com/office/drawing/2010/main" val="0"/>
+              </a:ext>
+            </a:extLst>
+          </a:blip>
+          <a:srcRect/>
+          <a:stretch>
+            <a:fillRect/>
+          </a:stretch>
+        </p:blipFill>
+        <p:spPr bwMode="auto">
+          <a:xfrm>
+            <a:off x="2483768" y="1793735"/>
+            <a:ext cx="5616624" cy="1851289"/>
+          </a:xfrm>
+          <a:prstGeom prst="rect">
+            <a:avLst/>
+          </a:prstGeom>
+          <a:noFill/>
+          <a:ln>
+            <a:noFill/>
+          </a:ln>
+          <a:effectLst/>
+          <a:extLst>
+            <a:ext uri="{909E8E84-426E-40DD-AFC4-6F175D3DCCD1}">
+              <a14:hiddenFill xmlns:a14="http://schemas.microsoft.com/office/drawing/2010/main">
+                <a:solidFill>
+                  <a:schemeClr val="accent1"/>
+                </a:solidFill>
+              </a14:hiddenFill>
+            </a:ext>
+            <a:ext uri="{91240B29-F687-4F45-9708-019B960494DF}">
+              <a14:hiddenLine xmlns:a14="http://schemas.microsoft.com/office/drawing/2010/main" w="9525">
+                <a:solidFill>
+                  <a:schemeClr val="tx1"/>
+                </a:solidFill>
+                <a:miter lim="800000"/>
+                <a:headEnd/>
+                <a:tailEnd/>
+              </a14:hiddenLine>
+            </a:ext>
+            <a:ext uri="{AF507438-7753-43E0-B8FC-AC1667EBCBE1}">
+              <a14:hiddenEffects xmlns:a14="http://schemas.microsoft.com/office/drawing/2010/main">
+                <a:effectLst>
+                  <a:outerShdw dist="35921" dir="2700000" algn="ctr" rotWithShape="0">
+                    <a:schemeClr val="bg2"/>
+                  </a:outerShdw>
+                </a:effectLst>
+              </a14:hiddenEffects>
+            </a:ext>
+          </a:extLst>
+        </p:spPr>
+      </p:pic>
     </p:spTree>
     <p:extLst>
       <p:ext uri="{BB962C8B-B14F-4D97-AF65-F5344CB8AC3E}">
@@ -8511,253 +8406,449 @@
       </p:grpSpPr>
       <p:sp>
         <p:nvSpPr>
-          <p:cNvPr id="2" name="Rectangle 1"/>
-          <p:cNvSpPr>
+          <p:cNvPr id="3" name="矩形 2"/>
+          <p:cNvSpPr/>
+          <p:nvPr/>
+        </p:nvSpPr>
+        <p:spPr>
+          <a:xfrm>
+            <a:off x="683568" y="1556792"/>
+            <a:ext cx="7776864" cy="864096"/>
+          </a:xfrm>
+          <a:prstGeom prst="rect">
+            <a:avLst/>
+          </a:prstGeom>
+        </p:spPr>
+        <p:txBody>
+          <a:bodyPr vert="horz" rtlCol="0" anchor="ctr">
+            <a:normAutofit fontScale="77500" lnSpcReduction="20000"/>
+            <a:scene3d>
+              <a:camera prst="orthographicFront"/>
+              <a:lightRig rig="soft" dir="t"/>
+            </a:scene3d>
+            <a:sp3d prstMaterial="matte">
+              <a:bevelT w="12700" h="12700"/>
+            </a:sp3d>
+          </a:bodyPr>
+          <a:lstStyle/>
+          <a:p>
+            <a:pPr>
+              <a:spcBef>
+                <a:spcPct val="0"/>
+              </a:spcBef>
+            </a:pPr>
+            <a:r>
+              <a:rPr lang="zh-CN" altLang="en-US" sz="1900" b="1" spc="50" dirty="0" smtClean="0">
+                <a:ln w="12700">
+                  <a:noFill/>
+                  <a:prstDash val="solid"/>
+                </a:ln>
+                <a:solidFill>
+                  <a:schemeClr val="accent4"/>
+                </a:solidFill>
+              </a:rPr>
+              <a:t>结构图</a:t>
+            </a:r>
+            <a:r>
+              <a:rPr lang="en-US" altLang="zh-CN" sz="1900" b="1" spc="50" dirty="0" smtClean="0">
+                <a:ln w="12700">
+                  <a:noFill/>
+                  <a:prstDash val="solid"/>
+                </a:ln>
+                <a:solidFill>
+                  <a:schemeClr val="accent4"/>
+                </a:solidFill>
+              </a:rPr>
+              <a:t>2</a:t>
+            </a:r>
+            <a:r>
+              <a:rPr lang="zh-CN" altLang="en-US" sz="1900" b="1" spc="50" dirty="0" smtClean="0">
+                <a:ln w="12700">
+                  <a:noFill/>
+                  <a:prstDash val="solid"/>
+                </a:ln>
+                <a:solidFill>
+                  <a:schemeClr val="accent4"/>
+                </a:solidFill>
+              </a:rPr>
+              <a:t>：（个人不太推荐）</a:t>
+            </a:r>
+            <a:endParaRPr lang="en-US" altLang="zh-CN" sz="1900" b="1" spc="50" dirty="0">
+              <a:ln w="12700">
+                <a:noFill/>
+                <a:prstDash val="solid"/>
+              </a:ln>
+              <a:solidFill>
+                <a:schemeClr val="accent4"/>
+              </a:solidFill>
+            </a:endParaRPr>
+          </a:p>
+          <a:p>
+            <a:endParaRPr lang="en-US" altLang="zh-CN" sz="1600" b="1" spc="50" dirty="0">
+              <a:ln w="12700">
+                <a:noFill/>
+                <a:prstDash val="solid"/>
+              </a:ln>
+              <a:solidFill>
+                <a:schemeClr val="accent4"/>
+              </a:solidFill>
+              <a:latin typeface="+mj-lt"/>
+              <a:ea typeface="+mj-ea"/>
+              <a:cs typeface="+mj-cs"/>
+            </a:endParaRPr>
+          </a:p>
+          <a:p>
+            <a:r>
+              <a:rPr lang="en-US" altLang="zh-CN" sz="1600" b="1" spc="50" dirty="0">
+                <a:ln w="12700">
+                  <a:noFill/>
+                  <a:prstDash val="solid"/>
+                </a:ln>
+                <a:solidFill>
+                  <a:schemeClr val="accent4"/>
+                </a:solidFill>
+                <a:latin typeface="+mj-lt"/>
+                <a:ea typeface="+mj-ea"/>
+                <a:cs typeface="+mj-cs"/>
+              </a:rPr>
+              <a:t>	</a:t>
+            </a:r>
+            <a:r>
+              <a:rPr lang="en-US" altLang="zh-CN" sz="1500" b="1" spc="50" dirty="0" smtClean="0">
+                <a:ln w="12700">
+                  <a:noFill/>
+                  <a:prstDash val="solid"/>
+                </a:ln>
+                <a:solidFill>
+                  <a:schemeClr val="accent4"/>
+                </a:solidFill>
+                <a:latin typeface="+mj-lt"/>
+                <a:ea typeface="+mj-ea"/>
+                <a:cs typeface="+mj-cs"/>
+              </a:rPr>
+              <a:t>- Creator</a:t>
+            </a:r>
+            <a:r>
+              <a:rPr lang="zh-CN" altLang="en-US" sz="1500" b="1" spc="50" dirty="0" smtClean="0">
+                <a:ln w="12700">
+                  <a:noFill/>
+                  <a:prstDash val="solid"/>
+                </a:ln>
+                <a:solidFill>
+                  <a:schemeClr val="accent4"/>
+                </a:solidFill>
+                <a:latin typeface="+mj-lt"/>
+                <a:ea typeface="+mj-ea"/>
+                <a:cs typeface="+mj-cs"/>
+              </a:rPr>
+              <a:t>名称变为</a:t>
+            </a:r>
+            <a:r>
+              <a:rPr lang="en-US" altLang="zh-CN" sz="1500" b="1" spc="50" dirty="0" smtClean="0">
+                <a:ln w="12700">
+                  <a:noFill/>
+                  <a:prstDash val="solid"/>
+                </a:ln>
+                <a:solidFill>
+                  <a:schemeClr val="accent4"/>
+                </a:solidFill>
+                <a:latin typeface="+mj-lt"/>
+                <a:ea typeface="+mj-ea"/>
+                <a:cs typeface="+mj-cs"/>
+              </a:rPr>
+              <a:t>Factory</a:t>
+            </a:r>
+            <a:r>
+              <a:rPr lang="zh-CN" altLang="en-US" sz="1500" b="1" spc="50" dirty="0" smtClean="0">
+                <a:ln w="12700">
+                  <a:noFill/>
+                  <a:prstDash val="solid"/>
+                </a:ln>
+                <a:solidFill>
+                  <a:schemeClr val="accent4"/>
+                </a:solidFill>
+                <a:latin typeface="+mj-lt"/>
+                <a:ea typeface="+mj-ea"/>
+                <a:cs typeface="+mj-cs"/>
+              </a:rPr>
+              <a:t>有误导，因为</a:t>
+            </a:r>
+            <a:r>
+              <a:rPr lang="en-US" altLang="zh-CN" sz="1500" b="1" spc="50" dirty="0" smtClean="0">
+                <a:ln w="12700">
+                  <a:noFill/>
+                  <a:prstDash val="solid"/>
+                </a:ln>
+                <a:solidFill>
+                  <a:schemeClr val="accent4"/>
+                </a:solidFill>
+                <a:latin typeface="+mj-lt"/>
+                <a:ea typeface="+mj-ea"/>
+                <a:cs typeface="+mj-cs"/>
+              </a:rPr>
+              <a:t>Creator</a:t>
+            </a:r>
+            <a:r>
+              <a:rPr lang="zh-CN" altLang="en-US" sz="1500" b="1" spc="50" dirty="0" smtClean="0">
+                <a:ln w="12700">
+                  <a:noFill/>
+                  <a:prstDash val="solid"/>
+                </a:ln>
+                <a:solidFill>
+                  <a:schemeClr val="accent4"/>
+                </a:solidFill>
+                <a:latin typeface="+mj-lt"/>
+                <a:ea typeface="+mj-ea"/>
+                <a:cs typeface="+mj-cs"/>
+              </a:rPr>
+              <a:t>的主要职责不一定仅仅是作为</a:t>
+            </a:r>
+            <a:r>
+              <a:rPr lang="en-US" altLang="zh-CN" sz="1500" b="1" spc="50" dirty="0" smtClean="0">
+                <a:ln w="12700">
+                  <a:noFill/>
+                  <a:prstDash val="solid"/>
+                </a:ln>
+                <a:solidFill>
+                  <a:schemeClr val="accent4"/>
+                </a:solidFill>
+                <a:latin typeface="+mj-lt"/>
+                <a:ea typeface="+mj-ea"/>
+                <a:cs typeface="+mj-cs"/>
+              </a:rPr>
+              <a:t>Factory</a:t>
+            </a:r>
+            <a:r>
+              <a:rPr lang="zh-CN" altLang="en-US" sz="1500" b="1" spc="50" dirty="0" smtClean="0">
+                <a:ln w="12700">
+                  <a:noFill/>
+                  <a:prstDash val="solid"/>
+                </a:ln>
+                <a:solidFill>
+                  <a:schemeClr val="accent4"/>
+                </a:solidFill>
+                <a:latin typeface="+mj-lt"/>
+                <a:ea typeface="+mj-ea"/>
+                <a:cs typeface="+mj-cs"/>
+              </a:rPr>
+              <a:t>创建</a:t>
+            </a:r>
+            <a:r>
+              <a:rPr lang="en-US" altLang="zh-CN" sz="1500" b="1" spc="50" dirty="0" smtClean="0">
+                <a:ln w="12700">
+                  <a:noFill/>
+                  <a:prstDash val="solid"/>
+                </a:ln>
+                <a:solidFill>
+                  <a:schemeClr val="accent4"/>
+                </a:solidFill>
+                <a:latin typeface="+mj-lt"/>
+                <a:ea typeface="+mj-ea"/>
+                <a:cs typeface="+mj-cs"/>
+              </a:rPr>
+              <a:t>Product</a:t>
+            </a:r>
+          </a:p>
+          <a:p>
+            <a:r>
+              <a:rPr lang="en-US" altLang="zh-CN" sz="1500" b="1" spc="50" dirty="0">
+                <a:ln w="12700">
+                  <a:noFill/>
+                  <a:prstDash val="solid"/>
+                </a:ln>
+                <a:solidFill>
+                  <a:schemeClr val="accent4"/>
+                </a:solidFill>
+                <a:latin typeface="+mj-lt"/>
+                <a:ea typeface="+mj-ea"/>
+                <a:cs typeface="+mj-cs"/>
+              </a:rPr>
+              <a:t>	</a:t>
+            </a:r>
+            <a:r>
+              <a:rPr lang="en-US" altLang="zh-CN" sz="1500" b="1" spc="50" dirty="0" smtClean="0">
+                <a:ln w="12700">
+                  <a:noFill/>
+                  <a:prstDash val="solid"/>
+                </a:ln>
+                <a:solidFill>
+                  <a:schemeClr val="accent4"/>
+                </a:solidFill>
+                <a:latin typeface="+mj-lt"/>
+                <a:ea typeface="+mj-ea"/>
+                <a:cs typeface="+mj-cs"/>
+              </a:rPr>
+              <a:t>- </a:t>
+            </a:r>
+            <a:r>
+              <a:rPr lang="zh-CN" altLang="en-US" sz="1500" b="1" spc="50" dirty="0" smtClean="0">
+                <a:ln w="12700">
+                  <a:noFill/>
+                  <a:prstDash val="solid"/>
+                </a:ln>
+                <a:solidFill>
+                  <a:schemeClr val="accent4"/>
+                </a:solidFill>
+                <a:latin typeface="+mj-lt"/>
+                <a:ea typeface="+mj-ea"/>
+                <a:cs typeface="+mj-cs"/>
+              </a:rPr>
+              <a:t>分散注意，因为重点是工厂方法</a:t>
+            </a:r>
+            <a:r>
+              <a:rPr lang="en-US" altLang="zh-CN" sz="1500" b="1" spc="50" dirty="0" smtClean="0">
+                <a:ln w="12700">
+                  <a:noFill/>
+                  <a:prstDash val="solid"/>
+                </a:ln>
+                <a:solidFill>
+                  <a:schemeClr val="accent4"/>
+                </a:solidFill>
+                <a:latin typeface="+mj-lt"/>
+                <a:ea typeface="+mj-ea"/>
+                <a:cs typeface="+mj-cs"/>
+              </a:rPr>
+              <a:t>Create()</a:t>
+            </a:r>
+            <a:r>
+              <a:rPr lang="zh-CN" altLang="en-US" sz="1500" b="1" spc="50" dirty="0" smtClean="0">
+                <a:ln w="12700">
+                  <a:noFill/>
+                  <a:prstDash val="solid"/>
+                </a:ln>
+                <a:solidFill>
+                  <a:schemeClr val="accent4"/>
+                </a:solidFill>
+                <a:latin typeface="+mj-lt"/>
+                <a:ea typeface="+mj-ea"/>
+                <a:cs typeface="+mj-cs"/>
+              </a:rPr>
+              <a:t>，而不在于</a:t>
+            </a:r>
+            <a:r>
+              <a:rPr lang="zh-CN" altLang="en-US" sz="1500" b="1" spc="50" dirty="0">
+                <a:ln w="12700">
+                  <a:noFill/>
+                  <a:prstDash val="solid"/>
+                </a:ln>
+                <a:solidFill>
+                  <a:schemeClr val="accent4"/>
+                </a:solidFill>
+                <a:latin typeface="+mj-lt"/>
+                <a:ea typeface="+mj-ea"/>
+                <a:cs typeface="+mj-cs"/>
+              </a:rPr>
+              <a:t>指示</a:t>
+            </a:r>
+            <a:r>
+              <a:rPr lang="en-US" altLang="zh-CN" sz="1500" b="1" spc="50" dirty="0" smtClean="0">
+                <a:ln w="12700">
+                  <a:noFill/>
+                  <a:prstDash val="solid"/>
+                </a:ln>
+                <a:solidFill>
+                  <a:schemeClr val="accent4"/>
+                </a:solidFill>
+                <a:latin typeface="+mj-lt"/>
+                <a:ea typeface="+mj-ea"/>
+                <a:cs typeface="+mj-cs"/>
+              </a:rPr>
+              <a:t>Creator</a:t>
+            </a:r>
+            <a:r>
+              <a:rPr lang="zh-CN" altLang="en-US" sz="1500" b="1" spc="50" dirty="0" smtClean="0">
+                <a:ln w="12700">
+                  <a:noFill/>
+                  <a:prstDash val="solid"/>
+                </a:ln>
+                <a:solidFill>
+                  <a:schemeClr val="accent4"/>
+                </a:solidFill>
+                <a:latin typeface="+mj-lt"/>
+                <a:ea typeface="+mj-ea"/>
+                <a:cs typeface="+mj-cs"/>
+              </a:rPr>
+              <a:t>是个</a:t>
+            </a:r>
+            <a:r>
+              <a:rPr lang="en-US" altLang="zh-CN" sz="1500" b="1" spc="50" dirty="0" smtClean="0">
+                <a:ln w="12700">
+                  <a:noFill/>
+                  <a:prstDash val="solid"/>
+                </a:ln>
+                <a:solidFill>
+                  <a:schemeClr val="accent4"/>
+                </a:solidFill>
+                <a:latin typeface="+mj-lt"/>
+                <a:ea typeface="+mj-ea"/>
+                <a:cs typeface="+mj-cs"/>
+              </a:rPr>
+              <a:t>Factory</a:t>
+            </a:r>
+            <a:endParaRPr lang="en-US" altLang="zh-CN" sz="1500" b="1" spc="50" dirty="0" smtClean="0">
+              <a:ln w="12700">
+                <a:noFill/>
+                <a:prstDash val="solid"/>
+              </a:ln>
+              <a:solidFill>
+                <a:schemeClr val="accent4"/>
+              </a:solidFill>
+              <a:latin typeface="+mj-lt"/>
+              <a:ea typeface="+mj-ea"/>
+              <a:cs typeface="+mj-cs"/>
+            </a:endParaRPr>
+          </a:p>
+        </p:txBody>
+      </p:sp>
+      <p:sp>
+        <p:nvSpPr>
+          <p:cNvPr id="4" name="Rectangle 2"/>
+          <p:cNvSpPr txBox="1">
             <a:spLocks noChangeArrowheads="1"/>
           </p:cNvSpPr>
           <p:nvPr/>
         </p:nvSpPr>
-        <p:spPr bwMode="auto">
+        <p:spPr>
           <a:xfrm>
-            <a:off x="539552" y="620688"/>
-            <a:ext cx="6192688" cy="723275"/>
+            <a:off x="628650" y="365127"/>
+            <a:ext cx="7886700" cy="1119658"/>
           </a:xfrm>
           <a:prstGeom prst="rect">
             <a:avLst/>
           </a:prstGeom>
-          <a:noFill/>
-          <a:ln>
-            <a:noFill/>
-          </a:ln>
-          <a:effectLst/>
-          <a:extLst>
-            <a:ext uri="{909E8E84-426E-40DD-AFC4-6F175D3DCCD1}">
-              <a14:hiddenFill xmlns:a14="http://schemas.microsoft.com/office/drawing/2010/main">
-                <a:solidFill>
-                  <a:schemeClr val="accent1"/>
-                </a:solidFill>
-              </a14:hiddenFill>
-            </a:ext>
-            <a:ext uri="{91240B29-F687-4F45-9708-019B960494DF}">
-              <a14:hiddenLine xmlns:a14="http://schemas.microsoft.com/office/drawing/2010/main" w="9525">
-                <a:solidFill>
-                  <a:schemeClr val="tx1"/>
-                </a:solidFill>
-                <a:miter lim="800000"/>
-                <a:headEnd/>
-                <a:tailEnd/>
-              </a14:hiddenLine>
-            </a:ext>
-            <a:ext uri="{AF507438-7753-43E0-B8FC-AC1667EBCBE1}">
-              <a14:hiddenEffects xmlns:a14="http://schemas.microsoft.com/office/drawing/2010/main">
-                <a:effectLst>
-                  <a:outerShdw dist="35921" dir="2700000" algn="ctr" rotWithShape="0">
-                    <a:schemeClr val="bg2"/>
-                  </a:outerShdw>
-                </a:effectLst>
-              </a14:hiddenEffects>
-            </a:ext>
-          </a:extLst>
         </p:spPr>
         <p:txBody>
-          <a:bodyPr vert="horz" wrap="square" lIns="91440" tIns="45720" rIns="91440" bIns="45720" numCol="1" anchor="ctr" anchorCtr="0" compatLnSpc="1">
-            <a:prstTxWarp prst="textNoShape">
-              <a:avLst/>
-            </a:prstTxWarp>
-            <a:spAutoFit/>
+          <a:bodyPr vert="horz" lIns="91440" tIns="45720" rIns="91440" bIns="45720" rtlCol="0" anchor="ctr">
+            <a:normAutofit/>
           </a:bodyPr>
-          <a:lstStyle/>
-          <a:p>
-            <a:pPr marL="0" marR="0" lvl="0" indent="0" algn="l" defTabSz="914400" rtl="0" eaLnBrk="1" fontAlgn="base" latinLnBrk="0" hangingPunct="1">
-              <a:lnSpc>
-                <a:spcPct val="100000"/>
-              </a:lnSpc>
+          <a:lstStyle>
+            <a:lvl1pPr algn="ctr" defTabSz="914400" rtl="0" eaLnBrk="1" latinLnBrk="0" hangingPunct="1">
               <a:spcBef>
                 <a:spcPct val="0"/>
               </a:spcBef>
-              <a:spcAft>
-                <a:spcPct val="0"/>
-              </a:spcAft>
-              <a:buClrTx/>
-              <a:buSzTx/>
-              <a:buFontTx/>
               <a:buNone/>
-              <a:tabLst/>
-            </a:pPr>
-            <a:r>
-              <a:rPr kumimoji="0" lang="zh-CN" sz="1000" b="1" i="0" u="none" strike="noStrike" cap="none" normalizeH="0" baseline="0" dirty="0" smtClean="0">
-                <a:ln>
-                  <a:noFill/>
-                </a:ln>
-                <a:solidFill>
-                  <a:srgbClr val="000000"/>
-                </a:solidFill>
-                <a:effectLst/>
-                <a:latin typeface="Verdana" pitchFamily="34" charset="0"/>
-                <a:cs typeface="Calibri" pitchFamily="34" charset="0"/>
-              </a:rPr>
-              <a:t>工厂方法</a:t>
-            </a:r>
-            <a:r>
-              <a:rPr kumimoji="0" lang="zh-CN" sz="1000" b="0" i="0" u="none" strike="noStrike" cap="none" normalizeH="0" baseline="0" dirty="0" smtClean="0">
-                <a:ln>
-                  <a:noFill/>
-                </a:ln>
-                <a:solidFill>
-                  <a:srgbClr val="000000"/>
-                </a:solidFill>
-                <a:effectLst/>
-                <a:latin typeface="Verdana" pitchFamily="34" charset="0"/>
-                <a:cs typeface="Calibri" pitchFamily="34" charset="0"/>
-              </a:rPr>
-              <a:t> </a:t>
-            </a:r>
-            <a:endParaRPr kumimoji="0" lang="zh-CN" sz="1100" b="0" i="0" u="none" strike="noStrike" cap="none" normalizeH="0" baseline="0" dirty="0" smtClean="0">
-              <a:ln>
-                <a:noFill/>
-              </a:ln>
-              <a:solidFill>
-                <a:srgbClr val="000000"/>
-              </a:solidFill>
-              <a:effectLst/>
-              <a:latin typeface="Calibri" pitchFamily="34" charset="0"/>
-              <a:cs typeface="Calibri" pitchFamily="34" charset="0"/>
-            </a:endParaRPr>
-          </a:p>
-          <a:p>
-            <a:pPr marL="0" marR="0" lvl="0" indent="0" algn="l" defTabSz="914400" rtl="0" eaLnBrk="0" fontAlgn="base" latinLnBrk="0" hangingPunct="0">
-              <a:lnSpc>
-                <a:spcPct val="100000"/>
-              </a:lnSpc>
-              <a:spcBef>
-                <a:spcPct val="0"/>
-              </a:spcBef>
-              <a:spcAft>
-                <a:spcPct val="0"/>
-              </a:spcAft>
-              <a:buClrTx/>
-              <a:buSzTx/>
-              <a:buFontTx/>
-              <a:buNone/>
-              <a:tabLst/>
-            </a:pPr>
-            <a:r>
-              <a:rPr kumimoji="0" lang="zh-CN" sz="1000" b="0" i="0" u="none" strike="noStrike" cap="none" normalizeH="0" baseline="0" dirty="0" smtClean="0">
-                <a:ln>
-                  <a:noFill/>
-                </a:ln>
-                <a:solidFill>
-                  <a:srgbClr val="000000"/>
-                </a:solidFill>
-                <a:effectLst/>
-                <a:latin typeface="Verdana" pitchFamily="34" charset="0"/>
-                <a:cs typeface="Calibri" pitchFamily="34" charset="0"/>
-              </a:rPr>
-              <a:t>工厂方法是针对每一种产品提供一个工厂类。通过不同的工厂实例来创建不同的产品实例。</a:t>
-            </a:r>
-            <a:endParaRPr kumimoji="0" lang="zh-CN" sz="1100" b="0" i="0" u="none" strike="noStrike" cap="none" normalizeH="0" baseline="0" dirty="0" smtClean="0">
-              <a:ln>
-                <a:noFill/>
-              </a:ln>
-              <a:solidFill>
-                <a:srgbClr val="000000"/>
-              </a:solidFill>
-              <a:effectLst/>
-              <a:latin typeface="Calibri" pitchFamily="34" charset="0"/>
-              <a:cs typeface="Calibri" pitchFamily="34" charset="0"/>
-            </a:endParaRPr>
-          </a:p>
-          <a:p>
-            <a:pPr marL="0" marR="0" lvl="0" indent="0" algn="l" defTabSz="914400" rtl="0" eaLnBrk="0" fontAlgn="base" latinLnBrk="0" hangingPunct="0">
-              <a:lnSpc>
-                <a:spcPct val="100000"/>
-              </a:lnSpc>
-              <a:spcBef>
-                <a:spcPct val="0"/>
-              </a:spcBef>
-              <a:spcAft>
-                <a:spcPct val="0"/>
-              </a:spcAft>
-              <a:buClrTx/>
-              <a:buSzTx/>
-              <a:buFontTx/>
-              <a:buNone/>
-              <a:tabLst/>
-            </a:pPr>
-            <a:r>
-              <a:rPr kumimoji="0" lang="zh-CN" sz="1000" b="0" i="0" u="none" strike="noStrike" cap="none" normalizeH="0" baseline="0" dirty="0" smtClean="0">
-                <a:ln>
-                  <a:noFill/>
-                </a:ln>
-                <a:solidFill>
-                  <a:srgbClr val="000000"/>
-                </a:solidFill>
-                <a:effectLst/>
-                <a:latin typeface="Verdana" pitchFamily="34" charset="0"/>
-                <a:cs typeface="Calibri" pitchFamily="34" charset="0"/>
-              </a:rPr>
-              <a:t>在同一等级结构中，支持增加任意产品。</a:t>
-            </a:r>
-            <a:endParaRPr kumimoji="0" lang="zh-CN" sz="1100" b="0" i="0" u="none" strike="noStrike" cap="none" normalizeH="0" baseline="0" dirty="0" smtClean="0">
-              <a:ln>
-                <a:noFill/>
-              </a:ln>
-              <a:solidFill>
-                <a:srgbClr val="000000"/>
-              </a:solidFill>
-              <a:effectLst/>
-              <a:latin typeface="Calibri" pitchFamily="34" charset="0"/>
-              <a:cs typeface="Calibri" pitchFamily="34" charset="0"/>
-            </a:endParaRPr>
-          </a:p>
-          <a:p>
-            <a:pPr marL="0" marR="0" lvl="0" indent="0" algn="l" defTabSz="914400" rtl="0" eaLnBrk="0" fontAlgn="base" latinLnBrk="0" hangingPunct="0">
-              <a:lnSpc>
-                <a:spcPct val="100000"/>
-              </a:lnSpc>
-              <a:spcBef>
-                <a:spcPct val="0"/>
-              </a:spcBef>
-              <a:spcAft>
-                <a:spcPct val="0"/>
-              </a:spcAft>
-              <a:buClrTx/>
-              <a:buSzTx/>
-              <a:buFontTx/>
-              <a:buNone/>
-              <a:tabLst/>
-            </a:pPr>
-            <a:r>
-              <a:rPr kumimoji="0" lang="zh-CN" sz="1100" b="0" i="0" u="none" strike="noStrike" cap="none" normalizeH="0" baseline="0" dirty="0" smtClean="0">
-                <a:ln>
-                  <a:noFill/>
-                </a:ln>
-                <a:solidFill>
-                  <a:srgbClr val="000000"/>
-                </a:solidFill>
-                <a:effectLst/>
-                <a:latin typeface="Calibri" pitchFamily="34" charset="0"/>
-                <a:cs typeface="Calibri" pitchFamily="34" charset="0"/>
-              </a:rPr>
-              <a:t>  </a:t>
-            </a:r>
-            <a:endParaRPr kumimoji="0" lang="zh-CN" sz="26200" b="0" i="0" u="none" strike="noStrike" cap="none" normalizeH="0" baseline="0" dirty="0" smtClean="0">
-              <a:ln>
-                <a:noFill/>
-              </a:ln>
-              <a:solidFill>
-                <a:srgbClr val="000000"/>
-              </a:solidFill>
-              <a:effectLst/>
-              <a:latin typeface="Calibri" pitchFamily="34" charset="0"/>
-              <a:cs typeface="Calibri" pitchFamily="34" charset="0"/>
-            </a:endParaRPr>
+              <a:defRPr sz="4400" kern="1200">
+                <a:solidFill>
+                  <a:schemeClr val="tx1"/>
+                </a:solidFill>
+                <a:latin typeface="+mj-lt"/>
+                <a:ea typeface="+mj-ea"/>
+                <a:cs typeface="+mj-cs"/>
+              </a:defRPr>
+            </a:lvl1pPr>
+          </a:lstStyle>
+          <a:p>
+            <a:r>
+              <a:rPr lang="en-US" altLang="zh-CN" dirty="0" smtClean="0"/>
+              <a:t>Factory Method</a:t>
+            </a:r>
+            <a:endParaRPr lang="zh-CN" altLang="en-US" dirty="0"/>
           </a:p>
         </p:txBody>
       </p:sp>
       <p:pic>
         <p:nvPicPr>
-          <p:cNvPr id="5122" name="Picture 2"/>
+          <p:cNvPr id="6" name="Picture 2" descr="Machine generated alternative text:&#10;pkg Facto.ethod &#10;Client &#10;uintefface.s &#10;creates &#10;createO Product &#10;operatjonfO : vow &#10;operation20 . void "/>
           <p:cNvPicPr>
             <a:picLocks noChangeAspect="1" noChangeArrowheads="1"/>
           </p:cNvPicPr>
@@ -8778,43 +8869,20 @@
         </p:blipFill>
         <p:spPr bwMode="auto">
           <a:xfrm>
-            <a:off x="467544" y="1431603"/>
-            <a:ext cx="6298065" cy="2285429"/>
+            <a:off x="1547664" y="2610292"/>
+            <a:ext cx="5539992" cy="4203084"/>
           </a:xfrm>
           <a:prstGeom prst="rect">
             <a:avLst/>
           </a:prstGeom>
           <a:noFill/>
-          <a:ln>
-            <a:noFill/>
-          </a:ln>
-          <a:effectLst/>
           <a:extLst>
             <a:ext uri="{909E8E84-426E-40DD-AFC4-6F175D3DCCD1}">
               <a14:hiddenFill xmlns:a14="http://schemas.microsoft.com/office/drawing/2010/main">
                 <a:solidFill>
-                  <a:schemeClr val="accent1"/>
+                  <a:srgbClr val="FFFFFF"/>
                 </a:solidFill>
               </a14:hiddenFill>
-            </a:ext>
-            <a:ext uri="{91240B29-F687-4F45-9708-019B960494DF}">
-              <a14:hiddenLine xmlns:a14="http://schemas.microsoft.com/office/drawing/2010/main" w="9525">
-                <a:solidFill>
-                  <a:schemeClr val="tx1"/>
-                </a:solidFill>
-                <a:miter lim="800000"/>
-                <a:headEnd/>
-                <a:tailEnd/>
-              </a14:hiddenLine>
-            </a:ext>
-            <a:ext uri="{AF507438-7753-43E0-B8FC-AC1667EBCBE1}">
-              <a14:hiddenEffects xmlns:a14="http://schemas.microsoft.com/office/drawing/2010/main">
-                <a:effectLst>
-                  <a:outerShdw dist="35921" dir="2700000" algn="ctr" rotWithShape="0">
-                    <a:schemeClr val="bg2"/>
-                  </a:outerShdw>
-                </a:effectLst>
-              </a14:hiddenEffects>
             </a:ext>
           </a:extLst>
         </p:spPr>
@@ -8822,7 +8890,7 @@
     </p:spTree>
     <p:extLst>
       <p:ext uri="{BB962C8B-B14F-4D97-AF65-F5344CB8AC3E}">
-        <p14:creationId xmlns:p14="http://schemas.microsoft.com/office/powerpoint/2010/main" val="1297659525"/>
+        <p14:creationId xmlns:p14="http://schemas.microsoft.com/office/powerpoint/2010/main" val="3427060911"/>
       </p:ext>
     </p:extLst>
   </p:cSld>
@@ -9482,6 +9550,1197 @@
       </p:grpSpPr>
       <p:sp>
         <p:nvSpPr>
+          <p:cNvPr id="3" name="矩形 2"/>
+          <p:cNvSpPr/>
+          <p:nvPr/>
+        </p:nvSpPr>
+        <p:spPr>
+          <a:xfrm>
+            <a:off x="683568" y="1556792"/>
+            <a:ext cx="7776864" cy="4968552"/>
+          </a:xfrm>
+          <a:prstGeom prst="rect">
+            <a:avLst/>
+          </a:prstGeom>
+        </p:spPr>
+        <p:txBody>
+          <a:bodyPr vert="horz" rtlCol="0" anchor="ctr">
+            <a:normAutofit/>
+            <a:scene3d>
+              <a:camera prst="orthographicFront"/>
+              <a:lightRig rig="soft" dir="t"/>
+            </a:scene3d>
+            <a:sp3d prstMaterial="matte">
+              <a:bevelT w="12700" h="12700"/>
+            </a:sp3d>
+          </a:bodyPr>
+          <a:lstStyle/>
+          <a:p>
+            <a:pPr>
+              <a:spcBef>
+                <a:spcPct val="0"/>
+              </a:spcBef>
+            </a:pPr>
+            <a:r>
+              <a:rPr lang="en-US" altLang="zh-CN" sz="1500" b="1" spc="50" dirty="0" smtClean="0">
+                <a:ln w="12700">
+                  <a:noFill/>
+                  <a:prstDash val="solid"/>
+                </a:ln>
+                <a:solidFill>
+                  <a:schemeClr val="accent4"/>
+                </a:solidFill>
+                <a:latin typeface="+mj-lt"/>
+                <a:ea typeface="+mj-ea"/>
+                <a:cs typeface="+mj-cs"/>
+              </a:rPr>
+              <a:t>Factory Method</a:t>
+            </a:r>
+            <a:r>
+              <a:rPr lang="zh-CN" altLang="en-US" sz="1500" b="1" spc="50" dirty="0" smtClean="0">
+                <a:ln w="12700">
+                  <a:noFill/>
+                  <a:prstDash val="solid"/>
+                </a:ln>
+                <a:solidFill>
+                  <a:schemeClr val="accent4"/>
+                </a:solidFill>
+                <a:latin typeface="+mj-lt"/>
+                <a:ea typeface="+mj-ea"/>
+                <a:cs typeface="+mj-cs"/>
+              </a:rPr>
+              <a:t>的一种变体（从</a:t>
+            </a:r>
+            <a:r>
+              <a:rPr lang="en-US" altLang="zh-CN" sz="1500" b="1" spc="50" dirty="0" smtClean="0">
+                <a:ln w="12700">
+                  <a:noFill/>
+                  <a:prstDash val="solid"/>
+                </a:ln>
+                <a:solidFill>
+                  <a:schemeClr val="accent4"/>
+                </a:solidFill>
+                <a:latin typeface="+mj-lt"/>
+                <a:ea typeface="+mj-ea"/>
+                <a:cs typeface="+mj-cs"/>
+              </a:rPr>
+              <a:t>Creator</a:t>
+            </a:r>
+            <a:r>
+              <a:rPr lang="zh-CN" altLang="en-US" sz="1500" b="1" spc="50" dirty="0" smtClean="0">
+                <a:ln w="12700">
+                  <a:noFill/>
+                  <a:prstDash val="solid"/>
+                </a:ln>
+                <a:solidFill>
+                  <a:schemeClr val="accent4"/>
+                </a:solidFill>
+                <a:latin typeface="+mj-lt"/>
+                <a:ea typeface="+mj-ea"/>
+                <a:cs typeface="+mj-cs"/>
+              </a:rPr>
+              <a:t>分离出创建职责到</a:t>
+            </a:r>
+            <a:r>
+              <a:rPr lang="en-US" altLang="zh-CN" sz="1500" b="1" spc="50" dirty="0" smtClean="0">
+                <a:ln w="12700">
+                  <a:noFill/>
+                  <a:prstDash val="solid"/>
+                </a:ln>
+                <a:solidFill>
+                  <a:schemeClr val="accent4"/>
+                </a:solidFill>
+                <a:latin typeface="+mj-lt"/>
+                <a:ea typeface="+mj-ea"/>
+                <a:cs typeface="+mj-cs"/>
+              </a:rPr>
+              <a:t>Factory</a:t>
+            </a:r>
+            <a:r>
+              <a:rPr lang="zh-CN" altLang="en-US" sz="1500" b="1" spc="50" dirty="0" smtClean="0">
+                <a:ln w="12700">
+                  <a:noFill/>
+                  <a:prstDash val="solid"/>
+                </a:ln>
+                <a:solidFill>
+                  <a:schemeClr val="accent4"/>
+                </a:solidFill>
+                <a:latin typeface="+mj-lt"/>
+                <a:ea typeface="+mj-ea"/>
+                <a:cs typeface="+mj-cs"/>
+              </a:rPr>
+              <a:t>）</a:t>
+            </a:r>
+            <a:endParaRPr lang="en-US" altLang="zh-CN" sz="1500" b="1" spc="50" dirty="0" smtClean="0">
+              <a:ln w="12700">
+                <a:noFill/>
+                <a:prstDash val="solid"/>
+              </a:ln>
+              <a:solidFill>
+                <a:schemeClr val="accent4"/>
+              </a:solidFill>
+              <a:latin typeface="+mj-lt"/>
+              <a:ea typeface="+mj-ea"/>
+              <a:cs typeface="+mj-cs"/>
+            </a:endParaRPr>
+          </a:p>
+          <a:p>
+            <a:pPr>
+              <a:spcBef>
+                <a:spcPct val="0"/>
+              </a:spcBef>
+            </a:pPr>
+            <a:endParaRPr lang="en-US" altLang="zh-CN" sz="1500" b="1" spc="50" dirty="0" smtClean="0">
+              <a:ln w="12700">
+                <a:noFill/>
+                <a:prstDash val="solid"/>
+              </a:ln>
+              <a:solidFill>
+                <a:schemeClr val="accent4"/>
+              </a:solidFill>
+              <a:latin typeface="+mj-lt"/>
+              <a:ea typeface="+mj-ea"/>
+              <a:cs typeface="+mj-cs"/>
+            </a:endParaRPr>
+          </a:p>
+          <a:p>
+            <a:pPr marL="342900" indent="-342900">
+              <a:spcBef>
+                <a:spcPct val="0"/>
+              </a:spcBef>
+              <a:buAutoNum type="arabicPeriod"/>
+            </a:pPr>
+            <a:r>
+              <a:rPr lang="zh-CN" altLang="en-US" sz="1500" b="1" spc="50" dirty="0" smtClean="0">
+                <a:ln w="12700">
+                  <a:noFill/>
+                  <a:prstDash val="solid"/>
+                </a:ln>
+                <a:solidFill>
+                  <a:schemeClr val="accent4"/>
+                </a:solidFill>
+                <a:latin typeface="+mj-lt"/>
+                <a:ea typeface="+mj-ea"/>
+                <a:cs typeface="+mj-cs"/>
+              </a:rPr>
+              <a:t>标准</a:t>
+            </a:r>
+            <a:endParaRPr lang="en-US" altLang="zh-CN" sz="1500" b="1" spc="50" dirty="0" smtClean="0">
+              <a:ln w="12700">
+                <a:noFill/>
+                <a:prstDash val="solid"/>
+              </a:ln>
+              <a:solidFill>
+                <a:schemeClr val="accent4"/>
+              </a:solidFill>
+              <a:latin typeface="+mj-lt"/>
+              <a:ea typeface="+mj-ea"/>
+              <a:cs typeface="+mj-cs"/>
+            </a:endParaRPr>
+          </a:p>
+          <a:p>
+            <a:pPr marL="342900" indent="-342900">
+              <a:spcBef>
+                <a:spcPct val="0"/>
+              </a:spcBef>
+              <a:buAutoNum type="arabicPeriod"/>
+            </a:pPr>
+            <a:endParaRPr lang="en-US" altLang="zh-CN" sz="1500" b="1" spc="50" dirty="0" smtClean="0">
+              <a:ln w="12700">
+                <a:noFill/>
+                <a:prstDash val="solid"/>
+              </a:ln>
+              <a:solidFill>
+                <a:schemeClr val="accent4"/>
+              </a:solidFill>
+              <a:latin typeface="+mj-lt"/>
+              <a:ea typeface="+mj-ea"/>
+              <a:cs typeface="+mj-cs"/>
+            </a:endParaRPr>
+          </a:p>
+          <a:p>
+            <a:pPr marL="342900" indent="-342900">
+              <a:spcBef>
+                <a:spcPct val="0"/>
+              </a:spcBef>
+              <a:buAutoNum type="arabicPeriod"/>
+            </a:pPr>
+            <a:endParaRPr lang="en-US" altLang="zh-CN" sz="1500" b="1" spc="50" dirty="0">
+              <a:ln w="12700">
+                <a:noFill/>
+                <a:prstDash val="solid"/>
+              </a:ln>
+              <a:solidFill>
+                <a:schemeClr val="accent4"/>
+              </a:solidFill>
+              <a:latin typeface="+mj-lt"/>
+              <a:ea typeface="+mj-ea"/>
+              <a:cs typeface="+mj-cs"/>
+            </a:endParaRPr>
+          </a:p>
+          <a:p>
+            <a:pPr marL="342900" indent="-342900">
+              <a:spcBef>
+                <a:spcPct val="0"/>
+              </a:spcBef>
+              <a:buAutoNum type="arabicPeriod"/>
+            </a:pPr>
+            <a:endParaRPr lang="en-US" altLang="zh-CN" sz="1500" b="1" spc="50" dirty="0" smtClean="0">
+              <a:ln w="12700">
+                <a:noFill/>
+                <a:prstDash val="solid"/>
+              </a:ln>
+              <a:solidFill>
+                <a:schemeClr val="accent4"/>
+              </a:solidFill>
+              <a:latin typeface="+mj-lt"/>
+              <a:ea typeface="+mj-ea"/>
+              <a:cs typeface="+mj-cs"/>
+            </a:endParaRPr>
+          </a:p>
+          <a:p>
+            <a:pPr marL="342900" indent="-342900">
+              <a:spcBef>
+                <a:spcPct val="0"/>
+              </a:spcBef>
+              <a:buAutoNum type="arabicPeriod"/>
+            </a:pPr>
+            <a:endParaRPr lang="en-US" altLang="zh-CN" sz="1500" b="1" spc="50" dirty="0">
+              <a:ln w="12700">
+                <a:noFill/>
+                <a:prstDash val="solid"/>
+              </a:ln>
+              <a:solidFill>
+                <a:schemeClr val="accent4"/>
+              </a:solidFill>
+              <a:latin typeface="+mj-lt"/>
+              <a:ea typeface="+mj-ea"/>
+              <a:cs typeface="+mj-cs"/>
+            </a:endParaRPr>
+          </a:p>
+          <a:p>
+            <a:pPr marL="342900" indent="-342900">
+              <a:spcBef>
+                <a:spcPct val="0"/>
+              </a:spcBef>
+              <a:buAutoNum type="arabicPeriod"/>
+            </a:pPr>
+            <a:endParaRPr lang="en-US" altLang="zh-CN" sz="1500" b="1" spc="50" dirty="0" smtClean="0">
+              <a:ln w="12700">
+                <a:noFill/>
+                <a:prstDash val="solid"/>
+              </a:ln>
+              <a:solidFill>
+                <a:schemeClr val="accent4"/>
+              </a:solidFill>
+              <a:latin typeface="+mj-lt"/>
+              <a:ea typeface="+mj-ea"/>
+              <a:cs typeface="+mj-cs"/>
+            </a:endParaRPr>
+          </a:p>
+          <a:p>
+            <a:pPr marL="342900" indent="-342900">
+              <a:spcBef>
+                <a:spcPct val="0"/>
+              </a:spcBef>
+              <a:buAutoNum type="arabicPeriod"/>
+            </a:pPr>
+            <a:endParaRPr lang="en-US" altLang="zh-CN" sz="1500" b="1" spc="50" dirty="0">
+              <a:ln w="12700">
+                <a:noFill/>
+                <a:prstDash val="solid"/>
+              </a:ln>
+              <a:solidFill>
+                <a:schemeClr val="accent4"/>
+              </a:solidFill>
+              <a:latin typeface="+mj-lt"/>
+              <a:ea typeface="+mj-ea"/>
+              <a:cs typeface="+mj-cs"/>
+            </a:endParaRPr>
+          </a:p>
+          <a:p>
+            <a:pPr marL="342900" indent="-342900">
+              <a:spcBef>
+                <a:spcPct val="0"/>
+              </a:spcBef>
+              <a:buAutoNum type="arabicPeriod"/>
+            </a:pPr>
+            <a:endParaRPr lang="en-US" altLang="zh-CN" sz="1500" b="1" spc="50" dirty="0" smtClean="0">
+              <a:ln w="12700">
+                <a:noFill/>
+                <a:prstDash val="solid"/>
+              </a:ln>
+              <a:solidFill>
+                <a:schemeClr val="accent4"/>
+              </a:solidFill>
+              <a:latin typeface="+mj-lt"/>
+              <a:ea typeface="+mj-ea"/>
+              <a:cs typeface="+mj-cs"/>
+            </a:endParaRPr>
+          </a:p>
+          <a:p>
+            <a:pPr marL="342900" indent="-342900">
+              <a:spcBef>
+                <a:spcPct val="0"/>
+              </a:spcBef>
+              <a:buAutoNum type="arabicPeriod"/>
+            </a:pPr>
+            <a:endParaRPr lang="en-US" altLang="zh-CN" sz="1500" b="1" spc="50" dirty="0" smtClean="0">
+              <a:ln w="12700">
+                <a:noFill/>
+                <a:prstDash val="solid"/>
+              </a:ln>
+              <a:solidFill>
+                <a:schemeClr val="accent4"/>
+              </a:solidFill>
+              <a:latin typeface="+mj-lt"/>
+              <a:ea typeface="+mj-ea"/>
+              <a:cs typeface="+mj-cs"/>
+            </a:endParaRPr>
+          </a:p>
+          <a:p>
+            <a:pPr marL="342900" indent="-342900">
+              <a:spcBef>
+                <a:spcPct val="0"/>
+              </a:spcBef>
+              <a:buAutoNum type="arabicPeriod"/>
+            </a:pPr>
+            <a:r>
+              <a:rPr lang="zh-CN" altLang="en-US" sz="1500" b="1" spc="50" dirty="0" smtClean="0">
+                <a:ln w="12700">
+                  <a:noFill/>
+                  <a:prstDash val="solid"/>
+                </a:ln>
+                <a:solidFill>
+                  <a:schemeClr val="accent4"/>
+                </a:solidFill>
+                <a:latin typeface="+mj-lt"/>
+                <a:ea typeface="+mj-ea"/>
+                <a:cs typeface="+mj-cs"/>
+              </a:rPr>
+              <a:t>变体</a:t>
+            </a:r>
+            <a:endParaRPr lang="en-US" altLang="zh-CN" sz="1500" b="1" spc="50" dirty="0" smtClean="0">
+              <a:ln w="12700">
+                <a:noFill/>
+                <a:prstDash val="solid"/>
+              </a:ln>
+              <a:solidFill>
+                <a:schemeClr val="accent4"/>
+              </a:solidFill>
+              <a:latin typeface="+mj-lt"/>
+              <a:ea typeface="+mj-ea"/>
+              <a:cs typeface="+mj-cs"/>
+            </a:endParaRPr>
+          </a:p>
+          <a:p>
+            <a:pPr marL="342900" indent="-342900">
+              <a:spcBef>
+                <a:spcPct val="0"/>
+              </a:spcBef>
+              <a:buAutoNum type="arabicPeriod"/>
+            </a:pPr>
+            <a:endParaRPr lang="en-US" altLang="zh-CN" sz="1500" b="1" spc="50" dirty="0">
+              <a:ln w="12700">
+                <a:noFill/>
+                <a:prstDash val="solid"/>
+              </a:ln>
+              <a:solidFill>
+                <a:schemeClr val="accent4"/>
+              </a:solidFill>
+              <a:latin typeface="+mj-lt"/>
+              <a:ea typeface="+mj-ea"/>
+              <a:cs typeface="+mj-cs"/>
+            </a:endParaRPr>
+          </a:p>
+          <a:p>
+            <a:pPr marL="342900" indent="-342900">
+              <a:spcBef>
+                <a:spcPct val="0"/>
+              </a:spcBef>
+              <a:buAutoNum type="arabicPeriod"/>
+            </a:pPr>
+            <a:endParaRPr lang="en-US" altLang="zh-CN" sz="1500" b="1" spc="50" dirty="0" smtClean="0">
+              <a:ln w="12700">
+                <a:noFill/>
+                <a:prstDash val="solid"/>
+              </a:ln>
+              <a:solidFill>
+                <a:schemeClr val="accent4"/>
+              </a:solidFill>
+              <a:latin typeface="+mj-lt"/>
+              <a:ea typeface="+mj-ea"/>
+              <a:cs typeface="+mj-cs"/>
+            </a:endParaRPr>
+          </a:p>
+          <a:p>
+            <a:pPr marL="342900" indent="-342900">
+              <a:spcBef>
+                <a:spcPct val="0"/>
+              </a:spcBef>
+              <a:buAutoNum type="arabicPeriod"/>
+            </a:pPr>
+            <a:endParaRPr lang="en-US" altLang="zh-CN" sz="1500" b="1" spc="50" dirty="0">
+              <a:ln w="12700">
+                <a:noFill/>
+                <a:prstDash val="solid"/>
+              </a:ln>
+              <a:solidFill>
+                <a:schemeClr val="accent4"/>
+              </a:solidFill>
+              <a:latin typeface="+mj-lt"/>
+              <a:ea typeface="+mj-ea"/>
+              <a:cs typeface="+mj-cs"/>
+            </a:endParaRPr>
+          </a:p>
+          <a:p>
+            <a:pPr marL="342900" indent="-342900">
+              <a:spcBef>
+                <a:spcPct val="0"/>
+              </a:spcBef>
+              <a:buAutoNum type="arabicPeriod"/>
+            </a:pPr>
+            <a:endParaRPr lang="en-US" altLang="zh-CN" sz="1500" b="1" spc="50" dirty="0" smtClean="0">
+              <a:ln w="12700">
+                <a:noFill/>
+                <a:prstDash val="solid"/>
+              </a:ln>
+              <a:solidFill>
+                <a:schemeClr val="accent4"/>
+              </a:solidFill>
+              <a:latin typeface="+mj-lt"/>
+              <a:ea typeface="+mj-ea"/>
+              <a:cs typeface="+mj-cs"/>
+            </a:endParaRPr>
+          </a:p>
+          <a:p>
+            <a:pPr marL="342900" indent="-342900">
+              <a:spcBef>
+                <a:spcPct val="0"/>
+              </a:spcBef>
+              <a:buAutoNum type="arabicPeriod"/>
+            </a:pPr>
+            <a:endParaRPr lang="en-US" altLang="zh-CN" sz="1500" b="1" spc="50" dirty="0">
+              <a:ln w="12700">
+                <a:noFill/>
+                <a:prstDash val="solid"/>
+              </a:ln>
+              <a:solidFill>
+                <a:schemeClr val="accent4"/>
+              </a:solidFill>
+              <a:latin typeface="+mj-lt"/>
+              <a:ea typeface="+mj-ea"/>
+              <a:cs typeface="+mj-cs"/>
+            </a:endParaRPr>
+          </a:p>
+          <a:p>
+            <a:pPr marL="342900" indent="-342900">
+              <a:spcBef>
+                <a:spcPct val="0"/>
+              </a:spcBef>
+              <a:buAutoNum type="arabicPeriod"/>
+            </a:pPr>
+            <a:endParaRPr lang="en-US" altLang="zh-CN" sz="1500" b="1" spc="50" dirty="0" smtClean="0">
+              <a:ln w="12700">
+                <a:noFill/>
+                <a:prstDash val="solid"/>
+              </a:ln>
+              <a:solidFill>
+                <a:schemeClr val="accent4"/>
+              </a:solidFill>
+              <a:latin typeface="+mj-lt"/>
+              <a:ea typeface="+mj-ea"/>
+              <a:cs typeface="+mj-cs"/>
+            </a:endParaRPr>
+          </a:p>
+          <a:p>
+            <a:pPr marL="342900" indent="-342900">
+              <a:spcBef>
+                <a:spcPct val="0"/>
+              </a:spcBef>
+              <a:buAutoNum type="arabicPeriod"/>
+            </a:pPr>
+            <a:endParaRPr lang="en-US" altLang="zh-CN" sz="1500" b="1" spc="50" dirty="0">
+              <a:ln w="12700">
+                <a:noFill/>
+                <a:prstDash val="solid"/>
+              </a:ln>
+              <a:solidFill>
+                <a:schemeClr val="accent4"/>
+              </a:solidFill>
+              <a:latin typeface="+mj-lt"/>
+              <a:ea typeface="+mj-ea"/>
+              <a:cs typeface="+mj-cs"/>
+            </a:endParaRPr>
+          </a:p>
+          <a:p>
+            <a:pPr marL="342900" indent="-342900">
+              <a:spcBef>
+                <a:spcPct val="0"/>
+              </a:spcBef>
+              <a:buAutoNum type="arabicPeriod"/>
+            </a:pPr>
+            <a:endParaRPr lang="en-US" altLang="zh-CN" sz="1500" b="1" spc="50" dirty="0" smtClean="0">
+              <a:ln w="12700">
+                <a:noFill/>
+                <a:prstDash val="solid"/>
+              </a:ln>
+              <a:solidFill>
+                <a:schemeClr val="accent4"/>
+              </a:solidFill>
+              <a:latin typeface="+mj-lt"/>
+              <a:ea typeface="+mj-ea"/>
+              <a:cs typeface="+mj-cs"/>
+            </a:endParaRPr>
+          </a:p>
+          <a:p>
+            <a:pPr marL="342900" indent="-342900">
+              <a:spcBef>
+                <a:spcPct val="0"/>
+              </a:spcBef>
+              <a:buAutoNum type="arabicPeriod"/>
+            </a:pPr>
+            <a:endParaRPr lang="en-US" altLang="zh-CN" sz="1500" b="1" spc="50" dirty="0" smtClean="0">
+              <a:ln w="12700">
+                <a:noFill/>
+                <a:prstDash val="solid"/>
+              </a:ln>
+              <a:solidFill>
+                <a:schemeClr val="accent4"/>
+              </a:solidFill>
+              <a:latin typeface="+mj-lt"/>
+              <a:ea typeface="+mj-ea"/>
+              <a:cs typeface="+mj-cs"/>
+            </a:endParaRPr>
+          </a:p>
+        </p:txBody>
+      </p:sp>
+      <p:sp>
+        <p:nvSpPr>
+          <p:cNvPr id="4" name="Rectangle 2"/>
+          <p:cNvSpPr txBox="1">
+            <a:spLocks noChangeArrowheads="1"/>
+          </p:cNvSpPr>
+          <p:nvPr/>
+        </p:nvSpPr>
+        <p:spPr>
+          <a:xfrm>
+            <a:off x="628650" y="365127"/>
+            <a:ext cx="7886700" cy="1119658"/>
+          </a:xfrm>
+          <a:prstGeom prst="rect">
+            <a:avLst/>
+          </a:prstGeom>
+        </p:spPr>
+        <p:txBody>
+          <a:bodyPr vert="horz" lIns="91440" tIns="45720" rIns="91440" bIns="45720" rtlCol="0" anchor="ctr">
+            <a:normAutofit/>
+          </a:bodyPr>
+          <a:lstStyle>
+            <a:lvl1pPr algn="ctr" defTabSz="914400" rtl="0" eaLnBrk="1" latinLnBrk="0" hangingPunct="1">
+              <a:spcBef>
+                <a:spcPct val="0"/>
+              </a:spcBef>
+              <a:buNone/>
+              <a:defRPr sz="4400" kern="1200">
+                <a:solidFill>
+                  <a:schemeClr val="tx1"/>
+                </a:solidFill>
+                <a:latin typeface="+mj-lt"/>
+                <a:ea typeface="+mj-ea"/>
+                <a:cs typeface="+mj-cs"/>
+              </a:defRPr>
+            </a:lvl1pPr>
+          </a:lstStyle>
+          <a:p>
+            <a:r>
+              <a:rPr lang="en-US" altLang="zh-CN" dirty="0" smtClean="0"/>
+              <a:t>Factory Method</a:t>
+            </a:r>
+            <a:endParaRPr lang="zh-CN" altLang="en-US" dirty="0"/>
+          </a:p>
+        </p:txBody>
+      </p:sp>
+      <p:pic>
+        <p:nvPicPr>
+          <p:cNvPr id="2053" name="Picture 5"/>
+          <p:cNvPicPr>
+            <a:picLocks noChangeAspect="1" noChangeArrowheads="1"/>
+          </p:cNvPicPr>
+          <p:nvPr/>
+        </p:nvPicPr>
+        <p:blipFill>
+          <a:blip r:embed="rId2">
+            <a:extLst>
+              <a:ext uri="{28A0092B-C50C-407E-A947-70E740481C1C}">
+                <a14:useLocalDpi xmlns:a14="http://schemas.microsoft.com/office/drawing/2010/main" val="0"/>
+              </a:ext>
+            </a:extLst>
+          </a:blip>
+          <a:srcRect/>
+          <a:stretch>
+            <a:fillRect/>
+          </a:stretch>
+        </p:blipFill>
+        <p:spPr bwMode="auto">
+          <a:xfrm>
+            <a:off x="1081658" y="4437112"/>
+            <a:ext cx="6154638" cy="1818416"/>
+          </a:xfrm>
+          <a:prstGeom prst="rect">
+            <a:avLst/>
+          </a:prstGeom>
+          <a:noFill/>
+          <a:ln>
+            <a:noFill/>
+          </a:ln>
+          <a:effectLst/>
+          <a:extLst>
+            <a:ext uri="{909E8E84-426E-40DD-AFC4-6F175D3DCCD1}">
+              <a14:hiddenFill xmlns:a14="http://schemas.microsoft.com/office/drawing/2010/main">
+                <a:solidFill>
+                  <a:schemeClr val="accent1"/>
+                </a:solidFill>
+              </a14:hiddenFill>
+            </a:ext>
+            <a:ext uri="{91240B29-F687-4F45-9708-019B960494DF}">
+              <a14:hiddenLine xmlns:a14="http://schemas.microsoft.com/office/drawing/2010/main" w="9525">
+                <a:solidFill>
+                  <a:schemeClr val="tx1"/>
+                </a:solidFill>
+                <a:miter lim="800000"/>
+                <a:headEnd/>
+                <a:tailEnd/>
+              </a14:hiddenLine>
+            </a:ext>
+            <a:ext uri="{AF507438-7753-43E0-B8FC-AC1667EBCBE1}">
+              <a14:hiddenEffects xmlns:a14="http://schemas.microsoft.com/office/drawing/2010/main">
+                <a:effectLst>
+                  <a:outerShdw dist="35921" dir="2700000" algn="ctr" rotWithShape="0">
+                    <a:schemeClr val="bg2"/>
+                  </a:outerShdw>
+                </a:effectLst>
+              </a14:hiddenEffects>
+            </a:ext>
+          </a:extLst>
+        </p:spPr>
+      </p:pic>
+      <p:pic>
+        <p:nvPicPr>
+          <p:cNvPr id="2054" name="Picture 6"/>
+          <p:cNvPicPr>
+            <a:picLocks noChangeAspect="1" noChangeArrowheads="1"/>
+          </p:cNvPicPr>
+          <p:nvPr/>
+        </p:nvPicPr>
+        <p:blipFill>
+          <a:blip r:embed="rId3">
+            <a:extLst>
+              <a:ext uri="{28A0092B-C50C-407E-A947-70E740481C1C}">
+                <a14:useLocalDpi xmlns:a14="http://schemas.microsoft.com/office/drawing/2010/main" val="0"/>
+              </a:ext>
+            </a:extLst>
+          </a:blip>
+          <a:srcRect/>
+          <a:stretch>
+            <a:fillRect/>
+          </a:stretch>
+        </p:blipFill>
+        <p:spPr bwMode="auto">
+          <a:xfrm>
+            <a:off x="1115617" y="2380589"/>
+            <a:ext cx="3672407" cy="1768491"/>
+          </a:xfrm>
+          <a:prstGeom prst="rect">
+            <a:avLst/>
+          </a:prstGeom>
+          <a:noFill/>
+          <a:ln>
+            <a:noFill/>
+          </a:ln>
+          <a:effectLst/>
+          <a:extLst>
+            <a:ext uri="{909E8E84-426E-40DD-AFC4-6F175D3DCCD1}">
+              <a14:hiddenFill xmlns:a14="http://schemas.microsoft.com/office/drawing/2010/main">
+                <a:solidFill>
+                  <a:schemeClr val="accent1"/>
+                </a:solidFill>
+              </a14:hiddenFill>
+            </a:ext>
+            <a:ext uri="{91240B29-F687-4F45-9708-019B960494DF}">
+              <a14:hiddenLine xmlns:a14="http://schemas.microsoft.com/office/drawing/2010/main" w="9525">
+                <a:solidFill>
+                  <a:schemeClr val="tx1"/>
+                </a:solidFill>
+                <a:miter lim="800000"/>
+                <a:headEnd/>
+                <a:tailEnd/>
+              </a14:hiddenLine>
+            </a:ext>
+            <a:ext uri="{AF507438-7753-43E0-B8FC-AC1667EBCBE1}">
+              <a14:hiddenEffects xmlns:a14="http://schemas.microsoft.com/office/drawing/2010/main">
+                <a:effectLst>
+                  <a:outerShdw dist="35921" dir="2700000" algn="ctr" rotWithShape="0">
+                    <a:schemeClr val="bg2"/>
+                  </a:outerShdw>
+                </a:effectLst>
+              </a14:hiddenEffects>
+            </a:ext>
+          </a:extLst>
+        </p:spPr>
+      </p:pic>
+      <p:sp>
+        <p:nvSpPr>
+          <p:cNvPr id="10" name="TextBox 9"/>
+          <p:cNvSpPr txBox="1"/>
+          <p:nvPr/>
+        </p:nvSpPr>
+        <p:spPr>
+          <a:xfrm>
+            <a:off x="3203848" y="5805264"/>
+            <a:ext cx="2304256" cy="338554"/>
+          </a:xfrm>
+          <a:prstGeom prst="rect">
+            <a:avLst/>
+          </a:prstGeom>
+          <a:noFill/>
+        </p:spPr>
+        <p:txBody>
+          <a:bodyPr wrap="square" rtlCol="0">
+            <a:spAutoFit/>
+          </a:bodyPr>
+          <a:lstStyle/>
+          <a:p>
+            <a:r>
+              <a:rPr lang="zh-CN" altLang="en-US" sz="1600" b="1" spc="50" dirty="0">
+                <a:ln w="12700">
+                  <a:noFill/>
+                  <a:prstDash val="solid"/>
+                </a:ln>
+                <a:solidFill>
+                  <a:schemeClr val="accent4"/>
+                </a:solidFill>
+                <a:latin typeface="+mj-lt"/>
+                <a:ea typeface="+mj-ea"/>
+                <a:cs typeface="+mj-cs"/>
+              </a:rPr>
+              <a:t>具体实现，参考代码</a:t>
+            </a:r>
+            <a:endParaRPr lang="en-US" sz="1600" b="1" spc="50" dirty="0">
+              <a:ln w="12700">
+                <a:noFill/>
+                <a:prstDash val="solid"/>
+              </a:ln>
+              <a:solidFill>
+                <a:schemeClr val="accent4"/>
+              </a:solidFill>
+              <a:latin typeface="+mj-lt"/>
+              <a:ea typeface="+mj-ea"/>
+              <a:cs typeface="+mj-cs"/>
+            </a:endParaRPr>
+          </a:p>
+        </p:txBody>
+      </p:sp>
+    </p:spTree>
+    <p:extLst>
+      <p:ext uri="{BB962C8B-B14F-4D97-AF65-F5344CB8AC3E}">
+        <p14:creationId xmlns:p14="http://schemas.microsoft.com/office/powerpoint/2010/main" val="2497239647"/>
+      </p:ext>
+    </p:extLst>
+  </p:cSld>
+  <p:clrMapOvr>
+    <a:masterClrMapping/>
+  </p:clrMapOvr>
+  <p:timing>
+    <p:tnLst>
+      <p:par>
+        <p:cTn id="1" dur="indefinite" restart="never" nodeType="tmRoot"/>
+      </p:par>
+    </p:tnLst>
+  </p:timing>
+</p:sld>
+</file>
+
+<file path=ppt/slides/slide21.xml><?xml version="1.0" encoding="utf-8"?>
+<p:sld xmlns:a="http://schemas.openxmlformats.org/drawingml/2006/main" xmlns:r="http://schemas.openxmlformats.org/officeDocument/2006/relationships" xmlns:p="http://schemas.openxmlformats.org/presentationml/2006/main">
+  <p:cSld>
+    <p:spTree>
+      <p:nvGrpSpPr>
+        <p:cNvPr id="1" name=""/>
+        <p:cNvGrpSpPr/>
+        <p:nvPr/>
+      </p:nvGrpSpPr>
+      <p:grpSpPr>
+        <a:xfrm>
+          <a:off x="0" y="0"/>
+          <a:ext cx="0" cy="0"/>
+          <a:chOff x="0" y="0"/>
+          <a:chExt cx="0" cy="0"/>
+        </a:xfrm>
+      </p:grpSpPr>
+      <p:sp>
+        <p:nvSpPr>
+          <p:cNvPr id="2" name="Rectangle 1"/>
+          <p:cNvSpPr>
+            <a:spLocks noChangeArrowheads="1"/>
+          </p:cNvSpPr>
+          <p:nvPr/>
+        </p:nvSpPr>
+        <p:spPr bwMode="auto">
+          <a:xfrm>
+            <a:off x="539552" y="612994"/>
+            <a:ext cx="6192688" cy="738664"/>
+          </a:xfrm>
+          <a:prstGeom prst="rect">
+            <a:avLst/>
+          </a:prstGeom>
+          <a:noFill/>
+          <a:ln>
+            <a:noFill/>
+          </a:ln>
+          <a:effectLst/>
+          <a:extLst>
+            <a:ext uri="{909E8E84-426E-40DD-AFC4-6F175D3DCCD1}">
+              <a14:hiddenFill xmlns:a14="http://schemas.microsoft.com/office/drawing/2010/main">
+                <a:solidFill>
+                  <a:schemeClr val="accent1"/>
+                </a:solidFill>
+              </a14:hiddenFill>
+            </a:ext>
+            <a:ext uri="{91240B29-F687-4F45-9708-019B960494DF}">
+              <a14:hiddenLine xmlns:a14="http://schemas.microsoft.com/office/drawing/2010/main" w="9525">
+                <a:solidFill>
+                  <a:schemeClr val="tx1"/>
+                </a:solidFill>
+                <a:miter lim="800000"/>
+                <a:headEnd/>
+                <a:tailEnd/>
+              </a14:hiddenLine>
+            </a:ext>
+            <a:ext uri="{AF507438-7753-43E0-B8FC-AC1667EBCBE1}">
+              <a14:hiddenEffects xmlns:a14="http://schemas.microsoft.com/office/drawing/2010/main">
+                <a:effectLst>
+                  <a:outerShdw dist="35921" dir="2700000" algn="ctr" rotWithShape="0">
+                    <a:schemeClr val="bg2"/>
+                  </a:outerShdw>
+                </a:effectLst>
+              </a14:hiddenEffects>
+            </a:ext>
+          </a:extLst>
+        </p:spPr>
+        <p:txBody>
+          <a:bodyPr vert="horz" wrap="square" lIns="91440" tIns="45720" rIns="91440" bIns="45720" numCol="1" anchor="ctr" anchorCtr="0" compatLnSpc="1">
+            <a:prstTxWarp prst="textNoShape">
+              <a:avLst/>
+            </a:prstTxWarp>
+            <a:spAutoFit/>
+          </a:bodyPr>
+          <a:lstStyle/>
+          <a:p>
+            <a:pPr marL="0" marR="0" lvl="0" indent="0" algn="l" defTabSz="914400" rtl="0" eaLnBrk="1" fontAlgn="base" latinLnBrk="0" hangingPunct="1">
+              <a:lnSpc>
+                <a:spcPct val="100000"/>
+              </a:lnSpc>
+              <a:spcBef>
+                <a:spcPct val="0"/>
+              </a:spcBef>
+              <a:spcAft>
+                <a:spcPct val="0"/>
+              </a:spcAft>
+              <a:buClrTx/>
+              <a:buSzTx/>
+              <a:buFontTx/>
+              <a:buNone/>
+              <a:tabLst/>
+            </a:pPr>
+            <a:r>
+              <a:rPr kumimoji="0" lang="zh-CN" sz="1000" b="1" i="0" u="none" strike="noStrike" cap="none" normalizeH="0" baseline="0" dirty="0" smtClean="0">
+                <a:ln>
+                  <a:noFill/>
+                </a:ln>
+                <a:solidFill>
+                  <a:srgbClr val="000000"/>
+                </a:solidFill>
+                <a:effectLst/>
+                <a:latin typeface="Verdana" pitchFamily="34" charset="0"/>
+                <a:cs typeface="Calibri" pitchFamily="34" charset="0"/>
+              </a:rPr>
+              <a:t>工厂方法</a:t>
+            </a:r>
+            <a:r>
+              <a:rPr kumimoji="0" lang="zh-CN" sz="1000" b="0" i="0" u="none" strike="noStrike" cap="none" normalizeH="0" baseline="0" dirty="0" smtClean="0">
+                <a:ln>
+                  <a:noFill/>
+                </a:ln>
+                <a:solidFill>
+                  <a:srgbClr val="000000"/>
+                </a:solidFill>
+                <a:effectLst/>
+                <a:latin typeface="Verdana" pitchFamily="34" charset="0"/>
+                <a:cs typeface="Calibri" pitchFamily="34" charset="0"/>
+              </a:rPr>
+              <a:t> </a:t>
+            </a:r>
+            <a:endParaRPr kumimoji="0" lang="en-US" altLang="zh-CN" sz="1000" b="0" i="0" u="none" strike="noStrike" cap="none" normalizeH="0" baseline="0" dirty="0" smtClean="0">
+              <a:ln>
+                <a:noFill/>
+              </a:ln>
+              <a:solidFill>
+                <a:srgbClr val="000000"/>
+              </a:solidFill>
+              <a:effectLst/>
+              <a:latin typeface="Verdana" pitchFamily="34" charset="0"/>
+              <a:cs typeface="Calibri" pitchFamily="34" charset="0"/>
+            </a:endParaRPr>
+          </a:p>
+          <a:p>
+            <a:pPr marL="0" marR="0" lvl="0" indent="0" algn="l" defTabSz="914400" rtl="0" eaLnBrk="1" fontAlgn="base" latinLnBrk="0" hangingPunct="1">
+              <a:lnSpc>
+                <a:spcPct val="100000"/>
+              </a:lnSpc>
+              <a:spcBef>
+                <a:spcPct val="0"/>
+              </a:spcBef>
+              <a:spcAft>
+                <a:spcPct val="0"/>
+              </a:spcAft>
+              <a:buClrTx/>
+              <a:buSzTx/>
+              <a:buFontTx/>
+              <a:buNone/>
+              <a:tabLst/>
+            </a:pPr>
+            <a:endParaRPr kumimoji="0" lang="zh-CN" sz="1100" b="0" i="0" u="none" strike="noStrike" cap="none" normalizeH="0" baseline="0" dirty="0" smtClean="0">
+              <a:ln>
+                <a:noFill/>
+              </a:ln>
+              <a:solidFill>
+                <a:srgbClr val="000000"/>
+              </a:solidFill>
+              <a:effectLst/>
+              <a:latin typeface="Calibri" pitchFamily="34" charset="0"/>
+              <a:cs typeface="Calibri" pitchFamily="34" charset="0"/>
+            </a:endParaRPr>
+          </a:p>
+          <a:p>
+            <a:pPr marL="0" marR="0" lvl="0" indent="0" algn="l" defTabSz="914400" rtl="0" eaLnBrk="0" fontAlgn="base" latinLnBrk="0" hangingPunct="0">
+              <a:lnSpc>
+                <a:spcPct val="100000"/>
+              </a:lnSpc>
+              <a:spcBef>
+                <a:spcPct val="0"/>
+              </a:spcBef>
+              <a:spcAft>
+                <a:spcPct val="0"/>
+              </a:spcAft>
+              <a:buClrTx/>
+              <a:buSzTx/>
+              <a:buFontTx/>
+              <a:buNone/>
+              <a:tabLst/>
+            </a:pPr>
+            <a:r>
+              <a:rPr kumimoji="0" lang="zh-CN" sz="1000" b="0" i="0" u="none" strike="noStrike" cap="none" normalizeH="0" baseline="0" dirty="0" smtClean="0">
+                <a:ln>
+                  <a:noFill/>
+                </a:ln>
+                <a:solidFill>
+                  <a:srgbClr val="000000"/>
+                </a:solidFill>
+                <a:effectLst/>
+                <a:latin typeface="Verdana" pitchFamily="34" charset="0"/>
+                <a:cs typeface="Calibri" pitchFamily="34" charset="0"/>
+              </a:rPr>
+              <a:t>工厂方法是针对每一种产品提供一个工厂类。通过不同的工厂实例来创建不同的产品实例。</a:t>
+            </a:r>
+            <a:endParaRPr kumimoji="0" lang="zh-CN" sz="1100" b="0" i="0" u="none" strike="noStrike" cap="none" normalizeH="0" baseline="0" dirty="0" smtClean="0">
+              <a:ln>
+                <a:noFill/>
+              </a:ln>
+              <a:solidFill>
+                <a:srgbClr val="000000"/>
+              </a:solidFill>
+              <a:effectLst/>
+              <a:latin typeface="Calibri" pitchFamily="34" charset="0"/>
+              <a:cs typeface="Calibri" pitchFamily="34" charset="0"/>
+            </a:endParaRPr>
+          </a:p>
+          <a:p>
+            <a:pPr marL="0" marR="0" lvl="0" indent="0" algn="l" defTabSz="914400" rtl="0" eaLnBrk="0" fontAlgn="base" latinLnBrk="0" hangingPunct="0">
+              <a:lnSpc>
+                <a:spcPct val="100000"/>
+              </a:lnSpc>
+              <a:spcBef>
+                <a:spcPct val="0"/>
+              </a:spcBef>
+              <a:spcAft>
+                <a:spcPct val="0"/>
+              </a:spcAft>
+              <a:buClrTx/>
+              <a:buSzTx/>
+              <a:buFontTx/>
+              <a:buNone/>
+              <a:tabLst/>
+            </a:pPr>
+            <a:r>
+              <a:rPr kumimoji="0" lang="zh-CN" sz="1000" b="0" i="0" u="none" strike="noStrike" cap="none" normalizeH="0" baseline="0" dirty="0" smtClean="0">
+                <a:ln>
+                  <a:noFill/>
+                </a:ln>
+                <a:solidFill>
+                  <a:srgbClr val="000000"/>
+                </a:solidFill>
+                <a:effectLst/>
+                <a:latin typeface="Verdana" pitchFamily="34" charset="0"/>
+                <a:cs typeface="Calibri" pitchFamily="34" charset="0"/>
+              </a:rPr>
+              <a:t>在同一等级结构中，支持增加任意产品</a:t>
+            </a:r>
+            <a:r>
+              <a:rPr kumimoji="0" lang="zh-CN" sz="1000" b="0" i="0" u="none" strike="noStrike" cap="none" normalizeH="0" baseline="0" dirty="0" smtClean="0">
+                <a:ln>
+                  <a:noFill/>
+                </a:ln>
+                <a:solidFill>
+                  <a:srgbClr val="000000"/>
+                </a:solidFill>
+                <a:effectLst/>
+                <a:latin typeface="Verdana" pitchFamily="34" charset="0"/>
+                <a:cs typeface="Calibri" pitchFamily="34" charset="0"/>
+              </a:rPr>
+              <a:t>。</a:t>
+            </a:r>
+            <a:r>
+              <a:rPr kumimoji="0" lang="zh-CN" sz="1100" b="0" i="0" u="none" strike="noStrike" cap="none" normalizeH="0" baseline="0" dirty="0" smtClean="0">
+                <a:ln>
+                  <a:noFill/>
+                </a:ln>
+                <a:solidFill>
+                  <a:srgbClr val="000000"/>
+                </a:solidFill>
+                <a:effectLst/>
+                <a:latin typeface="Calibri" pitchFamily="34" charset="0"/>
+                <a:cs typeface="Calibri" pitchFamily="34" charset="0"/>
+              </a:rPr>
+              <a:t>  </a:t>
+            </a:r>
+            <a:endParaRPr kumimoji="0" lang="zh-CN" sz="26200" b="0" i="0" u="none" strike="noStrike" cap="none" normalizeH="0" baseline="0" dirty="0" smtClean="0">
+              <a:ln>
+                <a:noFill/>
+              </a:ln>
+              <a:solidFill>
+                <a:srgbClr val="000000"/>
+              </a:solidFill>
+              <a:effectLst/>
+              <a:latin typeface="Calibri" pitchFamily="34" charset="0"/>
+              <a:cs typeface="Calibri" pitchFamily="34" charset="0"/>
+            </a:endParaRPr>
+          </a:p>
+        </p:txBody>
+      </p:sp>
+      <p:pic>
+        <p:nvPicPr>
+          <p:cNvPr id="5122" name="Picture 2"/>
+          <p:cNvPicPr>
+            <a:picLocks noChangeAspect="1" noChangeArrowheads="1"/>
+          </p:cNvPicPr>
+          <p:nvPr/>
+        </p:nvPicPr>
+        <p:blipFill>
+          <a:blip r:embed="rId2">
+            <a:extLst>
+              <a:ext uri="{28A0092B-C50C-407E-A947-70E740481C1C}">
+                <a14:useLocalDpi xmlns:a14="http://schemas.microsoft.com/office/drawing/2010/main" val="0"/>
+              </a:ext>
+            </a:extLst>
+          </a:blip>
+          <a:srcRect/>
+          <a:stretch>
+            <a:fillRect/>
+          </a:stretch>
+        </p:blipFill>
+        <p:spPr bwMode="auto">
+          <a:xfrm>
+            <a:off x="467544" y="1431603"/>
+            <a:ext cx="6298065" cy="2285429"/>
+          </a:xfrm>
+          <a:prstGeom prst="rect">
+            <a:avLst/>
+          </a:prstGeom>
+          <a:noFill/>
+          <a:ln>
+            <a:noFill/>
+          </a:ln>
+          <a:effectLst/>
+          <a:extLst>
+            <a:ext uri="{909E8E84-426E-40DD-AFC4-6F175D3DCCD1}">
+              <a14:hiddenFill xmlns:a14="http://schemas.microsoft.com/office/drawing/2010/main">
+                <a:solidFill>
+                  <a:schemeClr val="accent1"/>
+                </a:solidFill>
+              </a14:hiddenFill>
+            </a:ext>
+            <a:ext uri="{91240B29-F687-4F45-9708-019B960494DF}">
+              <a14:hiddenLine xmlns:a14="http://schemas.microsoft.com/office/drawing/2010/main" w="9525">
+                <a:solidFill>
+                  <a:schemeClr val="tx1"/>
+                </a:solidFill>
+                <a:miter lim="800000"/>
+                <a:headEnd/>
+                <a:tailEnd/>
+              </a14:hiddenLine>
+            </a:ext>
+            <a:ext uri="{AF507438-7753-43E0-B8FC-AC1667EBCBE1}">
+              <a14:hiddenEffects xmlns:a14="http://schemas.microsoft.com/office/drawing/2010/main">
+                <a:effectLst>
+                  <a:outerShdw dist="35921" dir="2700000" algn="ctr" rotWithShape="0">
+                    <a:schemeClr val="bg2"/>
+                  </a:outerShdw>
+                </a:effectLst>
+              </a14:hiddenEffects>
+            </a:ext>
+          </a:extLst>
+        </p:spPr>
+      </p:pic>
+    </p:spTree>
+    <p:extLst>
+      <p:ext uri="{BB962C8B-B14F-4D97-AF65-F5344CB8AC3E}">
+        <p14:creationId xmlns:p14="http://schemas.microsoft.com/office/powerpoint/2010/main" val="1297659525"/>
+      </p:ext>
+    </p:extLst>
+  </p:cSld>
+  <p:clrMapOvr>
+    <a:masterClrMapping/>
+  </p:clrMapOvr>
+  <p:timing>
+    <p:tnLst>
+      <p:par>
+        <p:cTn id="1" dur="indefinite" restart="never" nodeType="tmRoot"/>
+      </p:par>
+    </p:tnLst>
+  </p:timing>
+</p:sld>
+</file>
+
+<file path=ppt/slides/slide22.xml><?xml version="1.0" encoding="utf-8"?>
+<p:sld xmlns:a="http://schemas.openxmlformats.org/drawingml/2006/main" xmlns:r="http://schemas.openxmlformats.org/officeDocument/2006/relationships" xmlns:p="http://schemas.openxmlformats.org/presentationml/2006/main">
+  <p:cSld>
+    <p:spTree>
+      <p:nvGrpSpPr>
+        <p:cNvPr id="1" name=""/>
+        <p:cNvGrpSpPr/>
+        <p:nvPr/>
+      </p:nvGrpSpPr>
+      <p:grpSpPr>
+        <a:xfrm>
+          <a:off x="0" y="0"/>
+          <a:ext cx="0" cy="0"/>
+          <a:chOff x="0" y="0"/>
+          <a:chExt cx="0" cy="0"/>
+        </a:xfrm>
+      </p:grpSpPr>
+      <p:sp>
+        <p:nvSpPr>
           <p:cNvPr id="2" name="Rectangle 1"/>
           <p:cNvSpPr>
             <a:spLocks noChangeArrowheads="1"/>
@@ -9810,7 +11069,7 @@
 </p:sld>
 </file>
 
-<file path=ppt/slides/slide21.xml><?xml version="1.0" encoding="utf-8"?>
+<file path=ppt/slides/slide23.xml><?xml version="1.0" encoding="utf-8"?>
 <p:sld xmlns:a="http://schemas.openxmlformats.org/drawingml/2006/main" xmlns:r="http://schemas.openxmlformats.org/officeDocument/2006/relationships" xmlns:p="http://schemas.openxmlformats.org/presentationml/2006/main">
   <p:cSld>
     <p:spTree>
@@ -9996,7 +11255,7 @@
 </p:sld>
 </file>
 
-<file path=ppt/slides/slide22.xml><?xml version="1.0" encoding="utf-8"?>
+<file path=ppt/slides/slide24.xml><?xml version="1.0" encoding="utf-8"?>
 <p:sld xmlns:a="http://schemas.openxmlformats.org/drawingml/2006/main" xmlns:r="http://schemas.openxmlformats.org/officeDocument/2006/relationships" xmlns:p="http://schemas.openxmlformats.org/presentationml/2006/main">
   <p:cSld>
     <p:spTree>
@@ -10277,7 +11536,7 @@
 </p:sld>
 </file>
 
-<file path=ppt/slides/slide23.xml><?xml version="1.0" encoding="utf-8"?>
+<file path=ppt/slides/slide25.xml><?xml version="1.0" encoding="utf-8"?>
 <p:sld xmlns:a="http://schemas.openxmlformats.org/drawingml/2006/main" xmlns:r="http://schemas.openxmlformats.org/officeDocument/2006/relationships" xmlns:p="http://schemas.openxmlformats.org/presentationml/2006/main">
   <p:cSld>
     <p:spTree>
@@ -10358,148 +11617,6 @@
     <p:extLst>
       <p:ext uri="{BB962C8B-B14F-4D97-AF65-F5344CB8AC3E}">
         <p14:creationId xmlns:p14="http://schemas.microsoft.com/office/powerpoint/2010/main" val="2747582457"/>
-      </p:ext>
-    </p:extLst>
-  </p:cSld>
-  <p:clrMapOvr>
-    <a:masterClrMapping/>
-  </p:clrMapOvr>
-  <p:timing>
-    <p:tnLst>
-      <p:par>
-        <p:cTn id="1" dur="indefinite" restart="never" nodeType="tmRoot"/>
-      </p:par>
-    </p:tnLst>
-  </p:timing>
-</p:sld>
-</file>
-
-<file path=ppt/slides/slide24.xml><?xml version="1.0" encoding="utf-8"?>
-<p:sld xmlns:a="http://schemas.openxmlformats.org/drawingml/2006/main" xmlns:r="http://schemas.openxmlformats.org/officeDocument/2006/relationships" xmlns:p="http://schemas.openxmlformats.org/presentationml/2006/main">
-  <p:cSld>
-    <p:spTree>
-      <p:nvGrpSpPr>
-        <p:cNvPr id="1" name=""/>
-        <p:cNvGrpSpPr/>
-        <p:nvPr/>
-      </p:nvGrpSpPr>
-      <p:grpSpPr>
-        <a:xfrm>
-          <a:off x="0" y="0"/>
-          <a:ext cx="0" cy="0"/>
-          <a:chOff x="0" y="0"/>
-          <a:chExt cx="0" cy="0"/>
-        </a:xfrm>
-      </p:grpSpPr>
-      <p:sp>
-        <p:nvSpPr>
-          <p:cNvPr id="72711" name="Rectangle 7"/>
-          <p:cNvSpPr>
-            <a:spLocks noGrp="1" noChangeArrowheads="1"/>
-          </p:cNvSpPr>
-          <p:nvPr>
-            <p:ph type="ctrTitle"/>
-          </p:nvPr>
-        </p:nvSpPr>
-        <p:spPr>
-          <a:xfrm>
-            <a:off x="1043608" y="548680"/>
-            <a:ext cx="6858000" cy="794469"/>
-          </a:xfrm>
-          <a:noFill/>
-          <a:ln/>
-        </p:spPr>
-        <p:txBody>
-          <a:bodyPr/>
-          <a:lstStyle/>
-          <a:p>
-            <a:r>
-              <a:rPr lang="en-US" altLang="zh-CN" dirty="0" smtClean="0">
-                <a:ea typeface="宋体" pitchFamily="2" charset="-122"/>
-              </a:rPr>
-              <a:t>Q &amp; A</a:t>
-            </a:r>
-            <a:endParaRPr lang="en-US" altLang="zh-CN" sz="5400" dirty="0">
-              <a:ea typeface="宋体" pitchFamily="2" charset="-122"/>
-            </a:endParaRPr>
-          </a:p>
-        </p:txBody>
-      </p:sp>
-    </p:spTree>
-    <p:extLst>
-      <p:ext uri="{BB962C8B-B14F-4D97-AF65-F5344CB8AC3E}">
-        <p14:creationId xmlns:p14="http://schemas.microsoft.com/office/powerpoint/2010/main" val="1851072900"/>
-      </p:ext>
-    </p:extLst>
-  </p:cSld>
-  <p:clrMapOvr>
-    <a:masterClrMapping/>
-  </p:clrMapOvr>
-  <p:timing>
-    <p:tnLst>
-      <p:par>
-        <p:cTn id="1" dur="indefinite" restart="never" nodeType="tmRoot"/>
-      </p:par>
-    </p:tnLst>
-  </p:timing>
-</p:sld>
-</file>
-
-<file path=ppt/slides/slide25.xml><?xml version="1.0" encoding="utf-8"?>
-<p:sld xmlns:a="http://schemas.openxmlformats.org/drawingml/2006/main" xmlns:r="http://schemas.openxmlformats.org/officeDocument/2006/relationships" xmlns:p="http://schemas.openxmlformats.org/presentationml/2006/main">
-  <p:cSld>
-    <p:spTree>
-      <p:nvGrpSpPr>
-        <p:cNvPr id="1" name=""/>
-        <p:cNvGrpSpPr/>
-        <p:nvPr/>
-      </p:nvGrpSpPr>
-      <p:grpSpPr>
-        <a:xfrm>
-          <a:off x="0" y="0"/>
-          <a:ext cx="0" cy="0"/>
-          <a:chOff x="0" y="0"/>
-          <a:chExt cx="0" cy="0"/>
-        </a:xfrm>
-      </p:grpSpPr>
-      <p:sp>
-        <p:nvSpPr>
-          <p:cNvPr id="72711" name="Rectangle 7"/>
-          <p:cNvSpPr>
-            <a:spLocks noGrp="1" noChangeArrowheads="1"/>
-          </p:cNvSpPr>
-          <p:nvPr>
-            <p:ph type="ctrTitle"/>
-          </p:nvPr>
-        </p:nvSpPr>
-        <p:spPr>
-          <a:xfrm>
-            <a:off x="1043608" y="548680"/>
-            <a:ext cx="6858000" cy="794469"/>
-          </a:xfrm>
-          <a:noFill/>
-          <a:ln/>
-        </p:spPr>
-        <p:txBody>
-          <a:bodyPr/>
-          <a:lstStyle/>
-          <a:p>
-            <a:r>
-              <a:rPr lang="en-US" altLang="zh-CN" dirty="0" smtClean="0">
-                <a:ea typeface="宋体" pitchFamily="2" charset="-122"/>
-              </a:rPr>
-              <a:t>Q &amp; A</a:t>
-            </a:r>
-            <a:endParaRPr lang="en-US" altLang="zh-CN" sz="5400" dirty="0">
-              <a:ea typeface="宋体" pitchFamily="2" charset="-122"/>
-            </a:endParaRPr>
-          </a:p>
-        </p:txBody>
-      </p:sp>
-    </p:spTree>
-    <p:extLst>
-      <p:ext uri="{BB962C8B-B14F-4D97-AF65-F5344CB8AC3E}">
-        <p14:creationId xmlns:p14="http://schemas.microsoft.com/office/powerpoint/2010/main" val="1046821812"/>
       </p:ext>
     </p:extLst>
   </p:cSld>
@@ -10570,7 +11687,7 @@
     </p:spTree>
     <p:extLst>
       <p:ext uri="{BB962C8B-B14F-4D97-AF65-F5344CB8AC3E}">
-        <p14:creationId xmlns:p14="http://schemas.microsoft.com/office/powerpoint/2010/main" val="3232596921"/>
+        <p14:creationId xmlns:p14="http://schemas.microsoft.com/office/powerpoint/2010/main" val="1851072900"/>
       </p:ext>
     </p:extLst>
   </p:cSld>
@@ -10641,7 +11758,7 @@
     </p:spTree>
     <p:extLst>
       <p:ext uri="{BB962C8B-B14F-4D97-AF65-F5344CB8AC3E}">
-        <p14:creationId xmlns:p14="http://schemas.microsoft.com/office/powerpoint/2010/main" val="127803715"/>
+        <p14:creationId xmlns:p14="http://schemas.microsoft.com/office/powerpoint/2010/main" val="1046821812"/>
       </p:ext>
     </p:extLst>
   </p:cSld>
@@ -10712,7 +11829,7 @@
     </p:spTree>
     <p:extLst>
       <p:ext uri="{BB962C8B-B14F-4D97-AF65-F5344CB8AC3E}">
-        <p14:creationId xmlns:p14="http://schemas.microsoft.com/office/powerpoint/2010/main" val="2747582457"/>
+        <p14:creationId xmlns:p14="http://schemas.microsoft.com/office/powerpoint/2010/main" val="3232596921"/>
       </p:ext>
     </p:extLst>
   </p:cSld>
@@ -10783,7 +11900,7 @@
     </p:spTree>
     <p:extLst>
       <p:ext uri="{BB962C8B-B14F-4D97-AF65-F5344CB8AC3E}">
-        <p14:creationId xmlns:p14="http://schemas.microsoft.com/office/powerpoint/2010/main" val="2747582457"/>
+        <p14:creationId xmlns:p14="http://schemas.microsoft.com/office/powerpoint/2010/main" val="127803715"/>
       </p:ext>
     </p:extLst>
   </p:cSld>
@@ -11257,6 +12374,148 @@
     </p:spTree>
     <p:extLst>
       <p:ext uri="{BB962C8B-B14F-4D97-AF65-F5344CB8AC3E}">
+        <p14:creationId xmlns:p14="http://schemas.microsoft.com/office/powerpoint/2010/main" val="2747582457"/>
+      </p:ext>
+    </p:extLst>
+  </p:cSld>
+  <p:clrMapOvr>
+    <a:masterClrMapping/>
+  </p:clrMapOvr>
+  <p:timing>
+    <p:tnLst>
+      <p:par>
+        <p:cTn id="1" dur="indefinite" restart="never" nodeType="tmRoot"/>
+      </p:par>
+    </p:tnLst>
+  </p:timing>
+</p:sld>
+</file>
+
+<file path=ppt/slides/slide31.xml><?xml version="1.0" encoding="utf-8"?>
+<p:sld xmlns:a="http://schemas.openxmlformats.org/drawingml/2006/main" xmlns:r="http://schemas.openxmlformats.org/officeDocument/2006/relationships" xmlns:p="http://schemas.openxmlformats.org/presentationml/2006/main">
+  <p:cSld>
+    <p:spTree>
+      <p:nvGrpSpPr>
+        <p:cNvPr id="1" name=""/>
+        <p:cNvGrpSpPr/>
+        <p:nvPr/>
+      </p:nvGrpSpPr>
+      <p:grpSpPr>
+        <a:xfrm>
+          <a:off x="0" y="0"/>
+          <a:ext cx="0" cy="0"/>
+          <a:chOff x="0" y="0"/>
+          <a:chExt cx="0" cy="0"/>
+        </a:xfrm>
+      </p:grpSpPr>
+      <p:sp>
+        <p:nvSpPr>
+          <p:cNvPr id="72711" name="Rectangle 7"/>
+          <p:cNvSpPr>
+            <a:spLocks noGrp="1" noChangeArrowheads="1"/>
+          </p:cNvSpPr>
+          <p:nvPr>
+            <p:ph type="ctrTitle"/>
+          </p:nvPr>
+        </p:nvSpPr>
+        <p:spPr>
+          <a:xfrm>
+            <a:off x="1043608" y="548680"/>
+            <a:ext cx="6858000" cy="794469"/>
+          </a:xfrm>
+          <a:noFill/>
+          <a:ln/>
+        </p:spPr>
+        <p:txBody>
+          <a:bodyPr/>
+          <a:lstStyle/>
+          <a:p>
+            <a:r>
+              <a:rPr lang="en-US" altLang="zh-CN" dirty="0" smtClean="0">
+                <a:ea typeface="宋体" pitchFamily="2" charset="-122"/>
+              </a:rPr>
+              <a:t>Q &amp; A</a:t>
+            </a:r>
+            <a:endParaRPr lang="en-US" altLang="zh-CN" sz="5400" dirty="0">
+              <a:ea typeface="宋体" pitchFamily="2" charset="-122"/>
+            </a:endParaRPr>
+          </a:p>
+        </p:txBody>
+      </p:sp>
+    </p:spTree>
+    <p:extLst>
+      <p:ext uri="{BB962C8B-B14F-4D97-AF65-F5344CB8AC3E}">
+        <p14:creationId xmlns:p14="http://schemas.microsoft.com/office/powerpoint/2010/main" val="2747582457"/>
+      </p:ext>
+    </p:extLst>
+  </p:cSld>
+  <p:clrMapOvr>
+    <a:masterClrMapping/>
+  </p:clrMapOvr>
+  <p:timing>
+    <p:tnLst>
+      <p:par>
+        <p:cTn id="1" dur="indefinite" restart="never" nodeType="tmRoot"/>
+      </p:par>
+    </p:tnLst>
+  </p:timing>
+</p:sld>
+</file>
+
+<file path=ppt/slides/slide32.xml><?xml version="1.0" encoding="utf-8"?>
+<p:sld xmlns:a="http://schemas.openxmlformats.org/drawingml/2006/main" xmlns:r="http://schemas.openxmlformats.org/officeDocument/2006/relationships" xmlns:p="http://schemas.openxmlformats.org/presentationml/2006/main">
+  <p:cSld>
+    <p:spTree>
+      <p:nvGrpSpPr>
+        <p:cNvPr id="1" name=""/>
+        <p:cNvGrpSpPr/>
+        <p:nvPr/>
+      </p:nvGrpSpPr>
+      <p:grpSpPr>
+        <a:xfrm>
+          <a:off x="0" y="0"/>
+          <a:ext cx="0" cy="0"/>
+          <a:chOff x="0" y="0"/>
+          <a:chExt cx="0" cy="0"/>
+        </a:xfrm>
+      </p:grpSpPr>
+      <p:sp>
+        <p:nvSpPr>
+          <p:cNvPr id="72711" name="Rectangle 7"/>
+          <p:cNvSpPr>
+            <a:spLocks noGrp="1" noChangeArrowheads="1"/>
+          </p:cNvSpPr>
+          <p:nvPr>
+            <p:ph type="ctrTitle"/>
+          </p:nvPr>
+        </p:nvSpPr>
+        <p:spPr>
+          <a:xfrm>
+            <a:off x="1043608" y="548680"/>
+            <a:ext cx="6858000" cy="794469"/>
+          </a:xfrm>
+          <a:noFill/>
+          <a:ln/>
+        </p:spPr>
+        <p:txBody>
+          <a:bodyPr/>
+          <a:lstStyle/>
+          <a:p>
+            <a:r>
+              <a:rPr lang="en-US" altLang="zh-CN" dirty="0" smtClean="0">
+                <a:ea typeface="宋体" pitchFamily="2" charset="-122"/>
+              </a:rPr>
+              <a:t>Q &amp; A</a:t>
+            </a:r>
+            <a:endParaRPr lang="en-US" altLang="zh-CN" sz="5400" dirty="0">
+              <a:ea typeface="宋体" pitchFamily="2" charset="-122"/>
+            </a:endParaRPr>
+          </a:p>
+        </p:txBody>
+      </p:sp>
+    </p:spTree>
+    <p:extLst>
+      <p:ext uri="{BB962C8B-B14F-4D97-AF65-F5344CB8AC3E}">
         <p14:creationId xmlns:p14="http://schemas.microsoft.com/office/powerpoint/2010/main" val="1666187758"/>
       </p:ext>
     </p:extLst>
@@ -11274,7 +12533,7 @@
 </p:sld>
 </file>
 
-<file path=ppt/slides/slide31.xml><?xml version="1.0" encoding="utf-8"?>
+<file path=ppt/slides/slide33.xml><?xml version="1.0" encoding="utf-8"?>
 <p:sld xmlns:a="http://schemas.openxmlformats.org/drawingml/2006/main" xmlns:r="http://schemas.openxmlformats.org/officeDocument/2006/relationships" xmlns:p="http://schemas.openxmlformats.org/presentationml/2006/main">
   <p:cSld>
     <p:spTree>

</xml_diff>

<commit_message>
Updated PPT & AbstractFactory.
</commit_message>
<xml_diff>
--- a/_Doc/Design Pattern (C#) - Part 1.pptx
+++ b/_Doc/Design Pattern (C#) - Part 1.pptx
@@ -5,7 +5,7 @@
     <p:sldMasterId id="2147483648" r:id="rId1"/>
   </p:sldMasterIdLst>
   <p:notesMasterIdLst>
-    <p:notesMasterId r:id="rId35"/>
+    <p:notesMasterId r:id="rId36"/>
   </p:notesMasterIdLst>
   <p:sldIdLst>
     <p:sldId id="256" r:id="rId2"/>
@@ -21,8 +21,8 @@
     <p:sldId id="297" r:id="rId12"/>
     <p:sldId id="298" r:id="rId13"/>
     <p:sldId id="300" r:id="rId14"/>
-    <p:sldId id="301" r:id="rId15"/>
-    <p:sldId id="306" r:id="rId16"/>
+    <p:sldId id="306" r:id="rId15"/>
+    <p:sldId id="301" r:id="rId16"/>
     <p:sldId id="307" r:id="rId17"/>
     <p:sldId id="308" r:id="rId18"/>
     <p:sldId id="294" r:id="rId19"/>
@@ -31,16 +31,17 @@
     <p:sldId id="315" r:id="rId22"/>
     <p:sldId id="316" r:id="rId23"/>
     <p:sldId id="317" r:id="rId24"/>
-    <p:sldId id="318" r:id="rId25"/>
-    <p:sldId id="319" r:id="rId26"/>
-    <p:sldId id="320" r:id="rId27"/>
-    <p:sldId id="321" r:id="rId28"/>
-    <p:sldId id="295" r:id="rId29"/>
-    <p:sldId id="322" r:id="rId30"/>
-    <p:sldId id="323" r:id="rId31"/>
-    <p:sldId id="292" r:id="rId32"/>
-    <p:sldId id="309" r:id="rId33"/>
-    <p:sldId id="281" r:id="rId34"/>
+    <p:sldId id="325" r:id="rId25"/>
+    <p:sldId id="318" r:id="rId26"/>
+    <p:sldId id="319" r:id="rId27"/>
+    <p:sldId id="320" r:id="rId28"/>
+    <p:sldId id="321" r:id="rId29"/>
+    <p:sldId id="295" r:id="rId30"/>
+    <p:sldId id="322" r:id="rId31"/>
+    <p:sldId id="323" r:id="rId32"/>
+    <p:sldId id="292" r:id="rId33"/>
+    <p:sldId id="309" r:id="rId34"/>
+    <p:sldId id="281" r:id="rId35"/>
   </p:sldIdLst>
   <p:sldSz cx="9144000" cy="6858000" type="screen4x3"/>
   <p:notesSz cx="6858000" cy="9144000"/>
@@ -224,7 +225,7 @@
           <a:p>
             <a:fld id="{E18479FA-1253-41AA-8ABD-DCCC0F2E9FAF}" type="datetimeFigureOut">
               <a:rPr lang="en-US" smtClean="0"/>
-              <a:t>4/7/2015</a:t>
+              <a:t>4/8/2015</a:t>
             </a:fld>
             <a:endParaRPr lang="en-US"/>
           </a:p>
@@ -1329,6 +1330,99 @@
 </p:notes>
 </file>
 
+<file path=ppt/notesSlides/notesSlide18.xml><?xml version="1.0" encoding="utf-8"?>
+<p:notes xmlns:a="http://schemas.openxmlformats.org/drawingml/2006/main" xmlns:r="http://schemas.openxmlformats.org/officeDocument/2006/relationships" xmlns:p="http://schemas.openxmlformats.org/presentationml/2006/main">
+  <p:cSld>
+    <p:spTree>
+      <p:nvGrpSpPr>
+        <p:cNvPr id="1" name=""/>
+        <p:cNvGrpSpPr/>
+        <p:nvPr/>
+      </p:nvGrpSpPr>
+      <p:grpSpPr>
+        <a:xfrm>
+          <a:off x="0" y="0"/>
+          <a:ext cx="0" cy="0"/>
+          <a:chOff x="0" y="0"/>
+          <a:chExt cx="0" cy="0"/>
+        </a:xfrm>
+      </p:grpSpPr>
+      <p:sp>
+        <p:nvSpPr>
+          <p:cNvPr id="7" name="Rectangle 7"/>
+          <p:cNvSpPr>
+            <a:spLocks noGrp="1" noChangeArrowheads="1"/>
+          </p:cNvSpPr>
+          <p:nvPr>
+            <p:ph type="sldNum" sz="quarter" idx="5"/>
+          </p:nvPr>
+        </p:nvSpPr>
+        <p:spPr>
+          <a:ln/>
+        </p:spPr>
+        <p:txBody>
+          <a:bodyPr/>
+          <a:lstStyle/>
+          <a:p>
+            <a:fld id="{36E55076-787F-488D-BD7B-26DDA3674524}" type="slidenum">
+              <a:rPr lang="zh-CN" altLang="en-US"/>
+              <a:pPr/>
+              <a:t>28</a:t>
+            </a:fld>
+            <a:endParaRPr lang="en-US" altLang="zh-CN"/>
+          </a:p>
+        </p:txBody>
+      </p:sp>
+      <p:sp>
+        <p:nvSpPr>
+          <p:cNvPr id="48130" name="Rectangle 2"/>
+          <p:cNvSpPr>
+            <a:spLocks noGrp="1" noRot="1" noChangeAspect="1" noChangeArrowheads="1" noTextEdit="1"/>
+          </p:cNvSpPr>
+          <p:nvPr>
+            <p:ph type="sldImg"/>
+          </p:nvPr>
+        </p:nvSpPr>
+        <p:spPr>
+          <a:xfrm>
+            <a:off x="1144588" y="685800"/>
+            <a:ext cx="4572000" cy="3429000"/>
+          </a:xfrm>
+          <a:ln/>
+        </p:spPr>
+      </p:sp>
+      <p:sp>
+        <p:nvSpPr>
+          <p:cNvPr id="48131" name="Rectangle 3"/>
+          <p:cNvSpPr>
+            <a:spLocks noGrp="1" noChangeArrowheads="1"/>
+          </p:cNvSpPr>
+          <p:nvPr>
+            <p:ph type="body" idx="1"/>
+          </p:nvPr>
+        </p:nvSpPr>
+        <p:spPr/>
+        <p:txBody>
+          <a:bodyPr/>
+          <a:lstStyle/>
+          <a:p>
+            <a:endParaRPr lang="zh-CN" altLang="en-US" dirty="0"/>
+          </a:p>
+        </p:txBody>
+      </p:sp>
+    </p:spTree>
+    <p:extLst>
+      <p:ext uri="{BB962C8B-B14F-4D97-AF65-F5344CB8AC3E}">
+        <p14:creationId xmlns:p14="http://schemas.microsoft.com/office/powerpoint/2010/main" val="1800116273"/>
+      </p:ext>
+    </p:extLst>
+  </p:cSld>
+  <p:clrMapOvr>
+    <a:masterClrMapping/>
+  </p:clrMapOvr>
+</p:notes>
+</file>
+
 <file path=ppt/notesSlides/notesSlide2.xml><?xml version="1.0" encoding="utf-8"?>
 <p:notes xmlns:a="http://schemas.openxmlformats.org/drawingml/2006/main" xmlns:r="http://schemas.openxmlformats.org/officeDocument/2006/relationships" xmlns:p="http://schemas.openxmlformats.org/presentationml/2006/main">
   <p:cSld>
@@ -2402,7 +2496,7 @@
           <a:p>
             <a:fld id="{530820CF-B880-4189-942D-D702A7CBA730}" type="datetimeFigureOut">
               <a:rPr lang="zh-CN" altLang="en-US" smtClean="0"/>
-              <a:t>2015/4/7</a:t>
+              <a:t>2015/4/8</a:t>
             </a:fld>
             <a:endParaRPr lang="zh-CN" altLang="en-US"/>
           </a:p>
@@ -2567,7 +2661,7 @@
           <a:p>
             <a:fld id="{530820CF-B880-4189-942D-D702A7CBA730}" type="datetimeFigureOut">
               <a:rPr lang="zh-CN" altLang="en-US" smtClean="0"/>
-              <a:t>2015/4/7</a:t>
+              <a:t>2015/4/8</a:t>
             </a:fld>
             <a:endParaRPr lang="zh-CN" altLang="en-US"/>
           </a:p>
@@ -2742,7 +2836,7 @@
           <a:p>
             <a:fld id="{530820CF-B880-4189-942D-D702A7CBA730}" type="datetimeFigureOut">
               <a:rPr lang="zh-CN" altLang="en-US" smtClean="0"/>
-              <a:t>2015/4/7</a:t>
+              <a:t>2015/4/8</a:t>
             </a:fld>
             <a:endParaRPr lang="zh-CN" altLang="en-US"/>
           </a:p>
@@ -2907,7 +3001,7 @@
           <a:p>
             <a:fld id="{530820CF-B880-4189-942D-D702A7CBA730}" type="datetimeFigureOut">
               <a:rPr lang="zh-CN" altLang="en-US" smtClean="0"/>
-              <a:t>2015/4/7</a:t>
+              <a:t>2015/4/8</a:t>
             </a:fld>
             <a:endParaRPr lang="zh-CN" altLang="en-US"/>
           </a:p>
@@ -3148,7 +3242,7 @@
           <a:p>
             <a:fld id="{530820CF-B880-4189-942D-D702A7CBA730}" type="datetimeFigureOut">
               <a:rPr lang="zh-CN" altLang="en-US" smtClean="0"/>
-              <a:t>2015/4/7</a:t>
+              <a:t>2015/4/8</a:t>
             </a:fld>
             <a:endParaRPr lang="zh-CN" altLang="en-US"/>
           </a:p>
@@ -3431,7 +3525,7 @@
           <a:p>
             <a:fld id="{530820CF-B880-4189-942D-D702A7CBA730}" type="datetimeFigureOut">
               <a:rPr lang="zh-CN" altLang="en-US" smtClean="0"/>
-              <a:t>2015/4/7</a:t>
+              <a:t>2015/4/8</a:t>
             </a:fld>
             <a:endParaRPr lang="zh-CN" altLang="en-US"/>
           </a:p>
@@ -3848,7 +3942,7 @@
           <a:p>
             <a:fld id="{530820CF-B880-4189-942D-D702A7CBA730}" type="datetimeFigureOut">
               <a:rPr lang="zh-CN" altLang="en-US" smtClean="0"/>
-              <a:t>2015/4/7</a:t>
+              <a:t>2015/4/8</a:t>
             </a:fld>
             <a:endParaRPr lang="zh-CN" altLang="en-US"/>
           </a:p>
@@ -3961,7 +4055,7 @@
           <a:p>
             <a:fld id="{530820CF-B880-4189-942D-D702A7CBA730}" type="datetimeFigureOut">
               <a:rPr lang="zh-CN" altLang="en-US" smtClean="0"/>
-              <a:t>2015/4/7</a:t>
+              <a:t>2015/4/8</a:t>
             </a:fld>
             <a:endParaRPr lang="zh-CN" altLang="en-US"/>
           </a:p>
@@ -4051,7 +4145,7 @@
           <a:p>
             <a:fld id="{530820CF-B880-4189-942D-D702A7CBA730}" type="datetimeFigureOut">
               <a:rPr lang="zh-CN" altLang="en-US" smtClean="0"/>
-              <a:t>2015/4/7</a:t>
+              <a:t>2015/4/8</a:t>
             </a:fld>
             <a:endParaRPr lang="zh-CN" altLang="en-US"/>
           </a:p>
@@ -4323,7 +4417,7 @@
           <a:p>
             <a:fld id="{530820CF-B880-4189-942D-D702A7CBA730}" type="datetimeFigureOut">
               <a:rPr lang="zh-CN" altLang="en-US" smtClean="0"/>
-              <a:t>2015/4/7</a:t>
+              <a:t>2015/4/8</a:t>
             </a:fld>
             <a:endParaRPr lang="zh-CN" altLang="en-US"/>
           </a:p>
@@ -4571,7 +4665,7 @@
           <a:p>
             <a:fld id="{530820CF-B880-4189-942D-D702A7CBA730}" type="datetimeFigureOut">
               <a:rPr lang="zh-CN" altLang="en-US" smtClean="0"/>
-              <a:t>2015/4/7</a:t>
+              <a:t>2015/4/8</a:t>
             </a:fld>
             <a:endParaRPr lang="zh-CN" altLang="en-US"/>
           </a:p>
@@ -4779,7 +4873,7 @@
           <a:p>
             <a:fld id="{530820CF-B880-4189-942D-D702A7CBA730}" type="datetimeFigureOut">
               <a:rPr lang="zh-CN" altLang="en-US" smtClean="0"/>
-              <a:t>2015/4/7</a:t>
+              <a:t>2015/4/8</a:t>
             </a:fld>
             <a:endParaRPr lang="zh-CN" altLang="en-US"/>
           </a:p>
@@ -5728,8 +5822,8 @@
         </p:nvSpPr>
         <p:spPr>
           <a:xfrm>
-            <a:off x="457200" y="1561654"/>
-            <a:ext cx="8363272" cy="5035698"/>
+            <a:off x="457200" y="1484784"/>
+            <a:ext cx="8363272" cy="5112568"/>
           </a:xfrm>
           <a:prstGeom prst="rect">
             <a:avLst/>
@@ -5737,7 +5831,7 @@
         </p:spPr>
         <p:txBody>
           <a:bodyPr vert="horz" rtlCol="0" anchor="ctr">
-            <a:normAutofit fontScale="77500" lnSpcReduction="20000"/>
+            <a:normAutofit fontScale="70000" lnSpcReduction="20000"/>
             <a:scene3d>
               <a:camera prst="orthographicFront"/>
               <a:lightRig rig="soft" dir="t"/>
@@ -5879,7 +5973,19 @@
               <a:rPr lang="zh-CN" altLang="en-US" sz="1900" dirty="0" smtClean="0">
                 <a:effectLst/>
               </a:rPr>
-              <a:t>每个组件由</a:t>
+              <a:t>每个组件</a:t>
+            </a:r>
+            <a:r>
+              <a:rPr lang="en-US" altLang="zh-CN" sz="1900" dirty="0" smtClean="0">
+                <a:effectLst/>
+              </a:rPr>
+              <a:t>Component</a:t>
+            </a:r>
+            <a:r>
+              <a:rPr lang="zh-CN" altLang="en-US" sz="1900" dirty="0" smtClean="0">
+                <a:effectLst/>
+              </a:rPr>
+              <a:t>由</a:t>
             </a:r>
             <a:r>
               <a:rPr lang="en-US" altLang="zh-CN" sz="1900" dirty="0" smtClean="0">
@@ -5954,7 +6060,13 @@
               <a:rPr lang="en-US" altLang="zh-CN" sz="1900" dirty="0">
                 <a:effectLst/>
               </a:rPr>
-              <a:t>Work Area</a:t>
+              <a:t>Work </a:t>
+            </a:r>
+            <a:r>
+              <a:rPr lang="en-US" altLang="zh-CN" sz="1900" dirty="0" smtClean="0">
+                <a:effectLst/>
+              </a:rPr>
+              <a:t>Area</a:t>
             </a:r>
           </a:p>
           <a:p>
@@ -5964,6 +6076,89 @@
           </a:p>
           <a:p>
             <a:r>
+              <a:rPr lang="en-US" altLang="zh-CN" sz="1900" dirty="0" smtClean="0">
+                <a:effectLst/>
+              </a:rPr>
+              <a:t>	</a:t>
+            </a:r>
+            <a:r>
+              <a:rPr lang="zh-CN" altLang="en-US" sz="1900" dirty="0">
+                <a:solidFill>
+                  <a:srgbClr val="FF0000"/>
+                </a:solidFill>
+                <a:effectLst/>
+              </a:rPr>
+              <a:t>不同的组件</a:t>
+            </a:r>
+            <a:r>
+              <a:rPr lang="zh-CN" altLang="en-US" sz="1900" dirty="0" smtClean="0">
+                <a:solidFill>
+                  <a:srgbClr val="FF0000"/>
+                </a:solidFill>
+                <a:effectLst/>
+              </a:rPr>
+              <a:t>有大相径庭的</a:t>
+            </a:r>
+            <a:r>
+              <a:rPr lang="en-US" altLang="zh-CN" sz="1900" dirty="0" smtClean="0">
+                <a:solidFill>
+                  <a:srgbClr val="FF0000"/>
+                </a:solidFill>
+                <a:effectLst/>
+              </a:rPr>
+              <a:t>Work Area</a:t>
+            </a:r>
+          </a:p>
+          <a:p>
+            <a:endParaRPr lang="en-US" altLang="zh-CN" sz="1900" dirty="0" smtClean="0">
+              <a:solidFill>
+                <a:srgbClr val="FF0000"/>
+              </a:solidFill>
+              <a:effectLst/>
+            </a:endParaRPr>
+          </a:p>
+          <a:p>
+            <a:r>
+              <a:rPr lang="en-US" altLang="zh-CN" sz="1900" dirty="0" smtClean="0">
+                <a:solidFill>
+                  <a:srgbClr val="FF0000"/>
+                </a:solidFill>
+                <a:effectLst/>
+              </a:rPr>
+              <a:t>	</a:t>
+            </a:r>
+            <a:r>
+              <a:rPr lang="zh-CN" altLang="en-US" sz="1900" dirty="0" smtClean="0">
+                <a:solidFill>
+                  <a:srgbClr val="FF0000"/>
+                </a:solidFill>
+                <a:effectLst/>
+              </a:rPr>
+              <a:t>将来会有新的组件加入，伴随着新的</a:t>
+            </a:r>
+            <a:r>
+              <a:rPr lang="en-US" altLang="zh-CN" sz="1900" dirty="0" smtClean="0">
+                <a:solidFill>
+                  <a:srgbClr val="FF0000"/>
+                </a:solidFill>
+                <a:effectLst/>
+              </a:rPr>
+              <a:t>Work Area</a:t>
+            </a:r>
+            <a:endParaRPr lang="en-US" altLang="zh-CN" sz="1900" dirty="0">
+              <a:solidFill>
+                <a:srgbClr val="FF0000"/>
+              </a:solidFill>
+              <a:effectLst/>
+            </a:endParaRPr>
+          </a:p>
+          <a:p>
+            <a:endParaRPr lang="en-US" altLang="zh-CN" sz="1900" dirty="0">
+              <a:effectLst/>
+            </a:endParaRPr>
+          </a:p>
+          <a:p>
+            <a:r>
               <a:rPr lang="zh-CN" altLang="en-US" sz="2400" b="1" dirty="0" smtClean="0">
                 <a:effectLst/>
               </a:rPr>
@@ -6336,36 +6531,6 @@
             <a:endParaRPr lang="en-US" altLang="zh-CN" sz="1900" dirty="0" smtClean="0">
               <a:effectLst/>
             </a:endParaRPr>
-          </a:p>
-        </p:txBody>
-      </p:sp>
-      <p:sp>
-        <p:nvSpPr>
-          <p:cNvPr id="3" name="Rectangle 2"/>
-          <p:cNvSpPr>
-            <a:spLocks noGrp="1" noChangeArrowheads="1"/>
-          </p:cNvSpPr>
-          <p:nvPr>
-            <p:ph type="title"/>
-          </p:nvPr>
-        </p:nvSpPr>
-        <p:spPr>
-          <a:xfrm>
-            <a:off x="628650" y="365127"/>
-            <a:ext cx="7886700" cy="1119658"/>
-          </a:xfrm>
-        </p:spPr>
-        <p:txBody>
-          <a:bodyPr>
-            <a:normAutofit/>
-          </a:bodyPr>
-          <a:lstStyle/>
-          <a:p>
-            <a:r>
-              <a:rPr lang="en-US" altLang="zh-CN" dirty="0" smtClean="0"/>
-              <a:t>Factory Method</a:t>
-            </a:r>
-            <a:endParaRPr lang="zh-CN" altLang="en-US" dirty="0"/>
           </a:p>
         </p:txBody>
       </p:sp>
@@ -6433,6 +6598,56 @@
           </a:extLst>
         </p:spPr>
       </p:pic>
+      <p:sp>
+        <p:nvSpPr>
+          <p:cNvPr id="6" name="Rectangle 7"/>
+          <p:cNvSpPr txBox="1">
+            <a:spLocks noChangeArrowheads="1"/>
+          </p:cNvSpPr>
+          <p:nvPr/>
+        </p:nvSpPr>
+        <p:spPr>
+          <a:xfrm>
+            <a:off x="1043608" y="548680"/>
+            <a:ext cx="6858000" cy="794469"/>
+          </a:xfrm>
+          <a:prstGeom prst="rect">
+            <a:avLst/>
+          </a:prstGeom>
+          <a:noFill/>
+          <a:ln/>
+        </p:spPr>
+        <p:txBody>
+          <a:bodyPr vert="horz" lIns="91440" tIns="45720" rIns="91440" bIns="45720" rtlCol="0" anchor="ctr">
+            <a:normAutofit/>
+          </a:bodyPr>
+          <a:lstStyle>
+            <a:lvl1pPr algn="ctr" defTabSz="914400" rtl="0" eaLnBrk="1" latinLnBrk="0" hangingPunct="1">
+              <a:spcBef>
+                <a:spcPct val="0"/>
+              </a:spcBef>
+              <a:buNone/>
+              <a:defRPr sz="4400" kern="1200">
+                <a:solidFill>
+                  <a:schemeClr val="tx1"/>
+                </a:solidFill>
+                <a:latin typeface="+mj-lt"/>
+                <a:ea typeface="+mj-ea"/>
+                <a:cs typeface="+mj-cs"/>
+              </a:defRPr>
+            </a:lvl1pPr>
+          </a:lstStyle>
+          <a:p>
+            <a:r>
+              <a:rPr lang="en-US" altLang="zh-CN" smtClean="0"/>
+              <a:t>Factory Method</a:t>
+            </a:r>
+            <a:endParaRPr lang="en-US" altLang="zh-CN" sz="5400" dirty="0">
+              <a:ea typeface="宋体" pitchFamily="2" charset="-122"/>
+            </a:endParaRPr>
+          </a:p>
+        </p:txBody>
+      </p:sp>
     </p:spTree>
     <p:extLst>
       <p:ext uri="{BB962C8B-B14F-4D97-AF65-F5344CB8AC3E}">
@@ -6455,139 +6670,6 @@
 </file>
 
 <file path=ppt/slides/slide14.xml><?xml version="1.0" encoding="utf-8"?>
-<p:sld xmlns:a="http://schemas.openxmlformats.org/drawingml/2006/main" xmlns:r="http://schemas.openxmlformats.org/officeDocument/2006/relationships" xmlns:p="http://schemas.openxmlformats.org/presentationml/2006/main">
-  <p:cSld>
-    <p:spTree>
-      <p:nvGrpSpPr>
-        <p:cNvPr id="1" name=""/>
-        <p:cNvGrpSpPr/>
-        <p:nvPr/>
-      </p:nvGrpSpPr>
-      <p:grpSpPr>
-        <a:xfrm>
-          <a:off x="0" y="0"/>
-          <a:ext cx="0" cy="0"/>
-          <a:chOff x="0" y="0"/>
-          <a:chExt cx="0" cy="0"/>
-        </a:xfrm>
-      </p:grpSpPr>
-      <p:sp>
-        <p:nvSpPr>
-          <p:cNvPr id="72711" name="Rectangle 7"/>
-          <p:cNvSpPr>
-            <a:spLocks noGrp="1" noChangeArrowheads="1"/>
-          </p:cNvSpPr>
-          <p:nvPr>
-            <p:ph type="ctrTitle"/>
-          </p:nvPr>
-        </p:nvSpPr>
-        <p:spPr>
-          <a:xfrm>
-            <a:off x="1043608" y="548680"/>
-            <a:ext cx="6858000" cy="794469"/>
-          </a:xfrm>
-          <a:noFill/>
-          <a:ln/>
-        </p:spPr>
-        <p:txBody>
-          <a:bodyPr/>
-          <a:lstStyle/>
-          <a:p>
-            <a:r>
-              <a:rPr lang="en-US" altLang="zh-CN" dirty="0"/>
-              <a:t>Factory Method</a:t>
-            </a:r>
-            <a:endParaRPr lang="en-US" altLang="zh-CN" sz="5400" dirty="0">
-              <a:ea typeface="宋体" pitchFamily="2" charset="-122"/>
-            </a:endParaRPr>
-          </a:p>
-        </p:txBody>
-      </p:sp>
-      <p:pic>
-        <p:nvPicPr>
-          <p:cNvPr id="1028" name="Picture 4"/>
-          <p:cNvPicPr>
-            <a:picLocks noChangeAspect="1" noChangeArrowheads="1"/>
-          </p:cNvPicPr>
-          <p:nvPr/>
-        </p:nvPicPr>
-        <p:blipFill>
-          <a:blip r:embed="rId2">
-            <a:extLst>
-              <a:ext uri="{28A0092B-C50C-407E-A947-70E740481C1C}">
-                <a14:useLocalDpi xmlns:a14="http://schemas.microsoft.com/office/drawing/2010/main" val="0"/>
-              </a:ext>
-            </a:extLst>
-          </a:blip>
-          <a:srcRect/>
-          <a:stretch>
-            <a:fillRect/>
-          </a:stretch>
-        </p:blipFill>
-        <p:spPr bwMode="auto">
-          <a:xfrm>
-            <a:off x="20141" y="1700809"/>
-            <a:ext cx="9123859" cy="3203547"/>
-          </a:xfrm>
-          <a:prstGeom prst="rect">
-            <a:avLst/>
-          </a:prstGeom>
-          <a:noFill/>
-          <a:ln>
-            <a:noFill/>
-          </a:ln>
-          <a:effectLst/>
-          <a:extLst>
-            <a:ext uri="{909E8E84-426E-40DD-AFC4-6F175D3DCCD1}">
-              <a14:hiddenFill xmlns:a14="http://schemas.microsoft.com/office/drawing/2010/main">
-                <a:solidFill>
-                  <a:schemeClr val="accent1"/>
-                </a:solidFill>
-              </a14:hiddenFill>
-            </a:ext>
-            <a:ext uri="{91240B29-F687-4F45-9708-019B960494DF}">
-              <a14:hiddenLine xmlns:a14="http://schemas.microsoft.com/office/drawing/2010/main" w="9525">
-                <a:solidFill>
-                  <a:schemeClr val="tx1"/>
-                </a:solidFill>
-                <a:miter lim="800000"/>
-                <a:headEnd/>
-                <a:tailEnd/>
-              </a14:hiddenLine>
-            </a:ext>
-            <a:ext uri="{AF507438-7753-43E0-B8FC-AC1667EBCBE1}">
-              <a14:hiddenEffects xmlns:a14="http://schemas.microsoft.com/office/drawing/2010/main">
-                <a:effectLst>
-                  <a:outerShdw dist="35921" dir="2700000" algn="ctr" rotWithShape="0">
-                    <a:schemeClr val="bg2"/>
-                  </a:outerShdw>
-                </a:effectLst>
-              </a14:hiddenEffects>
-            </a:ext>
-          </a:extLst>
-        </p:spPr>
-      </p:pic>
-    </p:spTree>
-    <p:extLst>
-      <p:ext uri="{BB962C8B-B14F-4D97-AF65-F5344CB8AC3E}">
-        <p14:creationId xmlns:p14="http://schemas.microsoft.com/office/powerpoint/2010/main" val="2380928346"/>
-      </p:ext>
-    </p:extLst>
-  </p:cSld>
-  <p:clrMapOvr>
-    <a:masterClrMapping/>
-  </p:clrMapOvr>
-  <p:timing>
-    <p:tnLst>
-      <p:par>
-        <p:cTn id="1" dur="indefinite" restart="never" nodeType="tmRoot"/>
-      </p:par>
-    </p:tnLst>
-  </p:timing>
-</p:sld>
-</file>
-
-<file path=ppt/slides/slide15.xml><?xml version="1.0" encoding="utf-8"?>
 <p:sld xmlns:a="http://schemas.openxmlformats.org/drawingml/2006/main" xmlns:r="http://schemas.openxmlformats.org/officeDocument/2006/relationships" xmlns:p="http://schemas.openxmlformats.org/presentationml/2006/main">
   <p:cSld>
     <p:spTree>
@@ -6865,6 +6947,139 @@
 </p:sld>
 </file>
 
+<file path=ppt/slides/slide15.xml><?xml version="1.0" encoding="utf-8"?>
+<p:sld xmlns:a="http://schemas.openxmlformats.org/drawingml/2006/main" xmlns:r="http://schemas.openxmlformats.org/officeDocument/2006/relationships" xmlns:p="http://schemas.openxmlformats.org/presentationml/2006/main">
+  <p:cSld>
+    <p:spTree>
+      <p:nvGrpSpPr>
+        <p:cNvPr id="1" name=""/>
+        <p:cNvGrpSpPr/>
+        <p:nvPr/>
+      </p:nvGrpSpPr>
+      <p:grpSpPr>
+        <a:xfrm>
+          <a:off x="0" y="0"/>
+          <a:ext cx="0" cy="0"/>
+          <a:chOff x="0" y="0"/>
+          <a:chExt cx="0" cy="0"/>
+        </a:xfrm>
+      </p:grpSpPr>
+      <p:sp>
+        <p:nvSpPr>
+          <p:cNvPr id="72711" name="Rectangle 7"/>
+          <p:cNvSpPr>
+            <a:spLocks noGrp="1" noChangeArrowheads="1"/>
+          </p:cNvSpPr>
+          <p:nvPr>
+            <p:ph type="ctrTitle"/>
+          </p:nvPr>
+        </p:nvSpPr>
+        <p:spPr>
+          <a:xfrm>
+            <a:off x="1043608" y="548680"/>
+            <a:ext cx="6858000" cy="794469"/>
+          </a:xfrm>
+          <a:noFill/>
+          <a:ln/>
+        </p:spPr>
+        <p:txBody>
+          <a:bodyPr/>
+          <a:lstStyle/>
+          <a:p>
+            <a:r>
+              <a:rPr lang="en-US" altLang="zh-CN" dirty="0"/>
+              <a:t>Factory Method</a:t>
+            </a:r>
+            <a:endParaRPr lang="en-US" altLang="zh-CN" sz="5400" dirty="0">
+              <a:ea typeface="宋体" pitchFamily="2" charset="-122"/>
+            </a:endParaRPr>
+          </a:p>
+        </p:txBody>
+      </p:sp>
+      <p:pic>
+        <p:nvPicPr>
+          <p:cNvPr id="1028" name="Picture 4"/>
+          <p:cNvPicPr>
+            <a:picLocks noChangeAspect="1" noChangeArrowheads="1"/>
+          </p:cNvPicPr>
+          <p:nvPr/>
+        </p:nvPicPr>
+        <p:blipFill>
+          <a:blip r:embed="rId2">
+            <a:extLst>
+              <a:ext uri="{28A0092B-C50C-407E-A947-70E740481C1C}">
+                <a14:useLocalDpi xmlns:a14="http://schemas.microsoft.com/office/drawing/2010/main" val="0"/>
+              </a:ext>
+            </a:extLst>
+          </a:blip>
+          <a:srcRect/>
+          <a:stretch>
+            <a:fillRect/>
+          </a:stretch>
+        </p:blipFill>
+        <p:spPr bwMode="auto">
+          <a:xfrm>
+            <a:off x="20141" y="1700809"/>
+            <a:ext cx="9123859" cy="3203547"/>
+          </a:xfrm>
+          <a:prstGeom prst="rect">
+            <a:avLst/>
+          </a:prstGeom>
+          <a:noFill/>
+          <a:ln>
+            <a:noFill/>
+          </a:ln>
+          <a:effectLst/>
+          <a:extLst>
+            <a:ext uri="{909E8E84-426E-40DD-AFC4-6F175D3DCCD1}">
+              <a14:hiddenFill xmlns:a14="http://schemas.microsoft.com/office/drawing/2010/main">
+                <a:solidFill>
+                  <a:schemeClr val="accent1"/>
+                </a:solidFill>
+              </a14:hiddenFill>
+            </a:ext>
+            <a:ext uri="{91240B29-F687-4F45-9708-019B960494DF}">
+              <a14:hiddenLine xmlns:a14="http://schemas.microsoft.com/office/drawing/2010/main" w="9525">
+                <a:solidFill>
+                  <a:schemeClr val="tx1"/>
+                </a:solidFill>
+                <a:miter lim="800000"/>
+                <a:headEnd/>
+                <a:tailEnd/>
+              </a14:hiddenLine>
+            </a:ext>
+            <a:ext uri="{AF507438-7753-43E0-B8FC-AC1667EBCBE1}">
+              <a14:hiddenEffects xmlns:a14="http://schemas.microsoft.com/office/drawing/2010/main">
+                <a:effectLst>
+                  <a:outerShdw dist="35921" dir="2700000" algn="ctr" rotWithShape="0">
+                    <a:schemeClr val="bg2"/>
+                  </a:outerShdw>
+                </a:effectLst>
+              </a14:hiddenEffects>
+            </a:ext>
+          </a:extLst>
+        </p:spPr>
+      </p:pic>
+    </p:spTree>
+    <p:extLst>
+      <p:ext uri="{BB962C8B-B14F-4D97-AF65-F5344CB8AC3E}">
+        <p14:creationId xmlns:p14="http://schemas.microsoft.com/office/powerpoint/2010/main" val="2380928346"/>
+      </p:ext>
+    </p:extLst>
+  </p:cSld>
+  <p:clrMapOvr>
+    <a:masterClrMapping/>
+  </p:clrMapOvr>
+  <p:timing>
+    <p:tnLst>
+      <p:par>
+        <p:cTn id="1" dur="indefinite" restart="never" nodeType="tmRoot"/>
+      </p:par>
+    </p:tnLst>
+  </p:timing>
+</p:sld>
+</file>
+
 <file path=ppt/slides/slide16.xml><?xml version="1.0" encoding="utf-8"?>
 <p:sld xmlns:a="http://schemas.openxmlformats.org/drawingml/2006/main" xmlns:r="http://schemas.openxmlformats.org/officeDocument/2006/relationships" xmlns:p="http://schemas.openxmlformats.org/presentationml/2006/main">
   <p:cSld>
@@ -9933,7 +10148,7 @@
       </p:sp>
       <p:pic>
         <p:nvPicPr>
-          <p:cNvPr id="6" name="Picture 2" descr="Machine generated alternative text:&#10;pkg Facto.ethod &#10;Client &#10;uintefface.s &#10;creates &#10;createO Product &#10;operatjonfO : vow &#10;operation20 . void "/>
+          <p:cNvPr id="1026" name="Picture 2"/>
           <p:cNvPicPr>
             <a:picLocks noChangeAspect="1" noChangeArrowheads="1"/>
           </p:cNvPicPr>
@@ -9954,20 +10169,43 @@
         </p:blipFill>
         <p:spPr bwMode="auto">
           <a:xfrm>
-            <a:off x="1547664" y="2610292"/>
-            <a:ext cx="5539992" cy="4203084"/>
+            <a:off x="1979712" y="2564904"/>
+            <a:ext cx="4752528" cy="3859361"/>
           </a:xfrm>
           <a:prstGeom prst="rect">
             <a:avLst/>
           </a:prstGeom>
           <a:noFill/>
+          <a:ln>
+            <a:noFill/>
+          </a:ln>
+          <a:effectLst/>
           <a:extLst>
             <a:ext uri="{909E8E84-426E-40DD-AFC4-6F175D3DCCD1}">
               <a14:hiddenFill xmlns:a14="http://schemas.microsoft.com/office/drawing/2010/main">
                 <a:solidFill>
-                  <a:srgbClr val="FFFFFF"/>
+                  <a:schemeClr val="accent1"/>
                 </a:solidFill>
               </a14:hiddenFill>
+            </a:ext>
+            <a:ext uri="{91240B29-F687-4F45-9708-019B960494DF}">
+              <a14:hiddenLine xmlns:a14="http://schemas.microsoft.com/office/drawing/2010/main" w="9525">
+                <a:solidFill>
+                  <a:schemeClr val="tx1"/>
+                </a:solidFill>
+                <a:miter lim="800000"/>
+                <a:headEnd/>
+                <a:tailEnd/>
+              </a14:hiddenLine>
+            </a:ext>
+            <a:ext uri="{AF507438-7753-43E0-B8FC-AC1667EBCBE1}">
+              <a14:hiddenEffects xmlns:a14="http://schemas.microsoft.com/office/drawing/2010/main">
+                <a:effectLst>
+                  <a:outerShdw dist="35921" dir="2700000" algn="ctr" rotWithShape="0">
+                    <a:schemeClr val="bg2"/>
+                  </a:outerShdw>
+                </a:effectLst>
+              </a14:hiddenEffects>
             </a:ext>
           </a:extLst>
         </p:spPr>
@@ -11581,7 +11819,58 @@
               <a:rPr lang="zh-CN" altLang="en-US" sz="1900" dirty="0" smtClean="0">
                 <a:effectLst/>
               </a:rPr>
-              <a:t>显示同一个厂商的产品（同一个产品族）：</a:t>
+              <a:t>显示同一个厂商的产品（同</a:t>
+            </a:r>
+            <a:r>
+              <a:rPr lang="zh-CN" altLang="en-US" sz="1900" dirty="0" smtClean="0">
+                <a:solidFill>
+                  <a:srgbClr val="FF0000"/>
+                </a:solidFill>
+                <a:effectLst/>
+              </a:rPr>
+              <a:t>一</a:t>
+            </a:r>
+            <a:r>
+              <a:rPr lang="zh-CN" altLang="en-US" sz="1900" dirty="0" smtClean="0">
+                <a:solidFill>
+                  <a:srgbClr val="FF0000"/>
+                </a:solidFill>
+                <a:effectLst/>
+              </a:rPr>
+              <a:t>个系列</a:t>
+            </a:r>
+            <a:r>
+              <a:rPr lang="en-US" altLang="zh-CN" sz="1900" dirty="0" smtClean="0">
+                <a:solidFill>
+                  <a:srgbClr val="FF0000"/>
+                </a:solidFill>
+                <a:effectLst/>
+              </a:rPr>
+              <a:t>/</a:t>
+            </a:r>
+            <a:r>
+              <a:rPr lang="zh-CN" altLang="en-US" sz="1900" dirty="0" smtClean="0">
+                <a:solidFill>
+                  <a:srgbClr val="FF0000"/>
+                </a:solidFill>
+                <a:effectLst/>
+              </a:rPr>
+              <a:t>产品</a:t>
+            </a:r>
+            <a:r>
+              <a:rPr lang="zh-CN" altLang="en-US" sz="1900" dirty="0" smtClean="0">
+                <a:solidFill>
+                  <a:srgbClr val="FF0000"/>
+                </a:solidFill>
+                <a:effectLst/>
+              </a:rPr>
+              <a:t>族</a:t>
+            </a:r>
+            <a:r>
+              <a:rPr lang="zh-CN" altLang="en-US" sz="1900" dirty="0" smtClean="0">
+                <a:effectLst/>
+              </a:rPr>
+              <a:t>）：</a:t>
             </a:r>
             <a:endParaRPr lang="en-US" altLang="zh-CN" sz="1900" dirty="0" smtClean="0">
               <a:effectLst/>
@@ -11853,13 +12142,56 @@
                 </a:solidFill>
                 <a:effectLst/>
               </a:rPr>
-              <a:t>提供一系列一致的产品生产接口</a:t>
+              <a:t>提供一系列一致的产品生产</a:t>
             </a:r>
             <a:r>
               <a:rPr lang="zh-CN" altLang="en-US" sz="1900" dirty="0" smtClean="0">
+                <a:solidFill>
+                  <a:srgbClr val="FF0000"/>
+                </a:solidFill>
+                <a:effectLst/>
+              </a:rPr>
+              <a:t>接口：抽象工厂</a:t>
+            </a:r>
+            <a:r>
+              <a:rPr lang="zh-CN" altLang="en-US" sz="1900" dirty="0" smtClean="0">
                 <a:effectLst/>
               </a:rPr>
               <a:t>）</a:t>
+            </a:r>
+            <a:endParaRPr lang="en-US" altLang="zh-CN" sz="1900" dirty="0" smtClean="0">
+              <a:effectLst/>
+            </a:endParaRPr>
+          </a:p>
+          <a:p>
+            <a:r>
+              <a:rPr lang="en-US" altLang="zh-CN" sz="1900" dirty="0">
+                <a:effectLst/>
+              </a:rPr>
+              <a:t>	</a:t>
+            </a:r>
+            <a:endParaRPr lang="en-US" altLang="zh-CN" sz="1900" dirty="0" smtClean="0">
+              <a:effectLst/>
+            </a:endParaRPr>
+          </a:p>
+          <a:p>
+            <a:r>
+              <a:rPr lang="en-US" altLang="zh-CN" sz="1900" dirty="0">
+                <a:effectLst/>
+              </a:rPr>
+              <a:t>	</a:t>
+            </a:r>
+            <a:r>
+              <a:rPr lang="en-US" altLang="zh-CN" sz="1900" dirty="0" smtClean="0">
+                <a:effectLst/>
+              </a:rPr>
+              <a:t>Web Page</a:t>
+            </a:r>
+            <a:r>
+              <a:rPr lang="zh-CN" altLang="en-US" sz="1900" dirty="0" smtClean="0">
+                <a:effectLst/>
+              </a:rPr>
+              <a:t>只知晓抽象的产品 和 抽象的工厂</a:t>
             </a:r>
             <a:endParaRPr lang="en-US" altLang="zh-CN" sz="1900" dirty="0">
               <a:effectLst/>
@@ -11965,6 +12297,168 @@
           </a:p>
         </p:txBody>
       </p:sp>
+      <p:sp>
+        <p:nvSpPr>
+          <p:cNvPr id="7" name="TextBox 6"/>
+          <p:cNvSpPr txBox="1"/>
+          <p:nvPr/>
+        </p:nvSpPr>
+        <p:spPr>
+          <a:xfrm>
+            <a:off x="251520" y="1475492"/>
+            <a:ext cx="1152128" cy="369332"/>
+          </a:xfrm>
+          <a:prstGeom prst="rect">
+            <a:avLst/>
+          </a:prstGeom>
+          <a:noFill/>
+        </p:spPr>
+        <p:txBody>
+          <a:bodyPr wrap="square" rtlCol="0">
+            <a:spAutoFit/>
+          </a:bodyPr>
+          <a:lstStyle/>
+          <a:p>
+            <a:r>
+              <a:rPr lang="en-US" altLang="zh-CN" dirty="0" smtClean="0"/>
+              <a:t>Web Page</a:t>
+            </a:r>
+            <a:endParaRPr lang="en-US" dirty="0"/>
+          </a:p>
+        </p:txBody>
+      </p:sp>
+      <p:pic>
+        <p:nvPicPr>
+          <p:cNvPr id="2050" name="Picture 2"/>
+          <p:cNvPicPr>
+            <a:picLocks noChangeAspect="1" noChangeArrowheads="1"/>
+          </p:cNvPicPr>
+          <p:nvPr/>
+        </p:nvPicPr>
+        <p:blipFill>
+          <a:blip r:embed="rId3">
+            <a:extLst>
+              <a:ext uri="{28A0092B-C50C-407E-A947-70E740481C1C}">
+                <a14:useLocalDpi xmlns:a14="http://schemas.microsoft.com/office/drawing/2010/main" val="0"/>
+              </a:ext>
+            </a:extLst>
+          </a:blip>
+          <a:srcRect/>
+          <a:stretch>
+            <a:fillRect/>
+          </a:stretch>
+        </p:blipFill>
+        <p:spPr bwMode="auto">
+          <a:xfrm>
+            <a:off x="2411760" y="1438275"/>
+            <a:ext cx="4600575" cy="5419725"/>
+          </a:xfrm>
+          <a:prstGeom prst="rect">
+            <a:avLst/>
+          </a:prstGeom>
+          <a:noFill/>
+          <a:ln>
+            <a:noFill/>
+          </a:ln>
+          <a:effectLst/>
+          <a:extLst>
+            <a:ext uri="{909E8E84-426E-40DD-AFC4-6F175D3DCCD1}">
+              <a14:hiddenFill xmlns:a14="http://schemas.microsoft.com/office/drawing/2010/main">
+                <a:solidFill>
+                  <a:schemeClr val="accent1"/>
+                </a:solidFill>
+              </a14:hiddenFill>
+            </a:ext>
+            <a:ext uri="{91240B29-F687-4F45-9708-019B960494DF}">
+              <a14:hiddenLine xmlns:a14="http://schemas.microsoft.com/office/drawing/2010/main" w="9525">
+                <a:solidFill>
+                  <a:schemeClr val="tx1"/>
+                </a:solidFill>
+                <a:miter lim="800000"/>
+                <a:headEnd/>
+                <a:tailEnd/>
+              </a14:hiddenLine>
+            </a:ext>
+            <a:ext uri="{AF507438-7753-43E0-B8FC-AC1667EBCBE1}">
+              <a14:hiddenEffects xmlns:a14="http://schemas.microsoft.com/office/drawing/2010/main">
+                <a:effectLst>
+                  <a:outerShdw dist="35921" dir="2700000" algn="ctr" rotWithShape="0">
+                    <a:schemeClr val="bg2"/>
+                  </a:outerShdw>
+                </a:effectLst>
+              </a14:hiddenEffects>
+            </a:ext>
+          </a:extLst>
+        </p:spPr>
+      </p:pic>
+    </p:spTree>
+    <p:extLst>
+      <p:ext uri="{BB962C8B-B14F-4D97-AF65-F5344CB8AC3E}">
+        <p14:creationId xmlns:p14="http://schemas.microsoft.com/office/powerpoint/2010/main" val="2299774262"/>
+      </p:ext>
+    </p:extLst>
+  </p:cSld>
+  <p:clrMapOvr>
+    <a:masterClrMapping/>
+  </p:clrMapOvr>
+  <p:transition/>
+  <p:timing>
+    <p:tnLst>
+      <p:par>
+        <p:cTn id="1" dur="indefinite" restart="never" nodeType="tmRoot"/>
+      </p:par>
+    </p:tnLst>
+  </p:timing>
+</p:sld>
+</file>
+
+<file path=ppt/slides/slide25.xml><?xml version="1.0" encoding="utf-8"?>
+<p:sld xmlns:a="http://schemas.openxmlformats.org/drawingml/2006/main" xmlns:r="http://schemas.openxmlformats.org/officeDocument/2006/relationships" xmlns:p="http://schemas.openxmlformats.org/presentationml/2006/main">
+  <p:cSld>
+    <p:spTree>
+      <p:nvGrpSpPr>
+        <p:cNvPr id="1" name=""/>
+        <p:cNvGrpSpPr/>
+        <p:nvPr/>
+      </p:nvGrpSpPr>
+      <p:grpSpPr>
+        <a:xfrm>
+          <a:off x="0" y="0"/>
+          <a:ext cx="0" cy="0"/>
+          <a:chOff x="0" y="0"/>
+          <a:chExt cx="0" cy="0"/>
+        </a:xfrm>
+      </p:grpSpPr>
+      <p:sp>
+        <p:nvSpPr>
+          <p:cNvPr id="3" name="Rectangle 2"/>
+          <p:cNvSpPr>
+            <a:spLocks noGrp="1" noChangeArrowheads="1"/>
+          </p:cNvSpPr>
+          <p:nvPr>
+            <p:ph type="title"/>
+          </p:nvPr>
+        </p:nvSpPr>
+        <p:spPr>
+          <a:xfrm>
+            <a:off x="628650" y="365127"/>
+            <a:ext cx="7886700" cy="1119658"/>
+          </a:xfrm>
+        </p:spPr>
+        <p:txBody>
+          <a:bodyPr>
+            <a:normAutofit/>
+          </a:bodyPr>
+          <a:lstStyle/>
+          <a:p>
+            <a:r>
+              <a:rPr lang="en-US" altLang="zh-CN" dirty="0" smtClean="0"/>
+              <a:t>Abstract Factory</a:t>
+            </a:r>
+            <a:endParaRPr lang="zh-CN" altLang="en-US" dirty="0"/>
+          </a:p>
+        </p:txBody>
+      </p:sp>
       <p:pic>
         <p:nvPicPr>
           <p:cNvPr id="1026" name="Picture 2"/>
@@ -12208,7 +12702,7 @@
 </p:sld>
 </file>
 
-<file path=ppt/slides/slide25.xml><?xml version="1.0" encoding="utf-8"?>
+<file path=ppt/slides/slide26.xml><?xml version="1.0" encoding="utf-8"?>
 <p:sld xmlns:a="http://schemas.openxmlformats.org/drawingml/2006/main" xmlns:r="http://schemas.openxmlformats.org/officeDocument/2006/relationships" xmlns:p="http://schemas.openxmlformats.org/presentationml/2006/main">
   <p:cSld>
     <p:spTree>
@@ -12417,168 +12911,6 @@
     <p:extLst>
       <p:ext uri="{BB962C8B-B14F-4D97-AF65-F5344CB8AC3E}">
         <p14:creationId xmlns:p14="http://schemas.microsoft.com/office/powerpoint/2010/main" val="2473850063"/>
-      </p:ext>
-    </p:extLst>
-  </p:cSld>
-  <p:clrMapOvr>
-    <a:masterClrMapping/>
-  </p:clrMapOvr>
-  <p:transition/>
-  <p:timing>
-    <p:tnLst>
-      <p:par>
-        <p:cTn id="1" dur="indefinite" restart="never" nodeType="tmRoot"/>
-      </p:par>
-    </p:tnLst>
-  </p:timing>
-</p:sld>
-</file>
-
-<file path=ppt/slides/slide26.xml><?xml version="1.0" encoding="utf-8"?>
-<p:sld xmlns:a="http://schemas.openxmlformats.org/drawingml/2006/main" xmlns:r="http://schemas.openxmlformats.org/officeDocument/2006/relationships" xmlns:p="http://schemas.openxmlformats.org/presentationml/2006/main">
-  <p:cSld>
-    <p:spTree>
-      <p:nvGrpSpPr>
-        <p:cNvPr id="1" name=""/>
-        <p:cNvGrpSpPr/>
-        <p:nvPr/>
-      </p:nvGrpSpPr>
-      <p:grpSpPr>
-        <a:xfrm>
-          <a:off x="0" y="0"/>
-          <a:ext cx="0" cy="0"/>
-          <a:chOff x="0" y="0"/>
-          <a:chExt cx="0" cy="0"/>
-        </a:xfrm>
-      </p:grpSpPr>
-      <p:sp>
-        <p:nvSpPr>
-          <p:cNvPr id="3" name="Rectangle 2"/>
-          <p:cNvSpPr>
-            <a:spLocks noGrp="1" noChangeArrowheads="1"/>
-          </p:cNvSpPr>
-          <p:nvPr>
-            <p:ph type="title"/>
-          </p:nvPr>
-        </p:nvSpPr>
-        <p:spPr>
-          <a:xfrm>
-            <a:off x="628650" y="365127"/>
-            <a:ext cx="7886700" cy="1119658"/>
-          </a:xfrm>
-        </p:spPr>
-        <p:txBody>
-          <a:bodyPr>
-            <a:normAutofit/>
-          </a:bodyPr>
-          <a:lstStyle/>
-          <a:p>
-            <a:r>
-              <a:rPr lang="en-US" altLang="zh-CN" dirty="0" smtClean="0"/>
-              <a:t>Abstract Factory</a:t>
-            </a:r>
-            <a:endParaRPr lang="zh-CN" altLang="en-US" dirty="0"/>
-          </a:p>
-        </p:txBody>
-      </p:sp>
-      <p:sp>
-        <p:nvSpPr>
-          <p:cNvPr id="2" name="TextBox 1"/>
-          <p:cNvSpPr txBox="1"/>
-          <p:nvPr/>
-        </p:nvSpPr>
-        <p:spPr>
-          <a:xfrm>
-            <a:off x="215516" y="1475492"/>
-            <a:ext cx="972108" cy="369332"/>
-          </a:xfrm>
-          <a:prstGeom prst="rect">
-            <a:avLst/>
-          </a:prstGeom>
-          <a:noFill/>
-        </p:spPr>
-        <p:txBody>
-          <a:bodyPr wrap="square" rtlCol="0">
-            <a:spAutoFit/>
-          </a:bodyPr>
-          <a:lstStyle/>
-          <a:p>
-            <a:r>
-              <a:rPr lang="en-US" dirty="0" smtClean="0"/>
-              <a:t>Factory</a:t>
-            </a:r>
-            <a:endParaRPr lang="en-US" dirty="0"/>
-          </a:p>
-        </p:txBody>
-      </p:sp>
-      <p:pic>
-        <p:nvPicPr>
-          <p:cNvPr id="2053" name="Picture 5"/>
-          <p:cNvPicPr>
-            <a:picLocks noChangeAspect="1" noChangeArrowheads="1"/>
-          </p:cNvPicPr>
-          <p:nvPr/>
-        </p:nvPicPr>
-        <p:blipFill>
-          <a:blip r:embed="rId3">
-            <a:extLst>
-              <a:ext uri="{28A0092B-C50C-407E-A947-70E740481C1C}">
-                <a14:useLocalDpi xmlns:a14="http://schemas.microsoft.com/office/drawing/2010/main" val="0"/>
-              </a:ext>
-            </a:extLst>
-          </a:blip>
-          <a:srcRect/>
-          <a:stretch>
-            <a:fillRect/>
-          </a:stretch>
-        </p:blipFill>
-        <p:spPr bwMode="auto">
-          <a:xfrm>
-            <a:off x="1611213" y="1772816"/>
-            <a:ext cx="5553075" cy="3648075"/>
-          </a:xfrm>
-          <a:prstGeom prst="rect">
-            <a:avLst/>
-          </a:prstGeom>
-          <a:noFill/>
-          <a:ln>
-            <a:noFill/>
-          </a:ln>
-          <a:effectLst/>
-          <a:extLst>
-            <a:ext uri="{909E8E84-426E-40DD-AFC4-6F175D3DCCD1}">
-              <a14:hiddenFill xmlns:a14="http://schemas.microsoft.com/office/drawing/2010/main">
-                <a:solidFill>
-                  <a:schemeClr val="accent1"/>
-                </a:solidFill>
-              </a14:hiddenFill>
-            </a:ext>
-            <a:ext uri="{91240B29-F687-4F45-9708-019B960494DF}">
-              <a14:hiddenLine xmlns:a14="http://schemas.microsoft.com/office/drawing/2010/main" w="9525">
-                <a:solidFill>
-                  <a:schemeClr val="tx1"/>
-                </a:solidFill>
-                <a:miter lim="800000"/>
-                <a:headEnd/>
-                <a:tailEnd/>
-              </a14:hiddenLine>
-            </a:ext>
-            <a:ext uri="{AF507438-7753-43E0-B8FC-AC1667EBCBE1}">
-              <a14:hiddenEffects xmlns:a14="http://schemas.microsoft.com/office/drawing/2010/main">
-                <a:effectLst>
-                  <a:outerShdw dist="35921" dir="2700000" algn="ctr" rotWithShape="0">
-                    <a:schemeClr val="bg2"/>
-                  </a:outerShdw>
-                </a:effectLst>
-              </a14:hiddenEffects>
-            </a:ext>
-          </a:extLst>
-        </p:spPr>
-      </p:pic>
-    </p:spTree>
-    <p:extLst>
-      <p:ext uri="{BB962C8B-B14F-4D97-AF65-F5344CB8AC3E}">
-        <p14:creationId xmlns:p14="http://schemas.microsoft.com/office/powerpoint/2010/main" val="1454520784"/>
       </p:ext>
     </p:extLst>
   </p:cSld>
@@ -12651,7 +12983,7 @@
         </p:nvSpPr>
         <p:spPr>
           <a:xfrm>
-            <a:off x="179512" y="1475492"/>
+            <a:off x="215516" y="1475492"/>
             <a:ext cx="972108" cy="369332"/>
           </a:xfrm>
           <a:prstGeom prst="rect">
@@ -12666,8 +12998,8 @@
           <a:lstStyle/>
           <a:p>
             <a:r>
-              <a:rPr lang="en-US" altLang="zh-CN" dirty="0" smtClean="0"/>
-              <a:t>More…</a:t>
+              <a:rPr lang="en-US" dirty="0" smtClean="0"/>
+              <a:t>Factory</a:t>
             </a:r>
             <a:endParaRPr lang="en-US" dirty="0"/>
           </a:p>
@@ -12696,8 +13028,8 @@
         </p:blipFill>
         <p:spPr bwMode="auto">
           <a:xfrm>
-            <a:off x="0" y="1772816"/>
-            <a:ext cx="9144000" cy="3228975"/>
+            <a:off x="1743075" y="1604963"/>
+            <a:ext cx="5657850" cy="3648075"/>
           </a:xfrm>
           <a:prstGeom prst="rect">
             <a:avLst/>
@@ -12777,32 +13109,88 @@
       </p:grpSpPr>
       <p:sp>
         <p:nvSpPr>
-          <p:cNvPr id="3" name="矩形 2"/>
-          <p:cNvSpPr/>
+          <p:cNvPr id="3" name="Rectangle 2"/>
+          <p:cNvSpPr>
+            <a:spLocks noGrp="1" noChangeArrowheads="1"/>
+          </p:cNvSpPr>
+          <p:nvPr>
+            <p:ph type="title"/>
+          </p:nvPr>
+        </p:nvSpPr>
+        <p:spPr>
+          <a:xfrm>
+            <a:off x="628650" y="365127"/>
+            <a:ext cx="7886700" cy="1119658"/>
+          </a:xfrm>
+        </p:spPr>
+        <p:txBody>
+          <a:bodyPr>
+            <a:normAutofit/>
+          </a:bodyPr>
+          <a:lstStyle/>
+          <a:p>
+            <a:r>
+              <a:rPr lang="en-US" altLang="zh-CN" dirty="0" smtClean="0"/>
+              <a:t>Abstract Factory</a:t>
+            </a:r>
+            <a:endParaRPr lang="zh-CN" altLang="en-US" dirty="0"/>
+          </a:p>
+        </p:txBody>
+      </p:sp>
+      <p:sp>
+        <p:nvSpPr>
+          <p:cNvPr id="2" name="TextBox 1"/>
+          <p:cNvSpPr txBox="1"/>
           <p:nvPr/>
         </p:nvSpPr>
         <p:spPr>
           <a:xfrm>
-            <a:off x="683568" y="1772816"/>
-            <a:ext cx="7776864" cy="3416320"/>
+            <a:off x="179512" y="1475492"/>
+            <a:ext cx="972108" cy="369332"/>
           </a:xfrm>
           <a:prstGeom prst="rect">
             <a:avLst/>
           </a:prstGeom>
+          <a:noFill/>
         </p:spPr>
         <p:txBody>
-          <a:bodyPr wrap="square">
+          <a:bodyPr wrap="square" rtlCol="0">
             <a:spAutoFit/>
           </a:bodyPr>
           <a:lstStyle/>
           <a:p>
-            <a:pPr>
-              <a:spcBef>
-                <a:spcPct val="0"/>
-              </a:spcBef>
-            </a:pPr>
-            <a:r>
-              <a:rPr lang="zh-CN" altLang="en-US" sz="1900" b="1" spc="50" dirty="0" smtClean="0">
+            <a:r>
+              <a:rPr lang="en-US" altLang="zh-CN" dirty="0" smtClean="0"/>
+              <a:t>More…</a:t>
+            </a:r>
+            <a:endParaRPr lang="en-US" dirty="0"/>
+          </a:p>
+        </p:txBody>
+      </p:sp>
+      <p:sp>
+        <p:nvSpPr>
+          <p:cNvPr id="5" name="TextBox 4"/>
+          <p:cNvSpPr txBox="1"/>
+          <p:nvPr/>
+        </p:nvSpPr>
+        <p:spPr>
+          <a:xfrm>
+            <a:off x="3491880" y="5229200"/>
+            <a:ext cx="2304256" cy="338554"/>
+          </a:xfrm>
+          <a:prstGeom prst="rect">
+            <a:avLst/>
+          </a:prstGeom>
+          <a:noFill/>
+        </p:spPr>
+        <p:txBody>
+          <a:bodyPr wrap="square" rtlCol="0">
+            <a:spAutoFit/>
+          </a:bodyPr>
+          <a:lstStyle/>
+          <a:p>
+            <a:r>
+              <a:rPr lang="zh-CN" altLang="en-US" sz="1600" b="1" spc="50" dirty="0">
                 <a:ln w="12700">
                   <a:noFill/>
                   <a:prstDash val="solid"/>
@@ -12814,39 +13202,9 @@
                 <a:ea typeface="+mj-ea"/>
                 <a:cs typeface="+mj-cs"/>
               </a:rPr>
-              <a:t>动机</a:t>
-            </a:r>
-            <a:r>
-              <a:rPr lang="en-US" altLang="zh-CN" sz="1900" b="1" spc="50" dirty="0" smtClean="0">
-                <a:ln w="12700">
-                  <a:noFill/>
-                  <a:prstDash val="solid"/>
-                </a:ln>
-                <a:solidFill>
-                  <a:schemeClr val="accent4"/>
-                </a:solidFill>
-                <a:latin typeface="+mj-lt"/>
-                <a:ea typeface="+mj-ea"/>
-                <a:cs typeface="+mj-cs"/>
-              </a:rPr>
-              <a:t>(Motivate)</a:t>
-            </a:r>
-            <a:r>
-              <a:rPr lang="zh-CN" altLang="en-US" sz="1900" b="1" spc="50" dirty="0" smtClean="0">
-                <a:ln w="12700">
-                  <a:noFill/>
-                  <a:prstDash val="solid"/>
-                </a:ln>
-                <a:solidFill>
-                  <a:schemeClr val="accent4"/>
-                </a:solidFill>
-                <a:latin typeface="+mj-lt"/>
-                <a:ea typeface="+mj-ea"/>
-                <a:cs typeface="+mj-cs"/>
-              </a:rPr>
-              <a:t>：</a:t>
-            </a:r>
-            <a:endParaRPr lang="en-US" altLang="zh-CN" sz="1900" b="1" spc="50" dirty="0" smtClean="0">
+              <a:t>具体实现，参考代码</a:t>
+            </a:r>
+            <a:endParaRPr lang="en-US" sz="1600" b="1" spc="50" dirty="0">
               <a:ln w="12700">
                 <a:noFill/>
                 <a:prstDash val="solid"/>
@@ -12859,13 +13217,76 @@
               <a:cs typeface="+mj-cs"/>
             </a:endParaRPr>
           </a:p>
-          <a:p>
-            <a:pPr>
-              <a:spcBef>
-                <a:spcPct val="0"/>
-              </a:spcBef>
-            </a:pPr>
-            <a:endParaRPr lang="zh-CN" altLang="en-US" sz="1900" b="1" spc="50" dirty="0" smtClean="0">
+        </p:txBody>
+      </p:sp>
+      <p:sp>
+        <p:nvSpPr>
+          <p:cNvPr id="6" name="TextBox 5"/>
+          <p:cNvSpPr txBox="1"/>
+          <p:nvPr/>
+        </p:nvSpPr>
+        <p:spPr>
+          <a:xfrm>
+            <a:off x="179512" y="5733256"/>
+            <a:ext cx="3528392" cy="338554"/>
+          </a:xfrm>
+          <a:prstGeom prst="rect">
+            <a:avLst/>
+          </a:prstGeom>
+          <a:noFill/>
+        </p:spPr>
+        <p:txBody>
+          <a:bodyPr wrap="square" rtlCol="0">
+            <a:spAutoFit/>
+          </a:bodyPr>
+          <a:lstStyle/>
+          <a:p>
+            <a:r>
+              <a:rPr lang="en-US" sz="1600" b="1" spc="50" dirty="0">
+                <a:ln w="12700">
+                  <a:noFill/>
+                  <a:prstDash val="solid"/>
+                </a:ln>
+                <a:solidFill>
+                  <a:schemeClr val="accent4"/>
+                </a:solidFill>
+                <a:latin typeface="+mj-lt"/>
+                <a:ea typeface="+mj-ea"/>
+                <a:cs typeface="+mj-cs"/>
+              </a:rPr>
+              <a:t>Future: 	</a:t>
+            </a:r>
+            <a:r>
+              <a:rPr lang="en-US" sz="1600" b="1" spc="50" dirty="0">
+                <a:ln w="12700">
+                  <a:noFill/>
+                  <a:prstDash val="solid"/>
+                </a:ln>
+                <a:solidFill>
+                  <a:schemeClr val="accent4"/>
+                </a:solidFill>
+                <a:latin typeface="+mj-lt"/>
+                <a:ea typeface="+mj-ea"/>
+                <a:cs typeface="+mj-cs"/>
+              </a:rPr>
+              <a:t>GoogleFamilyFactoryV1</a:t>
+            </a:r>
+            <a:r>
+              <a:rPr lang="en-US" sz="1600" b="1" spc="50" dirty="0">
+                <a:ln w="12700">
+                  <a:noFill/>
+                  <a:prstDash val="solid"/>
+                </a:ln>
+                <a:solidFill>
+                  <a:schemeClr val="accent4"/>
+                </a:solidFill>
+                <a:latin typeface="+mj-lt"/>
+                <a:ea typeface="+mj-ea"/>
+                <a:cs typeface="+mj-cs"/>
+              </a:rPr>
+              <a:t>?</a:t>
+            </a:r>
+            <a:endParaRPr lang="en-US" sz="1600" b="1" spc="50" dirty="0">
               <a:ln w="12700">
                 <a:noFill/>
                 <a:prstDash val="solid"/>
@@ -12878,510 +13299,83 @@
               <a:cs typeface="+mj-cs"/>
             </a:endParaRPr>
           </a:p>
-          <a:p>
-            <a:pPr>
-              <a:spcBef>
-                <a:spcPct val="0"/>
-              </a:spcBef>
-            </a:pPr>
-            <a:r>
-              <a:rPr lang="zh-CN" altLang="en-US" sz="1600" b="1" spc="50" dirty="0" smtClean="0">
-                <a:ln w="12700">
-                  <a:noFill/>
-                  <a:prstDash val="solid"/>
-                </a:ln>
-                <a:solidFill>
-                  <a:schemeClr val="accent4"/>
-                </a:solidFill>
-                <a:latin typeface="+mj-lt"/>
-                <a:ea typeface="+mj-ea"/>
-                <a:cs typeface="+mj-cs"/>
-              </a:rPr>
-              <a:t>    </a:t>
-            </a:r>
-            <a:r>
-              <a:rPr lang="zh-CN" altLang="en-US" sz="1600" spc="50" dirty="0" smtClean="0">
-                <a:ln w="12700">
-                  <a:noFill/>
-                  <a:prstDash val="solid"/>
-                </a:ln>
-                <a:solidFill>
-                  <a:schemeClr val="accent4"/>
-                </a:solidFill>
-                <a:latin typeface="+mj-lt"/>
-                <a:ea typeface="+mj-ea"/>
-                <a:cs typeface="+mj-cs"/>
-              </a:rPr>
-              <a:t>在软件系统中，经常面临着</a:t>
-            </a:r>
-            <a:r>
-              <a:rPr lang="en-US" altLang="zh-CN" sz="1600" spc="50" dirty="0" smtClean="0">
-                <a:ln w="12700">
-                  <a:noFill/>
-                  <a:prstDash val="solid"/>
-                </a:ln>
-                <a:solidFill>
-                  <a:schemeClr val="accent4"/>
-                </a:solidFill>
-                <a:latin typeface="+mj-lt"/>
-                <a:ea typeface="+mj-ea"/>
-                <a:cs typeface="+mj-cs"/>
-              </a:rPr>
-              <a:t>"</a:t>
-            </a:r>
-            <a:r>
-              <a:rPr lang="zh-CN" altLang="en-US" sz="1600" spc="50" dirty="0" smtClean="0">
-                <a:ln w="12700">
-                  <a:noFill/>
-                  <a:prstDash val="solid"/>
-                </a:ln>
-                <a:solidFill>
-                  <a:schemeClr val="accent4"/>
-                </a:solidFill>
-                <a:latin typeface="+mj-lt"/>
-                <a:ea typeface="+mj-ea"/>
-                <a:cs typeface="+mj-cs"/>
-              </a:rPr>
-              <a:t>一系统相互依赖的对象</a:t>
-            </a:r>
-            <a:r>
-              <a:rPr lang="en-US" altLang="zh-CN" sz="1600" spc="50" dirty="0" smtClean="0">
-                <a:ln w="12700">
-                  <a:noFill/>
-                  <a:prstDash val="solid"/>
-                </a:ln>
-                <a:solidFill>
-                  <a:schemeClr val="accent4"/>
-                </a:solidFill>
-                <a:latin typeface="+mj-lt"/>
-                <a:ea typeface="+mj-ea"/>
-                <a:cs typeface="+mj-cs"/>
-              </a:rPr>
-              <a:t>"</a:t>
-            </a:r>
-            <a:r>
-              <a:rPr lang="zh-CN" altLang="en-US" sz="1600" spc="50" dirty="0" smtClean="0">
-                <a:ln w="12700">
-                  <a:noFill/>
-                  <a:prstDash val="solid"/>
-                </a:ln>
-                <a:solidFill>
-                  <a:schemeClr val="accent4"/>
-                </a:solidFill>
-                <a:latin typeface="+mj-lt"/>
-                <a:ea typeface="+mj-ea"/>
-                <a:cs typeface="+mj-cs"/>
-              </a:rPr>
-              <a:t>的创建工作：同时，由于需求的变化，往往存在更多系列对象的创建工作。</a:t>
-            </a:r>
-          </a:p>
-          <a:p>
-            <a:pPr>
-              <a:spcBef>
-                <a:spcPct val="0"/>
-              </a:spcBef>
-            </a:pPr>
-            <a:r>
-              <a:rPr lang="zh-CN" altLang="en-US" sz="1600" spc="50" dirty="0" smtClean="0">
-                <a:ln w="12700">
-                  <a:noFill/>
-                  <a:prstDash val="solid"/>
-                </a:ln>
-                <a:solidFill>
-                  <a:schemeClr val="accent4"/>
-                </a:solidFill>
-                <a:latin typeface="+mj-lt"/>
-                <a:ea typeface="+mj-ea"/>
-                <a:cs typeface="+mj-cs"/>
-              </a:rPr>
-              <a:t>    如何应对这种变化？如何绕过常规的对象创建方法（</a:t>
-            </a:r>
-            <a:r>
-              <a:rPr lang="en-US" altLang="zh-CN" sz="1600" spc="50" dirty="0" smtClean="0">
-                <a:ln w="12700">
-                  <a:noFill/>
-                  <a:prstDash val="solid"/>
-                </a:ln>
-                <a:solidFill>
-                  <a:schemeClr val="accent4"/>
-                </a:solidFill>
-                <a:latin typeface="+mj-lt"/>
-                <a:ea typeface="+mj-ea"/>
-                <a:cs typeface="+mj-cs"/>
-              </a:rPr>
-              <a:t>new),</a:t>
-            </a:r>
-            <a:r>
-              <a:rPr lang="zh-CN" altLang="en-US" sz="1600" spc="50" dirty="0" smtClean="0">
-                <a:ln w="12700">
-                  <a:noFill/>
-                  <a:prstDash val="solid"/>
-                </a:ln>
-                <a:solidFill>
-                  <a:schemeClr val="accent4"/>
-                </a:solidFill>
-                <a:latin typeface="+mj-lt"/>
-                <a:ea typeface="+mj-ea"/>
-                <a:cs typeface="+mj-cs"/>
-              </a:rPr>
-              <a:t>提供一种</a:t>
-            </a:r>
-            <a:r>
-              <a:rPr lang="en-US" altLang="zh-CN" sz="1600" spc="50" dirty="0" smtClean="0">
-                <a:ln w="12700">
-                  <a:noFill/>
-                  <a:prstDash val="solid"/>
-                </a:ln>
-                <a:solidFill>
-                  <a:schemeClr val="accent4"/>
-                </a:solidFill>
-                <a:latin typeface="+mj-lt"/>
-                <a:ea typeface="+mj-ea"/>
-                <a:cs typeface="+mj-cs"/>
-              </a:rPr>
-              <a:t>"</a:t>
-            </a:r>
-            <a:r>
-              <a:rPr lang="zh-CN" altLang="en-US" sz="1600" spc="50" dirty="0" smtClean="0">
-                <a:ln w="12700">
-                  <a:noFill/>
-                  <a:prstDash val="solid"/>
-                </a:ln>
-                <a:solidFill>
-                  <a:schemeClr val="accent4"/>
-                </a:solidFill>
-                <a:latin typeface="+mj-lt"/>
-                <a:ea typeface="+mj-ea"/>
-                <a:cs typeface="+mj-cs"/>
-              </a:rPr>
-              <a:t>封装机制</a:t>
-            </a:r>
-            <a:r>
-              <a:rPr lang="en-US" altLang="zh-CN" sz="1600" spc="50" dirty="0" smtClean="0">
-                <a:ln w="12700">
-                  <a:noFill/>
-                  <a:prstDash val="solid"/>
-                </a:ln>
-                <a:solidFill>
-                  <a:schemeClr val="accent4"/>
-                </a:solidFill>
-                <a:latin typeface="+mj-lt"/>
-                <a:ea typeface="+mj-ea"/>
-                <a:cs typeface="+mj-cs"/>
-              </a:rPr>
-              <a:t>"</a:t>
-            </a:r>
-            <a:r>
-              <a:rPr lang="zh-CN" altLang="en-US" sz="1600" spc="50" dirty="0" smtClean="0">
-                <a:ln w="12700">
-                  <a:noFill/>
-                  <a:prstDash val="solid"/>
-                </a:ln>
-                <a:solidFill>
-                  <a:schemeClr val="accent4"/>
-                </a:solidFill>
-                <a:latin typeface="+mj-lt"/>
-                <a:ea typeface="+mj-ea"/>
-                <a:cs typeface="+mj-cs"/>
-              </a:rPr>
-              <a:t>来避免客户程序和这种</a:t>
-            </a:r>
-            <a:r>
-              <a:rPr lang="en-US" altLang="zh-CN" sz="1600" spc="50" dirty="0" smtClean="0">
-                <a:ln w="12700">
-                  <a:noFill/>
-                  <a:prstDash val="solid"/>
-                </a:ln>
-                <a:solidFill>
-                  <a:schemeClr val="accent4"/>
-                </a:solidFill>
-                <a:latin typeface="+mj-lt"/>
-                <a:ea typeface="+mj-ea"/>
-                <a:cs typeface="+mj-cs"/>
-              </a:rPr>
-              <a:t>"</a:t>
-            </a:r>
-            <a:r>
-              <a:rPr lang="zh-CN" altLang="en-US" sz="1600" spc="50" dirty="0" smtClean="0">
-                <a:ln w="12700">
-                  <a:noFill/>
-                  <a:prstDash val="solid"/>
-                </a:ln>
-                <a:solidFill>
-                  <a:schemeClr val="accent4"/>
-                </a:solidFill>
-                <a:latin typeface="+mj-lt"/>
-                <a:ea typeface="+mj-ea"/>
-                <a:cs typeface="+mj-cs"/>
-              </a:rPr>
-              <a:t>多系列具体对象创建工作</a:t>
-            </a:r>
-            <a:r>
-              <a:rPr lang="en-US" altLang="zh-CN" sz="1600" spc="50" dirty="0" smtClean="0">
-                <a:ln w="12700">
-                  <a:noFill/>
-                  <a:prstDash val="solid"/>
-                </a:ln>
-                <a:solidFill>
-                  <a:schemeClr val="accent4"/>
-                </a:solidFill>
-                <a:latin typeface="+mj-lt"/>
-                <a:ea typeface="+mj-ea"/>
-                <a:cs typeface="+mj-cs"/>
-              </a:rPr>
-              <a:t>"</a:t>
-            </a:r>
-            <a:r>
-              <a:rPr lang="zh-CN" altLang="en-US" sz="1600" spc="50" dirty="0" smtClean="0">
-                <a:ln w="12700">
-                  <a:noFill/>
-                  <a:prstDash val="solid"/>
-                </a:ln>
-                <a:solidFill>
-                  <a:schemeClr val="accent4"/>
-                </a:solidFill>
-                <a:latin typeface="+mj-lt"/>
-                <a:ea typeface="+mj-ea"/>
-                <a:cs typeface="+mj-cs"/>
-              </a:rPr>
-              <a:t>的紧耦合？</a:t>
-            </a:r>
-          </a:p>
-          <a:p>
-            <a:pPr>
-              <a:spcBef>
-                <a:spcPct val="0"/>
-              </a:spcBef>
-            </a:pPr>
-            <a:r>
-              <a:rPr lang="zh-CN" altLang="en-US" sz="1900" b="1" spc="50" dirty="0" smtClean="0">
-                <a:ln w="12700">
-                  <a:noFill/>
-                  <a:prstDash val="solid"/>
-                </a:ln>
-                <a:solidFill>
-                  <a:schemeClr val="accent4"/>
-                </a:solidFill>
-                <a:latin typeface="+mj-lt"/>
-                <a:ea typeface="+mj-ea"/>
-                <a:cs typeface="+mj-cs"/>
-              </a:rPr>
-              <a:t> </a:t>
-            </a:r>
-            <a:endParaRPr lang="en-US" altLang="zh-CN" sz="1900" b="1" spc="50" dirty="0" smtClean="0">
-              <a:ln w="12700">
-                <a:noFill/>
-                <a:prstDash val="solid"/>
-              </a:ln>
-              <a:solidFill>
-                <a:schemeClr val="accent4"/>
-              </a:solidFill>
-              <a:latin typeface="+mj-lt"/>
-              <a:ea typeface="+mj-ea"/>
-              <a:cs typeface="+mj-cs"/>
-            </a:endParaRPr>
-          </a:p>
-          <a:p>
-            <a:pPr>
-              <a:spcBef>
-                <a:spcPct val="0"/>
-              </a:spcBef>
-            </a:pPr>
-            <a:endParaRPr lang="en-US" altLang="zh-CN" sz="1900" b="1" spc="50" dirty="0">
-              <a:ln w="12700">
-                <a:noFill/>
-                <a:prstDash val="solid"/>
-              </a:ln>
-              <a:solidFill>
-                <a:schemeClr val="accent4"/>
-              </a:solidFill>
-              <a:latin typeface="+mj-lt"/>
-              <a:ea typeface="+mj-ea"/>
-              <a:cs typeface="+mj-cs"/>
-            </a:endParaRPr>
-          </a:p>
-          <a:p>
-            <a:pPr>
-              <a:spcBef>
-                <a:spcPct val="0"/>
-              </a:spcBef>
-            </a:pPr>
-            <a:endParaRPr lang="zh-CN" altLang="en-US" sz="1900" b="1" spc="50" dirty="0" smtClean="0">
-              <a:ln w="12700">
-                <a:noFill/>
-                <a:prstDash val="solid"/>
-              </a:ln>
-              <a:solidFill>
-                <a:schemeClr val="accent4"/>
-              </a:solidFill>
-              <a:latin typeface="+mj-lt"/>
-              <a:ea typeface="+mj-ea"/>
-              <a:cs typeface="+mj-cs"/>
-            </a:endParaRPr>
-          </a:p>
-          <a:p>
-            <a:pPr>
-              <a:spcBef>
-                <a:spcPct val="0"/>
-              </a:spcBef>
-            </a:pPr>
-            <a:r>
-              <a:rPr lang="zh-CN" altLang="en-US" sz="1900" b="1" spc="50" dirty="0" smtClean="0">
-                <a:ln w="12700">
-                  <a:noFill/>
-                  <a:prstDash val="solid"/>
-                </a:ln>
-                <a:solidFill>
-                  <a:schemeClr val="accent4"/>
-                </a:solidFill>
-                <a:latin typeface="+mj-lt"/>
-                <a:ea typeface="+mj-ea"/>
-                <a:cs typeface="+mj-cs"/>
-              </a:rPr>
-              <a:t>意图</a:t>
-            </a:r>
-            <a:r>
-              <a:rPr lang="en-US" altLang="zh-CN" sz="1900" b="1" spc="50" dirty="0" smtClean="0">
-                <a:ln w="12700">
-                  <a:noFill/>
-                  <a:prstDash val="solid"/>
-                </a:ln>
-                <a:solidFill>
-                  <a:schemeClr val="accent4"/>
-                </a:solidFill>
-                <a:latin typeface="+mj-lt"/>
-                <a:ea typeface="+mj-ea"/>
-                <a:cs typeface="+mj-cs"/>
-              </a:rPr>
-              <a:t>(Intent):</a:t>
-            </a:r>
-          </a:p>
-          <a:p>
-            <a:pPr>
-              <a:spcBef>
-                <a:spcPct val="0"/>
-              </a:spcBef>
-            </a:pPr>
-            <a:endParaRPr lang="zh-CN" altLang="en-US" sz="1900" b="1" spc="50" dirty="0" smtClean="0">
-              <a:ln w="12700">
-                <a:noFill/>
-                <a:prstDash val="solid"/>
-              </a:ln>
-              <a:solidFill>
-                <a:schemeClr val="accent4"/>
-              </a:solidFill>
-              <a:latin typeface="+mj-lt"/>
-              <a:ea typeface="+mj-ea"/>
-              <a:cs typeface="+mj-cs"/>
-            </a:endParaRPr>
-          </a:p>
-          <a:p>
-            <a:pPr>
-              <a:spcBef>
-                <a:spcPct val="0"/>
-              </a:spcBef>
-            </a:pPr>
-            <a:r>
-              <a:rPr lang="zh-CN" altLang="en-US" sz="1900" b="1" spc="50" dirty="0" smtClean="0">
-                <a:ln w="12700">
-                  <a:noFill/>
-                  <a:prstDash val="solid"/>
-                </a:ln>
-                <a:solidFill>
-                  <a:schemeClr val="accent4"/>
-                </a:solidFill>
-                <a:latin typeface="+mj-lt"/>
-                <a:ea typeface="+mj-ea"/>
-                <a:cs typeface="+mj-cs"/>
-              </a:rPr>
-              <a:t>    </a:t>
-            </a:r>
-            <a:r>
-              <a:rPr lang="zh-CN" altLang="en-US" sz="1600" spc="50" dirty="0" smtClean="0">
-                <a:ln w="12700">
-                  <a:noFill/>
-                  <a:prstDash val="solid"/>
-                </a:ln>
-                <a:solidFill>
-                  <a:schemeClr val="accent4"/>
-                </a:solidFill>
-                <a:latin typeface="+mj-lt"/>
-                <a:ea typeface="+mj-ea"/>
-                <a:cs typeface="+mj-cs"/>
-              </a:rPr>
-              <a:t>提供一个创建一系列相关或相互依赖对象的接口，而无需指定它们具体的类。</a:t>
-            </a:r>
-            <a:endParaRPr lang="zh-CN" altLang="en-US" sz="1600" spc="50" dirty="0">
-              <a:ln w="12700">
-                <a:noFill/>
-                <a:prstDash val="solid"/>
-              </a:ln>
-              <a:solidFill>
-                <a:schemeClr val="accent4"/>
-              </a:solidFill>
-              <a:latin typeface="+mj-lt"/>
-              <a:ea typeface="+mj-ea"/>
-              <a:cs typeface="+mj-cs"/>
-            </a:endParaRPr>
-          </a:p>
         </p:txBody>
       </p:sp>
-      <p:sp>
-        <p:nvSpPr>
-          <p:cNvPr id="4" name="Rectangle 2"/>
-          <p:cNvSpPr txBox="1">
-            <a:spLocks noChangeArrowheads="1"/>
-          </p:cNvSpPr>
+      <p:pic>
+        <p:nvPicPr>
+          <p:cNvPr id="4098" name="Picture 2"/>
+          <p:cNvPicPr>
+            <a:picLocks noChangeAspect="1" noChangeArrowheads="1"/>
+          </p:cNvPicPr>
           <p:nvPr/>
-        </p:nvSpPr>
-        <p:spPr>
+        </p:nvPicPr>
+        <p:blipFill>
+          <a:blip r:embed="rId3">
+            <a:extLst>
+              <a:ext uri="{28A0092B-C50C-407E-A947-70E740481C1C}">
+                <a14:useLocalDpi xmlns:a14="http://schemas.microsoft.com/office/drawing/2010/main" val="0"/>
+              </a:ext>
+            </a:extLst>
+          </a:blip>
+          <a:srcRect/>
+          <a:stretch>
+            <a:fillRect/>
+          </a:stretch>
+        </p:blipFill>
+        <p:spPr bwMode="auto">
           <a:xfrm>
-            <a:off x="628650" y="365127"/>
-            <a:ext cx="7886700" cy="1119658"/>
+            <a:off x="1" y="1814513"/>
+            <a:ext cx="9144000" cy="3228975"/>
           </a:xfrm>
           <a:prstGeom prst="rect">
             <a:avLst/>
           </a:prstGeom>
+          <a:noFill/>
+          <a:ln>
+            <a:noFill/>
+          </a:ln>
+          <a:effectLst/>
+          <a:extLst>
+            <a:ext uri="{909E8E84-426E-40DD-AFC4-6F175D3DCCD1}">
+              <a14:hiddenFill xmlns:a14="http://schemas.microsoft.com/office/drawing/2010/main">
+                <a:solidFill>
+                  <a:schemeClr val="accent1"/>
+                </a:solidFill>
+              </a14:hiddenFill>
+            </a:ext>
+            <a:ext uri="{91240B29-F687-4F45-9708-019B960494DF}">
+              <a14:hiddenLine xmlns:a14="http://schemas.microsoft.com/office/drawing/2010/main" w="9525">
+                <a:solidFill>
+                  <a:schemeClr val="tx1"/>
+                </a:solidFill>
+                <a:miter lim="800000"/>
+                <a:headEnd/>
+                <a:tailEnd/>
+              </a14:hiddenLine>
+            </a:ext>
+            <a:ext uri="{AF507438-7753-43E0-B8FC-AC1667EBCBE1}">
+              <a14:hiddenEffects xmlns:a14="http://schemas.microsoft.com/office/drawing/2010/main">
+                <a:effectLst>
+                  <a:outerShdw dist="35921" dir="2700000" algn="ctr" rotWithShape="0">
+                    <a:schemeClr val="bg2"/>
+                  </a:outerShdw>
+                </a:effectLst>
+              </a14:hiddenEffects>
+            </a:ext>
+          </a:extLst>
         </p:spPr>
-        <p:txBody>
-          <a:bodyPr vert="horz" lIns="91440" tIns="45720" rIns="91440" bIns="45720" rtlCol="0" anchor="ctr">
-            <a:normAutofit/>
-          </a:bodyPr>
-          <a:lstStyle>
-            <a:lvl1pPr algn="ctr" defTabSz="914400" rtl="0" eaLnBrk="1" latinLnBrk="0" hangingPunct="1">
-              <a:spcBef>
-                <a:spcPct val="0"/>
-              </a:spcBef>
-              <a:buNone/>
-              <a:defRPr sz="4400" kern="1200">
-                <a:solidFill>
-                  <a:schemeClr val="tx1"/>
-                </a:solidFill>
-                <a:latin typeface="+mj-lt"/>
-                <a:ea typeface="+mj-ea"/>
-                <a:cs typeface="+mj-cs"/>
-              </a:defRPr>
-            </a:lvl1pPr>
-          </a:lstStyle>
-          <a:p>
-            <a:r>
-              <a:rPr lang="en-US" altLang="zh-CN" dirty="0" smtClean="0"/>
-              <a:t>Abstract Factory</a:t>
-            </a:r>
-            <a:endParaRPr lang="zh-CN" altLang="en-US" dirty="0"/>
-          </a:p>
-        </p:txBody>
-      </p:sp>
+      </p:pic>
     </p:spTree>
     <p:extLst>
       <p:ext uri="{BB962C8B-B14F-4D97-AF65-F5344CB8AC3E}">
-        <p14:creationId xmlns:p14="http://schemas.microsoft.com/office/powerpoint/2010/main" val="1262784776"/>
+        <p14:creationId xmlns:p14="http://schemas.microsoft.com/office/powerpoint/2010/main" val="1454520784"/>
       </p:ext>
     </p:extLst>
   </p:cSld>
   <p:clrMapOvr>
     <a:masterClrMapping/>
   </p:clrMapOvr>
+  <p:transition/>
   <p:timing>
     <p:tnLst>
       <p:par>
@@ -13417,23 +13411,16 @@
         </p:nvSpPr>
         <p:spPr>
           <a:xfrm>
-            <a:off x="683568" y="1700808"/>
-            <a:ext cx="7776864" cy="576064"/>
+            <a:off x="683568" y="1772816"/>
+            <a:ext cx="7776864" cy="3416320"/>
           </a:xfrm>
           <a:prstGeom prst="rect">
             <a:avLst/>
           </a:prstGeom>
         </p:spPr>
         <p:txBody>
-          <a:bodyPr vert="horz" rtlCol="0" anchor="ctr">
-            <a:normAutofit/>
-            <a:scene3d>
-              <a:camera prst="orthographicFront"/>
-              <a:lightRig rig="soft" dir="t"/>
-            </a:scene3d>
-            <a:sp3d prstMaterial="matte">
-              <a:bevelT w="12700" h="12700"/>
-            </a:sp3d>
+          <a:bodyPr wrap="square">
+            <a:spAutoFit/>
           </a:bodyPr>
           <a:lstStyle/>
           <a:p>
@@ -13451,11 +13438,14 @@
                 <a:solidFill>
                   <a:schemeClr val="accent4"/>
                 </a:solidFill>
-              </a:rPr>
-              <a:t>结构</a:t>
-            </a:r>
-            <a:r>
-              <a:rPr lang="en-US" altLang="zh-CN" sz="1900" b="1" spc="50" dirty="0">
+                <a:latin typeface="+mj-lt"/>
+                <a:ea typeface="+mj-ea"/>
+                <a:cs typeface="+mj-cs"/>
+              </a:rPr>
+              <a:t>动机</a:t>
+            </a:r>
+            <a:r>
+              <a:rPr lang="en-US" altLang="zh-CN" sz="1900" b="1" spc="50" dirty="0" smtClean="0">
                 <a:ln w="12700">
                   <a:noFill/>
                   <a:prstDash val="solid"/>
@@ -13463,8 +13453,11 @@
                 <a:solidFill>
                   <a:schemeClr val="accent4"/>
                 </a:solidFill>
-              </a:rPr>
-              <a:t>(Structure)</a:t>
+                <a:latin typeface="+mj-lt"/>
+                <a:ea typeface="+mj-ea"/>
+                <a:cs typeface="+mj-cs"/>
+              </a:rPr>
+              <a:t>(Motivate)</a:t>
             </a:r>
             <a:r>
               <a:rPr lang="zh-CN" altLang="en-US" sz="1900" b="1" spc="50" dirty="0" smtClean="0">
@@ -13475,10 +13468,13 @@
                 <a:solidFill>
                   <a:schemeClr val="accent4"/>
                 </a:solidFill>
+                <a:latin typeface="+mj-lt"/>
+                <a:ea typeface="+mj-ea"/>
+                <a:cs typeface="+mj-cs"/>
               </a:rPr>
               <a:t>：</a:t>
             </a:r>
-            <a:endParaRPr lang="zh-CN" altLang="en-US" sz="1900" b="1" spc="50" dirty="0">
+            <a:endParaRPr lang="en-US" altLang="zh-CN" sz="1900" b="1" spc="50" dirty="0" smtClean="0">
               <a:ln w="12700">
                 <a:noFill/>
                 <a:prstDash val="solid"/>
@@ -13486,13 +13482,481 @@
               <a:solidFill>
                 <a:schemeClr val="accent4"/>
               </a:solidFill>
+              <a:latin typeface="+mj-lt"/>
+              <a:ea typeface="+mj-ea"/>
+              <a:cs typeface="+mj-cs"/>
+            </a:endParaRPr>
+          </a:p>
+          <a:p>
+            <a:pPr>
+              <a:spcBef>
+                <a:spcPct val="0"/>
+              </a:spcBef>
+            </a:pPr>
+            <a:endParaRPr lang="zh-CN" altLang="en-US" sz="1900" b="1" spc="50" dirty="0" smtClean="0">
+              <a:ln w="12700">
+                <a:noFill/>
+                <a:prstDash val="solid"/>
+              </a:ln>
+              <a:solidFill>
+                <a:schemeClr val="accent4"/>
+              </a:solidFill>
+              <a:latin typeface="+mj-lt"/>
+              <a:ea typeface="+mj-ea"/>
+              <a:cs typeface="+mj-cs"/>
+            </a:endParaRPr>
+          </a:p>
+          <a:p>
+            <a:pPr>
+              <a:spcBef>
+                <a:spcPct val="0"/>
+              </a:spcBef>
+            </a:pPr>
+            <a:r>
+              <a:rPr lang="zh-CN" altLang="en-US" sz="1600" b="1" spc="50" dirty="0" smtClean="0">
+                <a:ln w="12700">
+                  <a:noFill/>
+                  <a:prstDash val="solid"/>
+                </a:ln>
+                <a:solidFill>
+                  <a:schemeClr val="accent4"/>
+                </a:solidFill>
+                <a:latin typeface="+mj-lt"/>
+                <a:ea typeface="+mj-ea"/>
+                <a:cs typeface="+mj-cs"/>
+              </a:rPr>
+              <a:t>    </a:t>
+            </a:r>
+            <a:r>
+              <a:rPr lang="zh-CN" altLang="en-US" sz="1600" spc="50" dirty="0" smtClean="0">
+                <a:ln w="12700">
+                  <a:noFill/>
+                  <a:prstDash val="solid"/>
+                </a:ln>
+                <a:solidFill>
+                  <a:schemeClr val="accent4"/>
+                </a:solidFill>
+                <a:latin typeface="+mj-lt"/>
+                <a:ea typeface="+mj-ea"/>
+                <a:cs typeface="+mj-cs"/>
+              </a:rPr>
+              <a:t>在软件系统中，经常面临着</a:t>
+            </a:r>
+            <a:r>
+              <a:rPr lang="en-US" altLang="zh-CN" sz="1600" spc="50" dirty="0" smtClean="0">
+                <a:ln w="12700">
+                  <a:noFill/>
+                  <a:prstDash val="solid"/>
+                </a:ln>
+                <a:solidFill>
+                  <a:schemeClr val="accent4"/>
+                </a:solidFill>
+                <a:latin typeface="+mj-lt"/>
+                <a:ea typeface="+mj-ea"/>
+                <a:cs typeface="+mj-cs"/>
+              </a:rPr>
+              <a:t>"</a:t>
+            </a:r>
+            <a:r>
+              <a:rPr lang="zh-CN" altLang="en-US" sz="1600" spc="50" dirty="0" smtClean="0">
+                <a:ln w="12700">
+                  <a:noFill/>
+                  <a:prstDash val="solid"/>
+                </a:ln>
+                <a:solidFill>
+                  <a:schemeClr val="accent4"/>
+                </a:solidFill>
+                <a:latin typeface="+mj-lt"/>
+                <a:ea typeface="+mj-ea"/>
+                <a:cs typeface="+mj-cs"/>
+              </a:rPr>
+              <a:t>一系统相互依赖的对象</a:t>
+            </a:r>
+            <a:r>
+              <a:rPr lang="en-US" altLang="zh-CN" sz="1600" spc="50" dirty="0" smtClean="0">
+                <a:ln w="12700">
+                  <a:noFill/>
+                  <a:prstDash val="solid"/>
+                </a:ln>
+                <a:solidFill>
+                  <a:schemeClr val="accent4"/>
+                </a:solidFill>
+                <a:latin typeface="+mj-lt"/>
+                <a:ea typeface="+mj-ea"/>
+                <a:cs typeface="+mj-cs"/>
+              </a:rPr>
+              <a:t>"</a:t>
+            </a:r>
+            <a:r>
+              <a:rPr lang="zh-CN" altLang="en-US" sz="1600" spc="50" dirty="0" smtClean="0">
+                <a:ln w="12700">
+                  <a:noFill/>
+                  <a:prstDash val="solid"/>
+                </a:ln>
+                <a:solidFill>
+                  <a:schemeClr val="accent4"/>
+                </a:solidFill>
+                <a:latin typeface="+mj-lt"/>
+                <a:ea typeface="+mj-ea"/>
+                <a:cs typeface="+mj-cs"/>
+              </a:rPr>
+              <a:t>的创建工作：同时，由于需求的变化，往往存在更多系列对象的创建工作。</a:t>
+            </a:r>
+          </a:p>
+          <a:p>
+            <a:pPr>
+              <a:spcBef>
+                <a:spcPct val="0"/>
+              </a:spcBef>
+            </a:pPr>
+            <a:r>
+              <a:rPr lang="zh-CN" altLang="en-US" sz="1600" spc="50" dirty="0" smtClean="0">
+                <a:ln w="12700">
+                  <a:noFill/>
+                  <a:prstDash val="solid"/>
+                </a:ln>
+                <a:solidFill>
+                  <a:schemeClr val="accent4"/>
+                </a:solidFill>
+                <a:latin typeface="+mj-lt"/>
+                <a:ea typeface="+mj-ea"/>
+                <a:cs typeface="+mj-cs"/>
+              </a:rPr>
+              <a:t>    如何应对这种变化？如何绕过常规的对象创建方法（</a:t>
+            </a:r>
+            <a:r>
+              <a:rPr lang="en-US" altLang="zh-CN" sz="1600" spc="50" dirty="0" smtClean="0">
+                <a:ln w="12700">
+                  <a:noFill/>
+                  <a:prstDash val="solid"/>
+                </a:ln>
+                <a:solidFill>
+                  <a:schemeClr val="accent4"/>
+                </a:solidFill>
+                <a:latin typeface="+mj-lt"/>
+                <a:ea typeface="+mj-ea"/>
+                <a:cs typeface="+mj-cs"/>
+              </a:rPr>
+              <a:t>new),</a:t>
+            </a:r>
+            <a:r>
+              <a:rPr lang="zh-CN" altLang="en-US" sz="1600" spc="50" dirty="0" smtClean="0">
+                <a:ln w="12700">
+                  <a:noFill/>
+                  <a:prstDash val="solid"/>
+                </a:ln>
+                <a:solidFill>
+                  <a:schemeClr val="accent4"/>
+                </a:solidFill>
+                <a:latin typeface="+mj-lt"/>
+                <a:ea typeface="+mj-ea"/>
+                <a:cs typeface="+mj-cs"/>
+              </a:rPr>
+              <a:t>提供一种</a:t>
+            </a:r>
+            <a:r>
+              <a:rPr lang="en-US" altLang="zh-CN" sz="1600" spc="50" dirty="0" smtClean="0">
+                <a:ln w="12700">
+                  <a:noFill/>
+                  <a:prstDash val="solid"/>
+                </a:ln>
+                <a:solidFill>
+                  <a:schemeClr val="accent4"/>
+                </a:solidFill>
+                <a:latin typeface="+mj-lt"/>
+                <a:ea typeface="+mj-ea"/>
+                <a:cs typeface="+mj-cs"/>
+              </a:rPr>
+              <a:t>"</a:t>
+            </a:r>
+            <a:r>
+              <a:rPr lang="zh-CN" altLang="en-US" sz="1600" spc="50" dirty="0" smtClean="0">
+                <a:ln w="12700">
+                  <a:noFill/>
+                  <a:prstDash val="solid"/>
+                </a:ln>
+                <a:solidFill>
+                  <a:schemeClr val="accent4"/>
+                </a:solidFill>
+                <a:latin typeface="+mj-lt"/>
+                <a:ea typeface="+mj-ea"/>
+                <a:cs typeface="+mj-cs"/>
+              </a:rPr>
+              <a:t>封装机制</a:t>
+            </a:r>
+            <a:r>
+              <a:rPr lang="en-US" altLang="zh-CN" sz="1600" spc="50" dirty="0" smtClean="0">
+                <a:ln w="12700">
+                  <a:noFill/>
+                  <a:prstDash val="solid"/>
+                </a:ln>
+                <a:solidFill>
+                  <a:schemeClr val="accent4"/>
+                </a:solidFill>
+                <a:latin typeface="+mj-lt"/>
+                <a:ea typeface="+mj-ea"/>
+                <a:cs typeface="+mj-cs"/>
+              </a:rPr>
+              <a:t>"</a:t>
+            </a:r>
+            <a:r>
+              <a:rPr lang="zh-CN" altLang="en-US" sz="1600" spc="50" dirty="0" smtClean="0">
+                <a:ln w="12700">
+                  <a:noFill/>
+                  <a:prstDash val="solid"/>
+                </a:ln>
+                <a:solidFill>
+                  <a:schemeClr val="accent4"/>
+                </a:solidFill>
+                <a:latin typeface="+mj-lt"/>
+                <a:ea typeface="+mj-ea"/>
+                <a:cs typeface="+mj-cs"/>
+              </a:rPr>
+              <a:t>来避免客户程序和这种</a:t>
+            </a:r>
+            <a:r>
+              <a:rPr lang="en-US" altLang="zh-CN" sz="1600" spc="50" dirty="0" smtClean="0">
+                <a:ln w="12700">
+                  <a:noFill/>
+                  <a:prstDash val="solid"/>
+                </a:ln>
+                <a:solidFill>
+                  <a:schemeClr val="accent4"/>
+                </a:solidFill>
+                <a:latin typeface="+mj-lt"/>
+                <a:ea typeface="+mj-ea"/>
+                <a:cs typeface="+mj-cs"/>
+              </a:rPr>
+              <a:t>"</a:t>
+            </a:r>
+            <a:r>
+              <a:rPr lang="zh-CN" altLang="en-US" sz="1600" spc="50" dirty="0" smtClean="0">
+                <a:ln w="12700">
+                  <a:noFill/>
+                  <a:prstDash val="solid"/>
+                </a:ln>
+                <a:solidFill>
+                  <a:schemeClr val="accent4"/>
+                </a:solidFill>
+                <a:latin typeface="+mj-lt"/>
+                <a:ea typeface="+mj-ea"/>
+                <a:cs typeface="+mj-cs"/>
+              </a:rPr>
+              <a:t>多系列具体对象创建工作</a:t>
+            </a:r>
+            <a:r>
+              <a:rPr lang="en-US" altLang="zh-CN" sz="1600" spc="50" dirty="0" smtClean="0">
+                <a:ln w="12700">
+                  <a:noFill/>
+                  <a:prstDash val="solid"/>
+                </a:ln>
+                <a:solidFill>
+                  <a:schemeClr val="accent4"/>
+                </a:solidFill>
+                <a:latin typeface="+mj-lt"/>
+                <a:ea typeface="+mj-ea"/>
+                <a:cs typeface="+mj-cs"/>
+              </a:rPr>
+              <a:t>"</a:t>
+            </a:r>
+            <a:r>
+              <a:rPr lang="zh-CN" altLang="en-US" sz="1600" spc="50" dirty="0" smtClean="0">
+                <a:ln w="12700">
+                  <a:noFill/>
+                  <a:prstDash val="solid"/>
+                </a:ln>
+                <a:solidFill>
+                  <a:schemeClr val="accent4"/>
+                </a:solidFill>
+                <a:latin typeface="+mj-lt"/>
+                <a:ea typeface="+mj-ea"/>
+                <a:cs typeface="+mj-cs"/>
+              </a:rPr>
+              <a:t>的紧耦合？</a:t>
+            </a:r>
+          </a:p>
+          <a:p>
+            <a:pPr>
+              <a:spcBef>
+                <a:spcPct val="0"/>
+              </a:spcBef>
+            </a:pPr>
+            <a:r>
+              <a:rPr lang="zh-CN" altLang="en-US" sz="1900" b="1" spc="50" dirty="0" smtClean="0">
+                <a:ln w="12700">
+                  <a:noFill/>
+                  <a:prstDash val="solid"/>
+                </a:ln>
+                <a:solidFill>
+                  <a:schemeClr val="accent4"/>
+                </a:solidFill>
+                <a:latin typeface="+mj-lt"/>
+                <a:ea typeface="+mj-ea"/>
+                <a:cs typeface="+mj-cs"/>
+              </a:rPr>
+              <a:t> </a:t>
+            </a:r>
+            <a:endParaRPr lang="en-US" altLang="zh-CN" sz="1900" b="1" spc="50" dirty="0" smtClean="0">
+              <a:ln w="12700">
+                <a:noFill/>
+                <a:prstDash val="solid"/>
+              </a:ln>
+              <a:solidFill>
+                <a:schemeClr val="accent4"/>
+              </a:solidFill>
+              <a:latin typeface="+mj-lt"/>
+              <a:ea typeface="+mj-ea"/>
+              <a:cs typeface="+mj-cs"/>
+            </a:endParaRPr>
+          </a:p>
+          <a:p>
+            <a:pPr>
+              <a:spcBef>
+                <a:spcPct val="0"/>
+              </a:spcBef>
+            </a:pPr>
+            <a:endParaRPr lang="en-US" altLang="zh-CN" sz="1900" b="1" spc="50" dirty="0">
+              <a:ln w="12700">
+                <a:noFill/>
+                <a:prstDash val="solid"/>
+              </a:ln>
+              <a:solidFill>
+                <a:schemeClr val="accent4"/>
+              </a:solidFill>
+              <a:latin typeface="+mj-lt"/>
+              <a:ea typeface="+mj-ea"/>
+              <a:cs typeface="+mj-cs"/>
+            </a:endParaRPr>
+          </a:p>
+          <a:p>
+            <a:pPr>
+              <a:spcBef>
+                <a:spcPct val="0"/>
+              </a:spcBef>
+            </a:pPr>
+            <a:endParaRPr lang="zh-CN" altLang="en-US" sz="1900" b="1" spc="50" dirty="0" smtClean="0">
+              <a:ln w="12700">
+                <a:noFill/>
+                <a:prstDash val="solid"/>
+              </a:ln>
+              <a:solidFill>
+                <a:schemeClr val="accent4"/>
+              </a:solidFill>
+              <a:latin typeface="+mj-lt"/>
+              <a:ea typeface="+mj-ea"/>
+              <a:cs typeface="+mj-cs"/>
+            </a:endParaRPr>
+          </a:p>
+          <a:p>
+            <a:pPr>
+              <a:spcBef>
+                <a:spcPct val="0"/>
+              </a:spcBef>
+            </a:pPr>
+            <a:r>
+              <a:rPr lang="zh-CN" altLang="en-US" sz="1900" b="1" spc="50" dirty="0" smtClean="0">
+                <a:ln w="12700">
+                  <a:noFill/>
+                  <a:prstDash val="solid"/>
+                </a:ln>
+                <a:solidFill>
+                  <a:schemeClr val="accent4"/>
+                </a:solidFill>
+                <a:latin typeface="+mj-lt"/>
+                <a:ea typeface="+mj-ea"/>
+                <a:cs typeface="+mj-cs"/>
+              </a:rPr>
+              <a:t>意图</a:t>
+            </a:r>
+            <a:r>
+              <a:rPr lang="en-US" altLang="zh-CN" sz="1900" b="1" spc="50" dirty="0" smtClean="0">
+                <a:ln w="12700">
+                  <a:noFill/>
+                  <a:prstDash val="solid"/>
+                </a:ln>
+                <a:solidFill>
+                  <a:schemeClr val="accent4"/>
+                </a:solidFill>
+                <a:latin typeface="+mj-lt"/>
+                <a:ea typeface="+mj-ea"/>
+                <a:cs typeface="+mj-cs"/>
+              </a:rPr>
+              <a:t>(Intent):</a:t>
+            </a:r>
+          </a:p>
+          <a:p>
+            <a:pPr>
+              <a:spcBef>
+                <a:spcPct val="0"/>
+              </a:spcBef>
+            </a:pPr>
+            <a:endParaRPr lang="zh-CN" altLang="en-US" sz="1900" b="1" spc="50" dirty="0" smtClean="0">
+              <a:ln w="12700">
+                <a:noFill/>
+                <a:prstDash val="solid"/>
+              </a:ln>
+              <a:solidFill>
+                <a:schemeClr val="accent4"/>
+              </a:solidFill>
+              <a:latin typeface="+mj-lt"/>
+              <a:ea typeface="+mj-ea"/>
+              <a:cs typeface="+mj-cs"/>
+            </a:endParaRPr>
+          </a:p>
+          <a:p>
+            <a:pPr>
+              <a:spcBef>
+                <a:spcPct val="0"/>
+              </a:spcBef>
+            </a:pPr>
+            <a:r>
+              <a:rPr lang="zh-CN" altLang="en-US" sz="1900" b="1" spc="50" dirty="0" smtClean="0">
+                <a:ln w="12700">
+                  <a:noFill/>
+                  <a:prstDash val="solid"/>
+                </a:ln>
+                <a:solidFill>
+                  <a:schemeClr val="accent4"/>
+                </a:solidFill>
+                <a:latin typeface="+mj-lt"/>
+                <a:ea typeface="+mj-ea"/>
+                <a:cs typeface="+mj-cs"/>
+              </a:rPr>
+              <a:t>    </a:t>
+            </a:r>
+            <a:r>
+              <a:rPr lang="zh-CN" altLang="en-US" sz="1600" spc="50" dirty="0" smtClean="0">
+                <a:ln w="12700">
+                  <a:noFill/>
+                  <a:prstDash val="solid"/>
+                </a:ln>
+                <a:solidFill>
+                  <a:schemeClr val="accent4"/>
+                </a:solidFill>
+                <a:latin typeface="+mj-lt"/>
+                <a:ea typeface="+mj-ea"/>
+                <a:cs typeface="+mj-cs"/>
+              </a:rPr>
+              <a:t>提供一个创建一系列相关或相互依赖对象的接口，而无需指定它们具体的类。</a:t>
+            </a:r>
+            <a:endParaRPr lang="zh-CN" altLang="en-US" sz="1600" spc="50" dirty="0">
+              <a:ln w="12700">
+                <a:noFill/>
+                <a:prstDash val="solid"/>
+              </a:ln>
+              <a:solidFill>
+                <a:schemeClr val="accent4"/>
+              </a:solidFill>
+              <a:latin typeface="+mj-lt"/>
+              <a:ea typeface="+mj-ea"/>
+              <a:cs typeface="+mj-cs"/>
             </a:endParaRPr>
           </a:p>
         </p:txBody>
       </p:sp>
       <p:sp>
         <p:nvSpPr>
-          <p:cNvPr id="6" name="Rectangle 2"/>
+          <p:cNvPr id="4" name="Rectangle 2"/>
           <p:cNvSpPr txBox="1">
             <a:spLocks noChangeArrowheads="1"/>
           </p:cNvSpPr>
@@ -13536,74 +14000,10 @@
           </a:p>
         </p:txBody>
       </p:sp>
-      <p:pic>
-        <p:nvPicPr>
-          <p:cNvPr id="1027" name="Picture 3"/>
-          <p:cNvPicPr>
-            <a:picLocks noChangeAspect="1" noChangeArrowheads="1"/>
-          </p:cNvPicPr>
-          <p:nvPr/>
-        </p:nvPicPr>
-        <p:blipFill>
-          <a:blip r:embed="rId2">
-            <a:extLst>
-              <a:ext uri="{28A0092B-C50C-407E-A947-70E740481C1C}">
-                <a14:useLocalDpi xmlns:a14="http://schemas.microsoft.com/office/drawing/2010/main" val="0"/>
-              </a:ext>
-            </a:extLst>
-          </a:blip>
-          <a:srcRect/>
-          <a:stretch>
-            <a:fillRect/>
-          </a:stretch>
-        </p:blipFill>
-        <p:spPr bwMode="auto">
-          <a:xfrm>
-            <a:off x="539552" y="2650232"/>
-            <a:ext cx="7887176" cy="3515072"/>
-          </a:xfrm>
-          <a:prstGeom prst="rect">
-            <a:avLst/>
-          </a:prstGeom>
-          <a:noFill/>
-          <a:ln>
-            <a:noFill/>
-          </a:ln>
-          <a:effectLst/>
-          <a:extLst>
-            <a:ext uri="{909E8E84-426E-40DD-AFC4-6F175D3DCCD1}">
-              <a14:hiddenFill xmlns:a14="http://schemas.microsoft.com/office/drawing/2010/main">
-                <a:solidFill>
-                  <a:schemeClr val="accent1"/>
-                </a:solidFill>
-              </a14:hiddenFill>
-            </a:ext>
-            <a:ext uri="{91240B29-F687-4F45-9708-019B960494DF}">
-              <a14:hiddenLine xmlns:a14="http://schemas.microsoft.com/office/drawing/2010/main" w="9525">
-                <a:solidFill>
-                  <a:schemeClr val="tx1"/>
-                </a:solidFill>
-                <a:miter lim="800000"/>
-                <a:headEnd/>
-                <a:tailEnd/>
-              </a14:hiddenLine>
-            </a:ext>
-            <a:ext uri="{AF507438-7753-43E0-B8FC-AC1667EBCBE1}">
-              <a14:hiddenEffects xmlns:a14="http://schemas.microsoft.com/office/drawing/2010/main">
-                <a:effectLst>
-                  <a:outerShdw dist="35921" dir="2700000" algn="ctr" rotWithShape="0">
-                    <a:schemeClr val="bg2"/>
-                  </a:outerShdw>
-                </a:effectLst>
-              </a14:hiddenEffects>
-            </a:ext>
-          </a:extLst>
-        </p:spPr>
-      </p:pic>
     </p:spTree>
     <p:extLst>
       <p:ext uri="{BB962C8B-B14F-4D97-AF65-F5344CB8AC3E}">
-        <p14:creationId xmlns:p14="http://schemas.microsoft.com/office/powerpoint/2010/main" val="1407812002"/>
+        <p14:creationId xmlns:p14="http://schemas.microsoft.com/office/powerpoint/2010/main" val="1262784776"/>
       </p:ext>
     </p:extLst>
   </p:cSld>
@@ -14269,8 +14669,8 @@
         </p:nvSpPr>
         <p:spPr>
           <a:xfrm>
-            <a:off x="683568" y="1556792"/>
-            <a:ext cx="7776864" cy="5040560"/>
+            <a:off x="683568" y="1700808"/>
+            <a:ext cx="7776864" cy="576064"/>
           </a:xfrm>
           <a:prstGeom prst="rect">
             <a:avLst/>
@@ -14303,14 +14703,11 @@
                 <a:solidFill>
                   <a:schemeClr val="accent4"/>
                 </a:solidFill>
-                <a:latin typeface="+mj-lt"/>
-                <a:ea typeface="+mj-ea"/>
-                <a:cs typeface="+mj-cs"/>
-              </a:rPr>
-              <a:t>参与者</a:t>
-            </a:r>
-            <a:r>
-              <a:rPr lang="en-US" altLang="zh-CN" sz="1900" b="1" spc="50" dirty="0" smtClean="0">
+              </a:rPr>
+              <a:t>结构</a:t>
+            </a:r>
+            <a:r>
+              <a:rPr lang="en-US" altLang="zh-CN" sz="1900" b="1" spc="50" dirty="0">
                 <a:ln w="12700">
                   <a:noFill/>
                   <a:prstDash val="solid"/>
@@ -14318,15 +14715,22 @@
                 <a:solidFill>
                   <a:schemeClr val="accent4"/>
                 </a:solidFill>
-                <a:latin typeface="+mj-lt"/>
-                <a:ea typeface="+mj-ea"/>
-                <a:cs typeface="+mj-cs"/>
-              </a:rPr>
-              <a:t>:</a:t>
-            </a:r>
-          </a:p>
-          <a:p>
-            <a:endParaRPr lang="en-US" sz="1900" b="1" spc="50" dirty="0">
+              </a:rPr>
+              <a:t>(Structure)</a:t>
+            </a:r>
+            <a:r>
+              <a:rPr lang="zh-CN" altLang="en-US" sz="1900" b="1" spc="50" dirty="0" smtClean="0">
+                <a:ln w="12700">
+                  <a:noFill/>
+                  <a:prstDash val="solid"/>
+                </a:ln>
+                <a:solidFill>
+                  <a:schemeClr val="accent4"/>
+                </a:solidFill>
+              </a:rPr>
+              <a:t>：</a:t>
+            </a:r>
+            <a:endParaRPr lang="zh-CN" altLang="en-US" sz="1900" b="1" spc="50" dirty="0">
               <a:ln w="12700">
                 <a:noFill/>
                 <a:prstDash val="solid"/>
@@ -14334,725 +14738,7 @@
               <a:solidFill>
                 <a:schemeClr val="accent4"/>
               </a:solidFill>
-              <a:latin typeface="+mj-lt"/>
-              <a:ea typeface="+mj-ea"/>
-              <a:cs typeface="+mj-cs"/>
-            </a:endParaRPr>
-          </a:p>
-          <a:p>
-            <a:r>
-              <a:rPr lang="pt-BR" sz="1400" b="1" spc="50" dirty="0">
-                <a:ln w="12700">
-                  <a:noFill/>
-                  <a:prstDash val="solid"/>
-                </a:ln>
-                <a:solidFill>
-                  <a:schemeClr val="accent4"/>
-                </a:solidFill>
-                <a:latin typeface="+mj-lt"/>
-                <a:ea typeface="+mj-ea"/>
-                <a:cs typeface="+mj-cs"/>
-              </a:rPr>
-              <a:t>• </a:t>
-            </a:r>
-            <a:r>
-              <a:rPr lang="pt-BR" sz="1400" b="1" spc="50" dirty="0" smtClean="0">
-                <a:ln w="12700">
-                  <a:noFill/>
-                  <a:prstDash val="solid"/>
-                </a:ln>
-                <a:solidFill>
-                  <a:schemeClr val="accent4"/>
-                </a:solidFill>
-                <a:latin typeface="+mj-lt"/>
-                <a:ea typeface="+mj-ea"/>
-                <a:cs typeface="+mj-cs"/>
-              </a:rPr>
-              <a:t>AbstractFactory</a:t>
-            </a:r>
-          </a:p>
-          <a:p>
-            <a:endParaRPr lang="pt-BR" sz="1400" b="1" spc="50" dirty="0">
-              <a:ln w="12700">
-                <a:noFill/>
-                <a:prstDash val="solid"/>
-              </a:ln>
-              <a:solidFill>
-                <a:schemeClr val="accent4"/>
-              </a:solidFill>
-              <a:latin typeface="+mj-lt"/>
-              <a:ea typeface="+mj-ea"/>
-              <a:cs typeface="+mj-cs"/>
-            </a:endParaRPr>
-          </a:p>
-          <a:p>
-            <a:r>
-              <a:rPr lang="en-US" altLang="zh-CN" sz="1400" b="1" spc="50" dirty="0" smtClean="0">
-                <a:ln w="12700">
-                  <a:noFill/>
-                  <a:prstDash val="solid"/>
-                </a:ln>
-                <a:solidFill>
-                  <a:schemeClr val="accent4"/>
-                </a:solidFill>
-                <a:latin typeface="+mj-lt"/>
-                <a:ea typeface="+mj-ea"/>
-                <a:cs typeface="+mj-cs"/>
-              </a:rPr>
-              <a:t>	— </a:t>
-            </a:r>
-            <a:r>
-              <a:rPr lang="zh-CN" altLang="en-US" sz="1400" b="1" spc="50" dirty="0">
-                <a:ln w="12700">
-                  <a:noFill/>
-                  <a:prstDash val="solid"/>
-                </a:ln>
-                <a:solidFill>
-                  <a:schemeClr val="accent4"/>
-                </a:solidFill>
-                <a:latin typeface="+mj-lt"/>
-                <a:ea typeface="+mj-ea"/>
-                <a:cs typeface="+mj-cs"/>
-              </a:rPr>
-              <a:t>声明一个创建抽象产品对象的操作接口。</a:t>
-            </a:r>
-            <a:endParaRPr lang="en-US" altLang="zh-CN" sz="1400" b="1" spc="50" dirty="0">
-              <a:ln w="12700">
-                <a:noFill/>
-                <a:prstDash val="solid"/>
-              </a:ln>
-              <a:solidFill>
-                <a:schemeClr val="accent4"/>
-              </a:solidFill>
-              <a:latin typeface="+mj-lt"/>
-              <a:ea typeface="+mj-ea"/>
-              <a:cs typeface="+mj-cs"/>
-            </a:endParaRPr>
-          </a:p>
-          <a:p>
-            <a:endParaRPr lang="zh-CN" altLang="en-US" sz="1400" b="1" spc="50" dirty="0">
-              <a:ln w="12700">
-                <a:noFill/>
-                <a:prstDash val="solid"/>
-              </a:ln>
-              <a:solidFill>
-                <a:schemeClr val="accent4"/>
-              </a:solidFill>
-              <a:latin typeface="+mj-lt"/>
-              <a:ea typeface="+mj-ea"/>
-              <a:cs typeface="+mj-cs"/>
-            </a:endParaRPr>
-          </a:p>
-          <a:p>
-            <a:r>
-              <a:rPr lang="pt-BR" sz="1400" b="1" spc="50" dirty="0">
-                <a:ln w="12700">
-                  <a:noFill/>
-                  <a:prstDash val="solid"/>
-                </a:ln>
-                <a:solidFill>
-                  <a:schemeClr val="accent4"/>
-                </a:solidFill>
-                <a:latin typeface="+mj-lt"/>
-                <a:ea typeface="+mj-ea"/>
-                <a:cs typeface="+mj-cs"/>
-              </a:rPr>
-              <a:t>• ConcreteFactory(AppleFamilyFactoryV1, </a:t>
-            </a:r>
-            <a:r>
-              <a:rPr lang="pt-BR" sz="1400" b="1" spc="50" dirty="0" smtClean="0">
-                <a:ln w="12700">
-                  <a:noFill/>
-                  <a:prstDash val="solid"/>
-                </a:ln>
-                <a:solidFill>
-                  <a:schemeClr val="accent4"/>
-                </a:solidFill>
-                <a:latin typeface="+mj-lt"/>
-                <a:ea typeface="+mj-ea"/>
-                <a:cs typeface="+mj-cs"/>
-              </a:rPr>
-              <a:t>MicrosoftFamilyFactoryV1, </a:t>
-            </a:r>
-            <a:r>
-              <a:rPr lang="pt-BR" sz="1400" b="1" spc="50" dirty="0" smtClean="0">
-                <a:ln w="12700">
-                  <a:noFill/>
-                  <a:prstDash val="solid"/>
-                </a:ln>
-                <a:solidFill>
-                  <a:schemeClr val="accent4"/>
-                </a:solidFill>
-              </a:rPr>
-              <a:t>AppleFamilyFactoryV2</a:t>
-            </a:r>
-            <a:r>
-              <a:rPr lang="pt-BR" sz="1400" b="1" spc="50" dirty="0" smtClean="0">
-                <a:ln w="12700">
-                  <a:noFill/>
-                  <a:prstDash val="solid"/>
-                </a:ln>
-                <a:solidFill>
-                  <a:schemeClr val="accent4"/>
-                </a:solidFill>
-                <a:latin typeface="+mj-lt"/>
-                <a:ea typeface="+mj-ea"/>
-                <a:cs typeface="+mj-cs"/>
-              </a:rPr>
-              <a:t>)</a:t>
-            </a:r>
-            <a:endParaRPr lang="pt-BR" sz="1400" b="1" spc="50" dirty="0">
-              <a:ln w="12700">
-                <a:noFill/>
-                <a:prstDash val="solid"/>
-              </a:ln>
-              <a:solidFill>
-                <a:schemeClr val="accent4"/>
-              </a:solidFill>
-              <a:latin typeface="+mj-lt"/>
-              <a:ea typeface="+mj-ea"/>
-              <a:cs typeface="+mj-cs"/>
-            </a:endParaRPr>
-          </a:p>
-          <a:p>
-            <a:endParaRPr lang="pt-BR" sz="1400" b="1" spc="50" dirty="0">
-              <a:ln w="12700">
-                <a:noFill/>
-                <a:prstDash val="solid"/>
-              </a:ln>
-              <a:solidFill>
-                <a:schemeClr val="accent4"/>
-              </a:solidFill>
-              <a:latin typeface="+mj-lt"/>
-              <a:ea typeface="+mj-ea"/>
-              <a:cs typeface="+mj-cs"/>
-            </a:endParaRPr>
-          </a:p>
-          <a:p>
-            <a:r>
-              <a:rPr lang="en-US" altLang="zh-CN" sz="1400" b="1" spc="50" dirty="0" smtClean="0">
-                <a:ln w="12700">
-                  <a:noFill/>
-                  <a:prstDash val="solid"/>
-                </a:ln>
-                <a:solidFill>
-                  <a:schemeClr val="accent4"/>
-                </a:solidFill>
-                <a:latin typeface="+mj-lt"/>
-                <a:ea typeface="+mj-ea"/>
-                <a:cs typeface="+mj-cs"/>
-              </a:rPr>
-              <a:t>	— </a:t>
-            </a:r>
-            <a:r>
-              <a:rPr lang="zh-CN" altLang="en-US" sz="1400" b="1" spc="50" dirty="0">
-                <a:ln w="12700">
-                  <a:noFill/>
-                  <a:prstDash val="solid"/>
-                </a:ln>
-                <a:solidFill>
-                  <a:schemeClr val="accent4"/>
-                </a:solidFill>
-                <a:latin typeface="+mj-lt"/>
-                <a:ea typeface="+mj-ea"/>
-                <a:cs typeface="+mj-cs"/>
-              </a:rPr>
-              <a:t>实现创建具体产品对象的操作。</a:t>
-            </a:r>
-            <a:endParaRPr lang="en-US" altLang="zh-CN" sz="1400" b="1" spc="50" dirty="0">
-              <a:ln w="12700">
-                <a:noFill/>
-                <a:prstDash val="solid"/>
-              </a:ln>
-              <a:solidFill>
-                <a:schemeClr val="accent4"/>
-              </a:solidFill>
-              <a:latin typeface="+mj-lt"/>
-              <a:ea typeface="+mj-ea"/>
-              <a:cs typeface="+mj-cs"/>
-            </a:endParaRPr>
-          </a:p>
-          <a:p>
-            <a:endParaRPr lang="zh-CN" altLang="en-US" sz="1400" b="1" spc="50" dirty="0">
-              <a:ln w="12700">
-                <a:noFill/>
-                <a:prstDash val="solid"/>
-              </a:ln>
-              <a:solidFill>
-                <a:schemeClr val="accent4"/>
-              </a:solidFill>
-              <a:latin typeface="+mj-lt"/>
-              <a:ea typeface="+mj-ea"/>
-              <a:cs typeface="+mj-cs"/>
-            </a:endParaRPr>
-          </a:p>
-          <a:p>
-            <a:r>
-              <a:rPr lang="pt-BR" sz="1400" b="1" spc="50" dirty="0">
-                <a:ln w="12700">
-                  <a:noFill/>
-                  <a:prstDash val="solid"/>
-                </a:ln>
-                <a:solidFill>
-                  <a:schemeClr val="accent4"/>
-                </a:solidFill>
-                <a:latin typeface="+mj-lt"/>
-                <a:ea typeface="+mj-ea"/>
-                <a:cs typeface="+mj-cs"/>
-              </a:rPr>
-              <a:t>• </a:t>
-            </a:r>
-            <a:r>
-              <a:rPr lang="pt-BR" sz="1400" b="1" spc="50" dirty="0" smtClean="0">
-                <a:ln w="12700">
-                  <a:noFill/>
-                  <a:prstDash val="solid"/>
-                </a:ln>
-                <a:solidFill>
-                  <a:schemeClr val="accent4"/>
-                </a:solidFill>
-                <a:latin typeface="+mj-lt"/>
-                <a:ea typeface="+mj-ea"/>
-                <a:cs typeface="+mj-cs"/>
-              </a:rPr>
-              <a:t>AbstractProduct( Pad, Phone )</a:t>
-            </a:r>
-            <a:endParaRPr lang="pt-BR" sz="1400" b="1" spc="50" dirty="0">
-              <a:ln w="12700">
-                <a:noFill/>
-                <a:prstDash val="solid"/>
-              </a:ln>
-              <a:solidFill>
-                <a:schemeClr val="accent4"/>
-              </a:solidFill>
-              <a:latin typeface="+mj-lt"/>
-              <a:ea typeface="+mj-ea"/>
-              <a:cs typeface="+mj-cs"/>
-            </a:endParaRPr>
-          </a:p>
-          <a:p>
-            <a:endParaRPr lang="pt-BR" sz="1400" b="1" spc="50" dirty="0">
-              <a:ln w="12700">
-                <a:noFill/>
-                <a:prstDash val="solid"/>
-              </a:ln>
-              <a:solidFill>
-                <a:schemeClr val="accent4"/>
-              </a:solidFill>
-              <a:latin typeface="+mj-lt"/>
-              <a:ea typeface="+mj-ea"/>
-              <a:cs typeface="+mj-cs"/>
-            </a:endParaRPr>
-          </a:p>
-          <a:p>
-            <a:r>
-              <a:rPr lang="en-US" altLang="zh-CN" sz="1400" b="1" spc="50" dirty="0" smtClean="0">
-                <a:ln w="12700">
-                  <a:noFill/>
-                  <a:prstDash val="solid"/>
-                </a:ln>
-                <a:solidFill>
-                  <a:schemeClr val="accent4"/>
-                </a:solidFill>
-                <a:latin typeface="+mj-lt"/>
-                <a:ea typeface="+mj-ea"/>
-                <a:cs typeface="+mj-cs"/>
-              </a:rPr>
-              <a:t>	— </a:t>
-            </a:r>
-            <a:r>
-              <a:rPr lang="zh-CN" altLang="en-US" sz="1400" b="1" spc="50" dirty="0">
-                <a:ln w="12700">
-                  <a:noFill/>
-                  <a:prstDash val="solid"/>
-                </a:ln>
-                <a:solidFill>
-                  <a:schemeClr val="accent4"/>
-                </a:solidFill>
-                <a:latin typeface="+mj-lt"/>
-                <a:ea typeface="+mj-ea"/>
-                <a:cs typeface="+mj-cs"/>
-              </a:rPr>
-              <a:t>为一类产品对象声明一个接口。</a:t>
-            </a:r>
-            <a:endParaRPr lang="en-US" altLang="zh-CN" sz="1400" b="1" spc="50" dirty="0">
-              <a:ln w="12700">
-                <a:noFill/>
-                <a:prstDash val="solid"/>
-              </a:ln>
-              <a:solidFill>
-                <a:schemeClr val="accent4"/>
-              </a:solidFill>
-              <a:latin typeface="+mj-lt"/>
-              <a:ea typeface="+mj-ea"/>
-              <a:cs typeface="+mj-cs"/>
-            </a:endParaRPr>
-          </a:p>
-          <a:p>
-            <a:endParaRPr lang="zh-CN" altLang="en-US" sz="1400" b="1" spc="50" dirty="0">
-              <a:ln w="12700">
-                <a:noFill/>
-                <a:prstDash val="solid"/>
-              </a:ln>
-              <a:solidFill>
-                <a:schemeClr val="accent4"/>
-              </a:solidFill>
-              <a:latin typeface="+mj-lt"/>
-              <a:ea typeface="+mj-ea"/>
-              <a:cs typeface="+mj-cs"/>
-            </a:endParaRPr>
-          </a:p>
-          <a:p>
-            <a:r>
-              <a:rPr lang="pt-BR" sz="1400" b="1" spc="50" dirty="0">
-                <a:ln w="12700">
-                  <a:noFill/>
-                  <a:prstDash val="solid"/>
-                </a:ln>
-                <a:solidFill>
-                  <a:schemeClr val="accent4"/>
-                </a:solidFill>
-                <a:latin typeface="+mj-lt"/>
-                <a:ea typeface="+mj-ea"/>
-                <a:cs typeface="+mj-cs"/>
-              </a:rPr>
-              <a:t>• </a:t>
-            </a:r>
-            <a:r>
-              <a:rPr lang="pt-BR" sz="1400" b="1" spc="50" dirty="0" smtClean="0">
-                <a:ln w="12700">
-                  <a:noFill/>
-                  <a:prstDash val="solid"/>
-                </a:ln>
-                <a:solidFill>
-                  <a:schemeClr val="accent4"/>
-                </a:solidFill>
-                <a:latin typeface="+mj-lt"/>
-                <a:ea typeface="+mj-ea"/>
-                <a:cs typeface="+mj-cs"/>
-              </a:rPr>
-              <a:t>ConcreteProduct( iPad 2, Surface 4, iPhone 4, WindowsPhone8.1)</a:t>
-            </a:r>
-            <a:endParaRPr lang="pt-BR" sz="1400" b="1" spc="50" dirty="0">
-              <a:ln w="12700">
-                <a:noFill/>
-                <a:prstDash val="solid"/>
-              </a:ln>
-              <a:solidFill>
-                <a:schemeClr val="accent4"/>
-              </a:solidFill>
-              <a:latin typeface="+mj-lt"/>
-              <a:ea typeface="+mj-ea"/>
-              <a:cs typeface="+mj-cs"/>
-            </a:endParaRPr>
-          </a:p>
-          <a:p>
-            <a:endParaRPr lang="pt-BR" sz="1400" b="1" spc="50" dirty="0">
-              <a:ln w="12700">
-                <a:noFill/>
-                <a:prstDash val="solid"/>
-              </a:ln>
-              <a:solidFill>
-                <a:schemeClr val="accent4"/>
-              </a:solidFill>
-              <a:latin typeface="+mj-lt"/>
-              <a:ea typeface="+mj-ea"/>
-              <a:cs typeface="+mj-cs"/>
-            </a:endParaRPr>
-          </a:p>
-          <a:p>
-            <a:r>
-              <a:rPr lang="en-US" altLang="zh-CN" sz="1400" b="1" spc="50" dirty="0" smtClean="0">
-                <a:ln w="12700">
-                  <a:noFill/>
-                  <a:prstDash val="solid"/>
-                </a:ln>
-                <a:solidFill>
-                  <a:schemeClr val="accent4"/>
-                </a:solidFill>
-                <a:latin typeface="+mj-lt"/>
-                <a:ea typeface="+mj-ea"/>
-                <a:cs typeface="+mj-cs"/>
-              </a:rPr>
-              <a:t>	— </a:t>
-            </a:r>
-            <a:r>
-              <a:rPr lang="zh-CN" altLang="en-US" sz="1400" b="1" spc="50" dirty="0">
-                <a:ln w="12700">
-                  <a:noFill/>
-                  <a:prstDash val="solid"/>
-                </a:ln>
-                <a:solidFill>
-                  <a:schemeClr val="accent4"/>
-                </a:solidFill>
-                <a:latin typeface="+mj-lt"/>
-                <a:ea typeface="+mj-ea"/>
-                <a:cs typeface="+mj-cs"/>
-              </a:rPr>
-              <a:t>定义一个将被相应的具体工厂创建的产品对象。</a:t>
-            </a:r>
-          </a:p>
-          <a:p>
-            <a:r>
-              <a:rPr lang="en-US" altLang="zh-CN" sz="1400" b="1" spc="50" dirty="0" smtClean="0">
-                <a:ln w="12700">
-                  <a:noFill/>
-                  <a:prstDash val="solid"/>
-                </a:ln>
-                <a:solidFill>
-                  <a:schemeClr val="accent4"/>
-                </a:solidFill>
-                <a:latin typeface="+mj-lt"/>
-                <a:ea typeface="+mj-ea"/>
-                <a:cs typeface="+mj-cs"/>
-              </a:rPr>
-              <a:t>	— </a:t>
-            </a:r>
-            <a:r>
-              <a:rPr lang="zh-CN" altLang="en-US" sz="1400" b="1" spc="50" dirty="0" smtClean="0">
-                <a:ln w="12700">
-                  <a:noFill/>
-                  <a:prstDash val="solid"/>
-                </a:ln>
-                <a:solidFill>
-                  <a:schemeClr val="accent4"/>
-                </a:solidFill>
-                <a:latin typeface="+mj-lt"/>
-                <a:ea typeface="+mj-ea"/>
-                <a:cs typeface="+mj-cs"/>
-              </a:rPr>
-              <a:t>实现</a:t>
-            </a:r>
-            <a:r>
-              <a:rPr lang="pt-BR" sz="1400" b="1" spc="50" dirty="0">
-                <a:ln w="12700">
-                  <a:noFill/>
-                  <a:prstDash val="solid"/>
-                </a:ln>
-                <a:solidFill>
-                  <a:schemeClr val="accent4"/>
-                </a:solidFill>
-              </a:rPr>
-              <a:t>AbstractProduct</a:t>
-            </a:r>
-            <a:r>
-              <a:rPr lang="zh-CN" altLang="en-US" sz="1400" b="1" spc="50" dirty="0" smtClean="0">
-                <a:ln w="12700">
-                  <a:noFill/>
-                  <a:prstDash val="solid"/>
-                </a:ln>
-                <a:solidFill>
-                  <a:schemeClr val="accent4"/>
-                </a:solidFill>
-                <a:latin typeface="+mj-lt"/>
-                <a:ea typeface="+mj-ea"/>
-                <a:cs typeface="+mj-cs"/>
-              </a:rPr>
-              <a:t>接口</a:t>
-            </a:r>
-            <a:r>
-              <a:rPr lang="zh-CN" altLang="en-US" sz="1400" b="1" spc="50" dirty="0">
-                <a:ln w="12700">
-                  <a:noFill/>
-                  <a:prstDash val="solid"/>
-                </a:ln>
-                <a:solidFill>
-                  <a:schemeClr val="accent4"/>
-                </a:solidFill>
-                <a:latin typeface="+mj-lt"/>
-                <a:ea typeface="+mj-ea"/>
-                <a:cs typeface="+mj-cs"/>
-              </a:rPr>
-              <a:t>。</a:t>
-            </a:r>
-            <a:endParaRPr lang="en-US" altLang="zh-CN" sz="1400" b="1" spc="50" dirty="0">
-              <a:ln w="12700">
-                <a:noFill/>
-                <a:prstDash val="solid"/>
-              </a:ln>
-              <a:solidFill>
-                <a:schemeClr val="accent4"/>
-              </a:solidFill>
-              <a:latin typeface="+mj-lt"/>
-              <a:ea typeface="+mj-ea"/>
-              <a:cs typeface="+mj-cs"/>
-            </a:endParaRPr>
-          </a:p>
-          <a:p>
-            <a:endParaRPr lang="zh-CN" altLang="en-US" sz="1400" b="1" spc="50" dirty="0">
-              <a:ln w="12700">
-                <a:noFill/>
-                <a:prstDash val="solid"/>
-              </a:ln>
-              <a:solidFill>
-                <a:schemeClr val="accent4"/>
-              </a:solidFill>
-              <a:latin typeface="+mj-lt"/>
-              <a:ea typeface="+mj-ea"/>
-              <a:cs typeface="+mj-cs"/>
-            </a:endParaRPr>
-          </a:p>
-          <a:p>
-            <a:r>
-              <a:rPr lang="pt-BR" sz="1400" b="1" spc="50" dirty="0">
-                <a:ln w="12700">
-                  <a:noFill/>
-                  <a:prstDash val="solid"/>
-                </a:ln>
-                <a:solidFill>
-                  <a:schemeClr val="accent4"/>
-                </a:solidFill>
-                <a:latin typeface="+mj-lt"/>
-                <a:ea typeface="+mj-ea"/>
-                <a:cs typeface="+mj-cs"/>
-              </a:rPr>
-              <a:t>• </a:t>
-            </a:r>
-            <a:r>
-              <a:rPr lang="pt-BR" sz="1400" b="1" spc="50" dirty="0" smtClean="0">
-                <a:ln w="12700">
-                  <a:noFill/>
-                  <a:prstDash val="solid"/>
-                </a:ln>
-                <a:solidFill>
-                  <a:schemeClr val="accent4"/>
-                </a:solidFill>
-                <a:latin typeface="+mj-lt"/>
-                <a:ea typeface="+mj-ea"/>
-                <a:cs typeface="+mj-cs"/>
-              </a:rPr>
-              <a:t>Client( Web Page )</a:t>
-            </a:r>
-          </a:p>
-          <a:p>
-            <a:endParaRPr lang="pt-BR" sz="1400" b="1" spc="50" dirty="0">
-              <a:ln w="12700">
-                <a:noFill/>
-                <a:prstDash val="solid"/>
-              </a:ln>
-              <a:solidFill>
-                <a:schemeClr val="accent4"/>
-              </a:solidFill>
-              <a:latin typeface="+mj-lt"/>
-              <a:ea typeface="+mj-ea"/>
-              <a:cs typeface="+mj-cs"/>
-            </a:endParaRPr>
-          </a:p>
-          <a:p>
-            <a:r>
-              <a:rPr lang="en-US" altLang="zh-CN" sz="1400" b="1" spc="50" dirty="0" smtClean="0">
-                <a:ln w="12700">
-                  <a:noFill/>
-                  <a:prstDash val="solid"/>
-                </a:ln>
-                <a:solidFill>
-                  <a:schemeClr val="accent4"/>
-                </a:solidFill>
-                <a:latin typeface="+mj-lt"/>
-                <a:ea typeface="+mj-ea"/>
-                <a:cs typeface="+mj-cs"/>
-              </a:rPr>
-              <a:t>	— </a:t>
-            </a:r>
-            <a:r>
-              <a:rPr lang="zh-CN" altLang="en-US" sz="1400" b="1" spc="50" dirty="0">
-                <a:ln w="12700">
-                  <a:noFill/>
-                  <a:prstDash val="solid"/>
-                </a:ln>
-                <a:solidFill>
-                  <a:schemeClr val="accent4"/>
-                </a:solidFill>
-                <a:latin typeface="+mj-lt"/>
-                <a:ea typeface="+mj-ea"/>
-                <a:cs typeface="+mj-cs"/>
-              </a:rPr>
-              <a:t>仅使用</a:t>
-            </a:r>
-            <a:r>
-              <a:rPr lang="zh-CN" altLang="en-US" sz="1400" b="1" spc="50" dirty="0" smtClean="0">
-                <a:ln w="12700">
-                  <a:noFill/>
-                  <a:prstDash val="solid"/>
-                </a:ln>
-                <a:solidFill>
-                  <a:schemeClr val="accent4"/>
-                </a:solidFill>
-                <a:latin typeface="+mj-lt"/>
-                <a:ea typeface="+mj-ea"/>
-                <a:cs typeface="+mj-cs"/>
-              </a:rPr>
-              <a:t>由</a:t>
-            </a:r>
-            <a:r>
-              <a:rPr lang="pt-BR" sz="1400" b="1" spc="50" dirty="0">
-                <a:ln w="12700">
-                  <a:noFill/>
-                  <a:prstDash val="solid"/>
-                </a:ln>
-                <a:solidFill>
-                  <a:schemeClr val="accent4"/>
-                </a:solidFill>
-              </a:rPr>
-              <a:t>AbstractFactory</a:t>
-            </a:r>
-            <a:r>
-              <a:rPr lang="zh-CN" altLang="en-US" sz="1400" b="1" spc="50" dirty="0" smtClean="0">
-                <a:ln w="12700">
-                  <a:noFill/>
-                  <a:prstDash val="solid"/>
-                </a:ln>
-                <a:solidFill>
-                  <a:schemeClr val="accent4"/>
-                </a:solidFill>
-                <a:latin typeface="+mj-lt"/>
-                <a:ea typeface="+mj-ea"/>
-                <a:cs typeface="+mj-cs"/>
-              </a:rPr>
-              <a:t>和</a:t>
-            </a:r>
-            <a:r>
-              <a:rPr lang="pt-BR" sz="1400" b="1" spc="50" dirty="0">
-                <a:ln w="12700">
-                  <a:noFill/>
-                  <a:prstDash val="solid"/>
-                </a:ln>
-                <a:solidFill>
-                  <a:schemeClr val="accent4"/>
-                </a:solidFill>
-              </a:rPr>
-              <a:t>AbstractProduct</a:t>
-            </a:r>
-            <a:r>
-              <a:rPr lang="zh-CN" altLang="en-US" sz="1400" b="1" spc="50" dirty="0" smtClean="0">
-                <a:ln w="12700">
-                  <a:noFill/>
-                  <a:prstDash val="solid"/>
-                </a:ln>
-                <a:solidFill>
-                  <a:schemeClr val="accent4"/>
-                </a:solidFill>
-                <a:latin typeface="+mj-lt"/>
-                <a:ea typeface="+mj-ea"/>
-                <a:cs typeface="+mj-cs"/>
-              </a:rPr>
-              <a:t>类</a:t>
-            </a:r>
-            <a:r>
-              <a:rPr lang="zh-CN" altLang="en-US" sz="1400" b="1" spc="50" dirty="0">
-                <a:ln w="12700">
-                  <a:noFill/>
-                  <a:prstDash val="solid"/>
-                </a:ln>
-                <a:solidFill>
-                  <a:schemeClr val="accent4"/>
-                </a:solidFill>
-                <a:latin typeface="+mj-lt"/>
-                <a:ea typeface="+mj-ea"/>
-                <a:cs typeface="+mj-cs"/>
-              </a:rPr>
-              <a:t>声明的接口。</a:t>
-            </a:r>
+            </a:endParaRPr>
           </a:p>
         </p:txBody>
       </p:sp>
@@ -15102,6 +14788,948 @@
           </a:p>
         </p:txBody>
       </p:sp>
+      <p:pic>
+        <p:nvPicPr>
+          <p:cNvPr id="1027" name="Picture 3"/>
+          <p:cNvPicPr>
+            <a:picLocks noChangeAspect="1" noChangeArrowheads="1"/>
+          </p:cNvPicPr>
+          <p:nvPr/>
+        </p:nvPicPr>
+        <p:blipFill>
+          <a:blip r:embed="rId2">
+            <a:extLst>
+              <a:ext uri="{28A0092B-C50C-407E-A947-70E740481C1C}">
+                <a14:useLocalDpi xmlns:a14="http://schemas.microsoft.com/office/drawing/2010/main" val="0"/>
+              </a:ext>
+            </a:extLst>
+          </a:blip>
+          <a:srcRect/>
+          <a:stretch>
+            <a:fillRect/>
+          </a:stretch>
+        </p:blipFill>
+        <p:spPr bwMode="auto">
+          <a:xfrm>
+            <a:off x="539552" y="2650232"/>
+            <a:ext cx="7887176" cy="3515072"/>
+          </a:xfrm>
+          <a:prstGeom prst="rect">
+            <a:avLst/>
+          </a:prstGeom>
+          <a:noFill/>
+          <a:ln>
+            <a:noFill/>
+          </a:ln>
+          <a:effectLst/>
+          <a:extLst>
+            <a:ext uri="{909E8E84-426E-40DD-AFC4-6F175D3DCCD1}">
+              <a14:hiddenFill xmlns:a14="http://schemas.microsoft.com/office/drawing/2010/main">
+                <a:solidFill>
+                  <a:schemeClr val="accent1"/>
+                </a:solidFill>
+              </a14:hiddenFill>
+            </a:ext>
+            <a:ext uri="{91240B29-F687-4F45-9708-019B960494DF}">
+              <a14:hiddenLine xmlns:a14="http://schemas.microsoft.com/office/drawing/2010/main" w="9525">
+                <a:solidFill>
+                  <a:schemeClr val="tx1"/>
+                </a:solidFill>
+                <a:miter lim="800000"/>
+                <a:headEnd/>
+                <a:tailEnd/>
+              </a14:hiddenLine>
+            </a:ext>
+            <a:ext uri="{AF507438-7753-43E0-B8FC-AC1667EBCBE1}">
+              <a14:hiddenEffects xmlns:a14="http://schemas.microsoft.com/office/drawing/2010/main">
+                <a:effectLst>
+                  <a:outerShdw dist="35921" dir="2700000" algn="ctr" rotWithShape="0">
+                    <a:schemeClr val="bg2"/>
+                  </a:outerShdw>
+                </a:effectLst>
+              </a14:hiddenEffects>
+            </a:ext>
+          </a:extLst>
+        </p:spPr>
+      </p:pic>
+    </p:spTree>
+    <p:extLst>
+      <p:ext uri="{BB962C8B-B14F-4D97-AF65-F5344CB8AC3E}">
+        <p14:creationId xmlns:p14="http://schemas.microsoft.com/office/powerpoint/2010/main" val="1407812002"/>
+      </p:ext>
+    </p:extLst>
+  </p:cSld>
+  <p:clrMapOvr>
+    <a:masterClrMapping/>
+  </p:clrMapOvr>
+  <p:timing>
+    <p:tnLst>
+      <p:par>
+        <p:cTn id="1" dur="indefinite" restart="never" nodeType="tmRoot"/>
+      </p:par>
+    </p:tnLst>
+  </p:timing>
+</p:sld>
+</file>
+
+<file path=ppt/slides/slide31.xml><?xml version="1.0" encoding="utf-8"?>
+<p:sld xmlns:a="http://schemas.openxmlformats.org/drawingml/2006/main" xmlns:r="http://schemas.openxmlformats.org/officeDocument/2006/relationships" xmlns:p="http://schemas.openxmlformats.org/presentationml/2006/main">
+  <p:cSld>
+    <p:spTree>
+      <p:nvGrpSpPr>
+        <p:cNvPr id="1" name=""/>
+        <p:cNvGrpSpPr/>
+        <p:nvPr/>
+      </p:nvGrpSpPr>
+      <p:grpSpPr>
+        <a:xfrm>
+          <a:off x="0" y="0"/>
+          <a:ext cx="0" cy="0"/>
+          <a:chOff x="0" y="0"/>
+          <a:chExt cx="0" cy="0"/>
+        </a:xfrm>
+      </p:grpSpPr>
+      <p:sp>
+        <p:nvSpPr>
+          <p:cNvPr id="3" name="矩形 2"/>
+          <p:cNvSpPr/>
+          <p:nvPr/>
+        </p:nvSpPr>
+        <p:spPr>
+          <a:xfrm>
+            <a:off x="683568" y="1556792"/>
+            <a:ext cx="7776864" cy="5040560"/>
+          </a:xfrm>
+          <a:prstGeom prst="rect">
+            <a:avLst/>
+          </a:prstGeom>
+        </p:spPr>
+        <p:txBody>
+          <a:bodyPr vert="horz" rtlCol="0" anchor="ctr">
+            <a:normAutofit/>
+            <a:scene3d>
+              <a:camera prst="orthographicFront"/>
+              <a:lightRig rig="soft" dir="t"/>
+            </a:scene3d>
+            <a:sp3d prstMaterial="matte">
+              <a:bevelT w="12700" h="12700"/>
+            </a:sp3d>
+          </a:bodyPr>
+          <a:lstStyle/>
+          <a:p>
+            <a:pPr>
+              <a:spcBef>
+                <a:spcPct val="0"/>
+              </a:spcBef>
+            </a:pPr>
+            <a:r>
+              <a:rPr lang="zh-CN" altLang="en-US" sz="1900" b="1" spc="50" dirty="0" smtClean="0">
+                <a:ln w="12700">
+                  <a:noFill/>
+                  <a:prstDash val="solid"/>
+                </a:ln>
+                <a:solidFill>
+                  <a:schemeClr val="accent4"/>
+                </a:solidFill>
+                <a:latin typeface="+mj-lt"/>
+                <a:ea typeface="+mj-ea"/>
+                <a:cs typeface="+mj-cs"/>
+              </a:rPr>
+              <a:t>参与者</a:t>
+            </a:r>
+            <a:r>
+              <a:rPr lang="en-US" altLang="zh-CN" sz="1900" b="1" spc="50" dirty="0" smtClean="0">
+                <a:ln w="12700">
+                  <a:noFill/>
+                  <a:prstDash val="solid"/>
+                </a:ln>
+                <a:solidFill>
+                  <a:schemeClr val="accent4"/>
+                </a:solidFill>
+                <a:latin typeface="+mj-lt"/>
+                <a:ea typeface="+mj-ea"/>
+                <a:cs typeface="+mj-cs"/>
+              </a:rPr>
+              <a:t>:</a:t>
+            </a:r>
+          </a:p>
+          <a:p>
+            <a:endParaRPr lang="en-US" sz="1900" b="1" spc="50" dirty="0">
+              <a:ln w="12700">
+                <a:noFill/>
+                <a:prstDash val="solid"/>
+              </a:ln>
+              <a:solidFill>
+                <a:schemeClr val="accent4"/>
+              </a:solidFill>
+              <a:latin typeface="+mj-lt"/>
+              <a:ea typeface="+mj-ea"/>
+              <a:cs typeface="+mj-cs"/>
+            </a:endParaRPr>
+          </a:p>
+          <a:p>
+            <a:r>
+              <a:rPr lang="pt-BR" sz="1400" b="1" spc="50" dirty="0">
+                <a:ln w="12700">
+                  <a:noFill/>
+                  <a:prstDash val="solid"/>
+                </a:ln>
+                <a:solidFill>
+                  <a:schemeClr val="accent4"/>
+                </a:solidFill>
+                <a:latin typeface="+mj-lt"/>
+                <a:ea typeface="+mj-ea"/>
+                <a:cs typeface="+mj-cs"/>
+              </a:rPr>
+              <a:t>• </a:t>
+            </a:r>
+            <a:r>
+              <a:rPr lang="pt-BR" sz="1400" b="1" spc="50" dirty="0" smtClean="0">
+                <a:ln w="12700">
+                  <a:noFill/>
+                  <a:prstDash val="solid"/>
+                </a:ln>
+                <a:solidFill>
+                  <a:schemeClr val="accent4"/>
+                </a:solidFill>
+                <a:latin typeface="+mj-lt"/>
+                <a:ea typeface="+mj-ea"/>
+                <a:cs typeface="+mj-cs"/>
+              </a:rPr>
+              <a:t>AbstractFactory</a:t>
+            </a:r>
+          </a:p>
+          <a:p>
+            <a:endParaRPr lang="pt-BR" sz="1400" b="1" spc="50" dirty="0">
+              <a:ln w="12700">
+                <a:noFill/>
+                <a:prstDash val="solid"/>
+              </a:ln>
+              <a:solidFill>
+                <a:schemeClr val="accent4"/>
+              </a:solidFill>
+              <a:latin typeface="+mj-lt"/>
+              <a:ea typeface="+mj-ea"/>
+              <a:cs typeface="+mj-cs"/>
+            </a:endParaRPr>
+          </a:p>
+          <a:p>
+            <a:r>
+              <a:rPr lang="en-US" altLang="zh-CN" sz="1400" b="1" spc="50" dirty="0" smtClean="0">
+                <a:ln w="12700">
+                  <a:noFill/>
+                  <a:prstDash val="solid"/>
+                </a:ln>
+                <a:solidFill>
+                  <a:schemeClr val="accent4"/>
+                </a:solidFill>
+                <a:latin typeface="+mj-lt"/>
+                <a:ea typeface="+mj-ea"/>
+                <a:cs typeface="+mj-cs"/>
+              </a:rPr>
+              <a:t>	— </a:t>
+            </a:r>
+            <a:r>
+              <a:rPr lang="zh-CN" altLang="en-US" sz="1400" b="1" spc="50" dirty="0">
+                <a:ln w="12700">
+                  <a:noFill/>
+                  <a:prstDash val="solid"/>
+                </a:ln>
+                <a:solidFill>
+                  <a:schemeClr val="accent4"/>
+                </a:solidFill>
+                <a:latin typeface="+mj-lt"/>
+                <a:ea typeface="+mj-ea"/>
+                <a:cs typeface="+mj-cs"/>
+              </a:rPr>
+              <a:t>声明一个创建抽象产品对象的操作接口。</a:t>
+            </a:r>
+            <a:endParaRPr lang="en-US" altLang="zh-CN" sz="1400" b="1" spc="50" dirty="0">
+              <a:ln w="12700">
+                <a:noFill/>
+                <a:prstDash val="solid"/>
+              </a:ln>
+              <a:solidFill>
+                <a:schemeClr val="accent4"/>
+              </a:solidFill>
+              <a:latin typeface="+mj-lt"/>
+              <a:ea typeface="+mj-ea"/>
+              <a:cs typeface="+mj-cs"/>
+            </a:endParaRPr>
+          </a:p>
+          <a:p>
+            <a:endParaRPr lang="zh-CN" altLang="en-US" sz="1400" b="1" spc="50" dirty="0">
+              <a:ln w="12700">
+                <a:noFill/>
+                <a:prstDash val="solid"/>
+              </a:ln>
+              <a:solidFill>
+                <a:schemeClr val="accent4"/>
+              </a:solidFill>
+              <a:latin typeface="+mj-lt"/>
+              <a:ea typeface="+mj-ea"/>
+              <a:cs typeface="+mj-cs"/>
+            </a:endParaRPr>
+          </a:p>
+          <a:p>
+            <a:r>
+              <a:rPr lang="pt-BR" sz="1400" b="1" spc="50" dirty="0">
+                <a:ln w="12700">
+                  <a:noFill/>
+                  <a:prstDash val="solid"/>
+                </a:ln>
+                <a:solidFill>
+                  <a:schemeClr val="accent4"/>
+                </a:solidFill>
+                <a:latin typeface="+mj-lt"/>
+                <a:ea typeface="+mj-ea"/>
+                <a:cs typeface="+mj-cs"/>
+              </a:rPr>
+              <a:t>• ConcreteFactory(AppleFamilyFactoryV1, </a:t>
+            </a:r>
+            <a:r>
+              <a:rPr lang="pt-BR" sz="1400" b="1" spc="50" dirty="0" smtClean="0">
+                <a:ln w="12700">
+                  <a:noFill/>
+                  <a:prstDash val="solid"/>
+                </a:ln>
+                <a:solidFill>
+                  <a:schemeClr val="accent4"/>
+                </a:solidFill>
+                <a:latin typeface="+mj-lt"/>
+                <a:ea typeface="+mj-ea"/>
+                <a:cs typeface="+mj-cs"/>
+              </a:rPr>
+              <a:t>MicrosoftFamilyFactoryV1, </a:t>
+            </a:r>
+            <a:r>
+              <a:rPr lang="pt-BR" sz="1400" b="1" spc="50" dirty="0" smtClean="0">
+                <a:ln w="12700">
+                  <a:noFill/>
+                  <a:prstDash val="solid"/>
+                </a:ln>
+                <a:solidFill>
+                  <a:schemeClr val="accent4"/>
+                </a:solidFill>
+              </a:rPr>
+              <a:t>AppleFamilyFactoryV2</a:t>
+            </a:r>
+            <a:r>
+              <a:rPr lang="pt-BR" sz="1400" b="1" spc="50" dirty="0" smtClean="0">
+                <a:ln w="12700">
+                  <a:noFill/>
+                  <a:prstDash val="solid"/>
+                </a:ln>
+                <a:solidFill>
+                  <a:schemeClr val="accent4"/>
+                </a:solidFill>
+                <a:latin typeface="+mj-lt"/>
+                <a:ea typeface="+mj-ea"/>
+                <a:cs typeface="+mj-cs"/>
+              </a:rPr>
+              <a:t>)</a:t>
+            </a:r>
+            <a:endParaRPr lang="pt-BR" sz="1400" b="1" spc="50" dirty="0">
+              <a:ln w="12700">
+                <a:noFill/>
+                <a:prstDash val="solid"/>
+              </a:ln>
+              <a:solidFill>
+                <a:schemeClr val="accent4"/>
+              </a:solidFill>
+              <a:latin typeface="+mj-lt"/>
+              <a:ea typeface="+mj-ea"/>
+              <a:cs typeface="+mj-cs"/>
+            </a:endParaRPr>
+          </a:p>
+          <a:p>
+            <a:endParaRPr lang="pt-BR" sz="1400" b="1" spc="50" dirty="0">
+              <a:ln w="12700">
+                <a:noFill/>
+                <a:prstDash val="solid"/>
+              </a:ln>
+              <a:solidFill>
+                <a:schemeClr val="accent4"/>
+              </a:solidFill>
+              <a:latin typeface="+mj-lt"/>
+              <a:ea typeface="+mj-ea"/>
+              <a:cs typeface="+mj-cs"/>
+            </a:endParaRPr>
+          </a:p>
+          <a:p>
+            <a:r>
+              <a:rPr lang="en-US" altLang="zh-CN" sz="1400" b="1" spc="50" dirty="0" smtClean="0">
+                <a:ln w="12700">
+                  <a:noFill/>
+                  <a:prstDash val="solid"/>
+                </a:ln>
+                <a:solidFill>
+                  <a:schemeClr val="accent4"/>
+                </a:solidFill>
+                <a:latin typeface="+mj-lt"/>
+                <a:ea typeface="+mj-ea"/>
+                <a:cs typeface="+mj-cs"/>
+              </a:rPr>
+              <a:t>	— </a:t>
+            </a:r>
+            <a:r>
+              <a:rPr lang="zh-CN" altLang="en-US" sz="1400" b="1" spc="50" dirty="0">
+                <a:ln w="12700">
+                  <a:noFill/>
+                  <a:prstDash val="solid"/>
+                </a:ln>
+                <a:solidFill>
+                  <a:schemeClr val="accent4"/>
+                </a:solidFill>
+                <a:latin typeface="+mj-lt"/>
+                <a:ea typeface="+mj-ea"/>
+                <a:cs typeface="+mj-cs"/>
+              </a:rPr>
+              <a:t>实现创建具体产品对象的操作。</a:t>
+            </a:r>
+            <a:endParaRPr lang="en-US" altLang="zh-CN" sz="1400" b="1" spc="50" dirty="0">
+              <a:ln w="12700">
+                <a:noFill/>
+                <a:prstDash val="solid"/>
+              </a:ln>
+              <a:solidFill>
+                <a:schemeClr val="accent4"/>
+              </a:solidFill>
+              <a:latin typeface="+mj-lt"/>
+              <a:ea typeface="+mj-ea"/>
+              <a:cs typeface="+mj-cs"/>
+            </a:endParaRPr>
+          </a:p>
+          <a:p>
+            <a:endParaRPr lang="zh-CN" altLang="en-US" sz="1400" b="1" spc="50" dirty="0">
+              <a:ln w="12700">
+                <a:noFill/>
+                <a:prstDash val="solid"/>
+              </a:ln>
+              <a:solidFill>
+                <a:schemeClr val="accent4"/>
+              </a:solidFill>
+              <a:latin typeface="+mj-lt"/>
+              <a:ea typeface="+mj-ea"/>
+              <a:cs typeface="+mj-cs"/>
+            </a:endParaRPr>
+          </a:p>
+          <a:p>
+            <a:r>
+              <a:rPr lang="pt-BR" sz="1400" b="1" spc="50" dirty="0">
+                <a:ln w="12700">
+                  <a:noFill/>
+                  <a:prstDash val="solid"/>
+                </a:ln>
+                <a:solidFill>
+                  <a:schemeClr val="accent4"/>
+                </a:solidFill>
+                <a:latin typeface="+mj-lt"/>
+                <a:ea typeface="+mj-ea"/>
+                <a:cs typeface="+mj-cs"/>
+              </a:rPr>
+              <a:t>• </a:t>
+            </a:r>
+            <a:r>
+              <a:rPr lang="pt-BR" sz="1400" b="1" spc="50" dirty="0" smtClean="0">
+                <a:ln w="12700">
+                  <a:noFill/>
+                  <a:prstDash val="solid"/>
+                </a:ln>
+                <a:solidFill>
+                  <a:schemeClr val="accent4"/>
+                </a:solidFill>
+                <a:latin typeface="+mj-lt"/>
+                <a:ea typeface="+mj-ea"/>
+                <a:cs typeface="+mj-cs"/>
+              </a:rPr>
+              <a:t>AbstractProduct( Pad, Phone )</a:t>
+            </a:r>
+            <a:endParaRPr lang="pt-BR" sz="1400" b="1" spc="50" dirty="0">
+              <a:ln w="12700">
+                <a:noFill/>
+                <a:prstDash val="solid"/>
+              </a:ln>
+              <a:solidFill>
+                <a:schemeClr val="accent4"/>
+              </a:solidFill>
+              <a:latin typeface="+mj-lt"/>
+              <a:ea typeface="+mj-ea"/>
+              <a:cs typeface="+mj-cs"/>
+            </a:endParaRPr>
+          </a:p>
+          <a:p>
+            <a:endParaRPr lang="pt-BR" sz="1400" b="1" spc="50" dirty="0">
+              <a:ln w="12700">
+                <a:noFill/>
+                <a:prstDash val="solid"/>
+              </a:ln>
+              <a:solidFill>
+                <a:schemeClr val="accent4"/>
+              </a:solidFill>
+              <a:latin typeface="+mj-lt"/>
+              <a:ea typeface="+mj-ea"/>
+              <a:cs typeface="+mj-cs"/>
+            </a:endParaRPr>
+          </a:p>
+          <a:p>
+            <a:r>
+              <a:rPr lang="en-US" altLang="zh-CN" sz="1400" b="1" spc="50" dirty="0" smtClean="0">
+                <a:ln w="12700">
+                  <a:noFill/>
+                  <a:prstDash val="solid"/>
+                </a:ln>
+                <a:solidFill>
+                  <a:schemeClr val="accent4"/>
+                </a:solidFill>
+                <a:latin typeface="+mj-lt"/>
+                <a:ea typeface="+mj-ea"/>
+                <a:cs typeface="+mj-cs"/>
+              </a:rPr>
+              <a:t>	— </a:t>
+            </a:r>
+            <a:r>
+              <a:rPr lang="zh-CN" altLang="en-US" sz="1400" b="1" spc="50" dirty="0">
+                <a:ln w="12700">
+                  <a:noFill/>
+                  <a:prstDash val="solid"/>
+                </a:ln>
+                <a:solidFill>
+                  <a:schemeClr val="accent4"/>
+                </a:solidFill>
+                <a:latin typeface="+mj-lt"/>
+                <a:ea typeface="+mj-ea"/>
+                <a:cs typeface="+mj-cs"/>
+              </a:rPr>
+              <a:t>为一类产品对象声明一个接口。</a:t>
+            </a:r>
+            <a:endParaRPr lang="en-US" altLang="zh-CN" sz="1400" b="1" spc="50" dirty="0">
+              <a:ln w="12700">
+                <a:noFill/>
+                <a:prstDash val="solid"/>
+              </a:ln>
+              <a:solidFill>
+                <a:schemeClr val="accent4"/>
+              </a:solidFill>
+              <a:latin typeface="+mj-lt"/>
+              <a:ea typeface="+mj-ea"/>
+              <a:cs typeface="+mj-cs"/>
+            </a:endParaRPr>
+          </a:p>
+          <a:p>
+            <a:endParaRPr lang="zh-CN" altLang="en-US" sz="1400" b="1" spc="50" dirty="0">
+              <a:ln w="12700">
+                <a:noFill/>
+                <a:prstDash val="solid"/>
+              </a:ln>
+              <a:solidFill>
+                <a:schemeClr val="accent4"/>
+              </a:solidFill>
+              <a:latin typeface="+mj-lt"/>
+              <a:ea typeface="+mj-ea"/>
+              <a:cs typeface="+mj-cs"/>
+            </a:endParaRPr>
+          </a:p>
+          <a:p>
+            <a:r>
+              <a:rPr lang="pt-BR" sz="1400" b="1" spc="50" dirty="0">
+                <a:ln w="12700">
+                  <a:noFill/>
+                  <a:prstDash val="solid"/>
+                </a:ln>
+                <a:solidFill>
+                  <a:schemeClr val="accent4"/>
+                </a:solidFill>
+                <a:latin typeface="+mj-lt"/>
+                <a:ea typeface="+mj-ea"/>
+                <a:cs typeface="+mj-cs"/>
+              </a:rPr>
+              <a:t>• </a:t>
+            </a:r>
+            <a:r>
+              <a:rPr lang="pt-BR" sz="1400" b="1" spc="50" dirty="0" smtClean="0">
+                <a:ln w="12700">
+                  <a:noFill/>
+                  <a:prstDash val="solid"/>
+                </a:ln>
+                <a:solidFill>
+                  <a:schemeClr val="accent4"/>
+                </a:solidFill>
+                <a:latin typeface="+mj-lt"/>
+                <a:ea typeface="+mj-ea"/>
+                <a:cs typeface="+mj-cs"/>
+              </a:rPr>
+              <a:t>ConcreteProduct( iPad 2, Surface 4, iPhone 4, WindowsPhone8.1)</a:t>
+            </a:r>
+            <a:endParaRPr lang="pt-BR" sz="1400" b="1" spc="50" dirty="0">
+              <a:ln w="12700">
+                <a:noFill/>
+                <a:prstDash val="solid"/>
+              </a:ln>
+              <a:solidFill>
+                <a:schemeClr val="accent4"/>
+              </a:solidFill>
+              <a:latin typeface="+mj-lt"/>
+              <a:ea typeface="+mj-ea"/>
+              <a:cs typeface="+mj-cs"/>
+            </a:endParaRPr>
+          </a:p>
+          <a:p>
+            <a:endParaRPr lang="pt-BR" sz="1400" b="1" spc="50" dirty="0">
+              <a:ln w="12700">
+                <a:noFill/>
+                <a:prstDash val="solid"/>
+              </a:ln>
+              <a:solidFill>
+                <a:schemeClr val="accent4"/>
+              </a:solidFill>
+              <a:latin typeface="+mj-lt"/>
+              <a:ea typeface="+mj-ea"/>
+              <a:cs typeface="+mj-cs"/>
+            </a:endParaRPr>
+          </a:p>
+          <a:p>
+            <a:r>
+              <a:rPr lang="en-US" altLang="zh-CN" sz="1400" b="1" spc="50" dirty="0" smtClean="0">
+                <a:ln w="12700">
+                  <a:noFill/>
+                  <a:prstDash val="solid"/>
+                </a:ln>
+                <a:solidFill>
+                  <a:schemeClr val="accent4"/>
+                </a:solidFill>
+                <a:latin typeface="+mj-lt"/>
+                <a:ea typeface="+mj-ea"/>
+                <a:cs typeface="+mj-cs"/>
+              </a:rPr>
+              <a:t>	— </a:t>
+            </a:r>
+            <a:r>
+              <a:rPr lang="zh-CN" altLang="en-US" sz="1400" b="1" spc="50" dirty="0">
+                <a:ln w="12700">
+                  <a:noFill/>
+                  <a:prstDash val="solid"/>
+                </a:ln>
+                <a:solidFill>
+                  <a:schemeClr val="accent4"/>
+                </a:solidFill>
+                <a:latin typeface="+mj-lt"/>
+                <a:ea typeface="+mj-ea"/>
+                <a:cs typeface="+mj-cs"/>
+              </a:rPr>
+              <a:t>定义一个将被相应的具体工厂创建的产品对象。</a:t>
+            </a:r>
+          </a:p>
+          <a:p>
+            <a:r>
+              <a:rPr lang="en-US" altLang="zh-CN" sz="1400" b="1" spc="50" dirty="0" smtClean="0">
+                <a:ln w="12700">
+                  <a:noFill/>
+                  <a:prstDash val="solid"/>
+                </a:ln>
+                <a:solidFill>
+                  <a:schemeClr val="accent4"/>
+                </a:solidFill>
+                <a:latin typeface="+mj-lt"/>
+                <a:ea typeface="+mj-ea"/>
+                <a:cs typeface="+mj-cs"/>
+              </a:rPr>
+              <a:t>	— </a:t>
+            </a:r>
+            <a:r>
+              <a:rPr lang="zh-CN" altLang="en-US" sz="1400" b="1" spc="50" dirty="0" smtClean="0">
+                <a:ln w="12700">
+                  <a:noFill/>
+                  <a:prstDash val="solid"/>
+                </a:ln>
+                <a:solidFill>
+                  <a:schemeClr val="accent4"/>
+                </a:solidFill>
+                <a:latin typeface="+mj-lt"/>
+                <a:ea typeface="+mj-ea"/>
+                <a:cs typeface="+mj-cs"/>
+              </a:rPr>
+              <a:t>实现</a:t>
+            </a:r>
+            <a:r>
+              <a:rPr lang="pt-BR" sz="1400" b="1" spc="50" dirty="0">
+                <a:ln w="12700">
+                  <a:noFill/>
+                  <a:prstDash val="solid"/>
+                </a:ln>
+                <a:solidFill>
+                  <a:schemeClr val="accent4"/>
+                </a:solidFill>
+              </a:rPr>
+              <a:t>AbstractProduct</a:t>
+            </a:r>
+            <a:r>
+              <a:rPr lang="zh-CN" altLang="en-US" sz="1400" b="1" spc="50" dirty="0" smtClean="0">
+                <a:ln w="12700">
+                  <a:noFill/>
+                  <a:prstDash val="solid"/>
+                </a:ln>
+                <a:solidFill>
+                  <a:schemeClr val="accent4"/>
+                </a:solidFill>
+                <a:latin typeface="+mj-lt"/>
+                <a:ea typeface="+mj-ea"/>
+                <a:cs typeface="+mj-cs"/>
+              </a:rPr>
+              <a:t>接口</a:t>
+            </a:r>
+            <a:r>
+              <a:rPr lang="zh-CN" altLang="en-US" sz="1400" b="1" spc="50" dirty="0">
+                <a:ln w="12700">
+                  <a:noFill/>
+                  <a:prstDash val="solid"/>
+                </a:ln>
+                <a:solidFill>
+                  <a:schemeClr val="accent4"/>
+                </a:solidFill>
+                <a:latin typeface="+mj-lt"/>
+                <a:ea typeface="+mj-ea"/>
+                <a:cs typeface="+mj-cs"/>
+              </a:rPr>
+              <a:t>。</a:t>
+            </a:r>
+            <a:endParaRPr lang="en-US" altLang="zh-CN" sz="1400" b="1" spc="50" dirty="0">
+              <a:ln w="12700">
+                <a:noFill/>
+                <a:prstDash val="solid"/>
+              </a:ln>
+              <a:solidFill>
+                <a:schemeClr val="accent4"/>
+              </a:solidFill>
+              <a:latin typeface="+mj-lt"/>
+              <a:ea typeface="+mj-ea"/>
+              <a:cs typeface="+mj-cs"/>
+            </a:endParaRPr>
+          </a:p>
+          <a:p>
+            <a:endParaRPr lang="zh-CN" altLang="en-US" sz="1400" b="1" spc="50" dirty="0">
+              <a:ln w="12700">
+                <a:noFill/>
+                <a:prstDash val="solid"/>
+              </a:ln>
+              <a:solidFill>
+                <a:schemeClr val="accent4"/>
+              </a:solidFill>
+              <a:latin typeface="+mj-lt"/>
+              <a:ea typeface="+mj-ea"/>
+              <a:cs typeface="+mj-cs"/>
+            </a:endParaRPr>
+          </a:p>
+          <a:p>
+            <a:r>
+              <a:rPr lang="pt-BR" sz="1400" b="1" spc="50" dirty="0">
+                <a:ln w="12700">
+                  <a:noFill/>
+                  <a:prstDash val="solid"/>
+                </a:ln>
+                <a:solidFill>
+                  <a:schemeClr val="accent4"/>
+                </a:solidFill>
+                <a:latin typeface="+mj-lt"/>
+                <a:ea typeface="+mj-ea"/>
+                <a:cs typeface="+mj-cs"/>
+              </a:rPr>
+              <a:t>• </a:t>
+            </a:r>
+            <a:r>
+              <a:rPr lang="pt-BR" sz="1400" b="1" spc="50" dirty="0" smtClean="0">
+                <a:ln w="12700">
+                  <a:noFill/>
+                  <a:prstDash val="solid"/>
+                </a:ln>
+                <a:solidFill>
+                  <a:schemeClr val="accent4"/>
+                </a:solidFill>
+                <a:latin typeface="+mj-lt"/>
+                <a:ea typeface="+mj-ea"/>
+                <a:cs typeface="+mj-cs"/>
+              </a:rPr>
+              <a:t>Client( Web Page )</a:t>
+            </a:r>
+          </a:p>
+          <a:p>
+            <a:endParaRPr lang="pt-BR" sz="1400" b="1" spc="50" dirty="0">
+              <a:ln w="12700">
+                <a:noFill/>
+                <a:prstDash val="solid"/>
+              </a:ln>
+              <a:solidFill>
+                <a:schemeClr val="accent4"/>
+              </a:solidFill>
+              <a:latin typeface="+mj-lt"/>
+              <a:ea typeface="+mj-ea"/>
+              <a:cs typeface="+mj-cs"/>
+            </a:endParaRPr>
+          </a:p>
+          <a:p>
+            <a:r>
+              <a:rPr lang="en-US" altLang="zh-CN" sz="1400" b="1" spc="50" dirty="0" smtClean="0">
+                <a:ln w="12700">
+                  <a:noFill/>
+                  <a:prstDash val="solid"/>
+                </a:ln>
+                <a:solidFill>
+                  <a:schemeClr val="accent4"/>
+                </a:solidFill>
+                <a:latin typeface="+mj-lt"/>
+                <a:ea typeface="+mj-ea"/>
+                <a:cs typeface="+mj-cs"/>
+              </a:rPr>
+              <a:t>	— </a:t>
+            </a:r>
+            <a:r>
+              <a:rPr lang="zh-CN" altLang="en-US" sz="1400" b="1" spc="50" dirty="0">
+                <a:ln w="12700">
+                  <a:noFill/>
+                  <a:prstDash val="solid"/>
+                </a:ln>
+                <a:solidFill>
+                  <a:schemeClr val="accent4"/>
+                </a:solidFill>
+                <a:latin typeface="+mj-lt"/>
+                <a:ea typeface="+mj-ea"/>
+                <a:cs typeface="+mj-cs"/>
+              </a:rPr>
+              <a:t>仅使用</a:t>
+            </a:r>
+            <a:r>
+              <a:rPr lang="zh-CN" altLang="en-US" sz="1400" b="1" spc="50" dirty="0" smtClean="0">
+                <a:ln w="12700">
+                  <a:noFill/>
+                  <a:prstDash val="solid"/>
+                </a:ln>
+                <a:solidFill>
+                  <a:schemeClr val="accent4"/>
+                </a:solidFill>
+                <a:latin typeface="+mj-lt"/>
+                <a:ea typeface="+mj-ea"/>
+                <a:cs typeface="+mj-cs"/>
+              </a:rPr>
+              <a:t>由</a:t>
+            </a:r>
+            <a:r>
+              <a:rPr lang="pt-BR" sz="1400" b="1" spc="50" dirty="0">
+                <a:ln w="12700">
+                  <a:noFill/>
+                  <a:prstDash val="solid"/>
+                </a:ln>
+                <a:solidFill>
+                  <a:schemeClr val="accent4"/>
+                </a:solidFill>
+              </a:rPr>
+              <a:t>AbstractFactory</a:t>
+            </a:r>
+            <a:r>
+              <a:rPr lang="zh-CN" altLang="en-US" sz="1400" b="1" spc="50" dirty="0" smtClean="0">
+                <a:ln w="12700">
+                  <a:noFill/>
+                  <a:prstDash val="solid"/>
+                </a:ln>
+                <a:solidFill>
+                  <a:schemeClr val="accent4"/>
+                </a:solidFill>
+                <a:latin typeface="+mj-lt"/>
+                <a:ea typeface="+mj-ea"/>
+                <a:cs typeface="+mj-cs"/>
+              </a:rPr>
+              <a:t>和</a:t>
+            </a:r>
+            <a:r>
+              <a:rPr lang="pt-BR" sz="1400" b="1" spc="50" dirty="0">
+                <a:ln w="12700">
+                  <a:noFill/>
+                  <a:prstDash val="solid"/>
+                </a:ln>
+                <a:solidFill>
+                  <a:schemeClr val="accent4"/>
+                </a:solidFill>
+              </a:rPr>
+              <a:t>AbstractProduct</a:t>
+            </a:r>
+            <a:r>
+              <a:rPr lang="zh-CN" altLang="en-US" sz="1400" b="1" spc="50" dirty="0" smtClean="0">
+                <a:ln w="12700">
+                  <a:noFill/>
+                  <a:prstDash val="solid"/>
+                </a:ln>
+                <a:solidFill>
+                  <a:schemeClr val="accent4"/>
+                </a:solidFill>
+                <a:latin typeface="+mj-lt"/>
+                <a:ea typeface="+mj-ea"/>
+                <a:cs typeface="+mj-cs"/>
+              </a:rPr>
+              <a:t>类</a:t>
+            </a:r>
+            <a:r>
+              <a:rPr lang="zh-CN" altLang="en-US" sz="1400" b="1" spc="50" dirty="0">
+                <a:ln w="12700">
+                  <a:noFill/>
+                  <a:prstDash val="solid"/>
+                </a:ln>
+                <a:solidFill>
+                  <a:schemeClr val="accent4"/>
+                </a:solidFill>
+                <a:latin typeface="+mj-lt"/>
+                <a:ea typeface="+mj-ea"/>
+                <a:cs typeface="+mj-cs"/>
+              </a:rPr>
+              <a:t>声明的接口。</a:t>
+            </a:r>
+          </a:p>
+        </p:txBody>
+      </p:sp>
+      <p:sp>
+        <p:nvSpPr>
+          <p:cNvPr id="6" name="Rectangle 2"/>
+          <p:cNvSpPr txBox="1">
+            <a:spLocks noChangeArrowheads="1"/>
+          </p:cNvSpPr>
+          <p:nvPr/>
+        </p:nvSpPr>
+        <p:spPr>
+          <a:xfrm>
+            <a:off x="628650" y="365127"/>
+            <a:ext cx="7886700" cy="1119658"/>
+          </a:xfrm>
+          <a:prstGeom prst="rect">
+            <a:avLst/>
+          </a:prstGeom>
+        </p:spPr>
+        <p:txBody>
+          <a:bodyPr vert="horz" lIns="91440" tIns="45720" rIns="91440" bIns="45720" rtlCol="0" anchor="ctr">
+            <a:normAutofit/>
+          </a:bodyPr>
+          <a:lstStyle>
+            <a:lvl1pPr algn="ctr" defTabSz="914400" rtl="0" eaLnBrk="1" latinLnBrk="0" hangingPunct="1">
+              <a:spcBef>
+                <a:spcPct val="0"/>
+              </a:spcBef>
+              <a:buNone/>
+              <a:defRPr sz="4400" kern="1200">
+                <a:solidFill>
+                  <a:schemeClr val="tx1"/>
+                </a:solidFill>
+                <a:latin typeface="+mj-lt"/>
+                <a:ea typeface="+mj-ea"/>
+                <a:cs typeface="+mj-cs"/>
+              </a:defRPr>
+            </a:lvl1pPr>
+          </a:lstStyle>
+          <a:p>
+            <a:r>
+              <a:rPr lang="en-US" altLang="zh-CN" dirty="0" smtClean="0"/>
+              <a:t>Abstract Factory</a:t>
+            </a:r>
+            <a:endParaRPr lang="zh-CN" altLang="en-US" dirty="0"/>
+          </a:p>
+        </p:txBody>
+      </p:sp>
     </p:spTree>
     <p:extLst>
       <p:ext uri="{BB962C8B-B14F-4D97-AF65-F5344CB8AC3E}">
@@ -15122,7 +15750,7 @@
 </p:sld>
 </file>
 
-<file path=ppt/slides/slide31.xml><?xml version="1.0" encoding="utf-8"?>
+<file path=ppt/slides/slide32.xml><?xml version="1.0" encoding="utf-8"?>
 <p:sld xmlns:a="http://schemas.openxmlformats.org/drawingml/2006/main" xmlns:r="http://schemas.openxmlformats.org/officeDocument/2006/relationships" xmlns:p="http://schemas.openxmlformats.org/presentationml/2006/main">
   <p:cSld>
     <p:spTree>
@@ -15220,7 +15848,39 @@
                   <a:schemeClr val="accent4"/>
                 </a:solidFill>
               </a:rPr>
-              <a:t>简单的工厂提供一个创建对象的简单方法</a:t>
+              <a:t>简单的</a:t>
+            </a:r>
+            <a:r>
+              <a:rPr lang="zh-CN" altLang="en-US" sz="1400" dirty="0" smtClean="0">
+                <a:solidFill>
+                  <a:schemeClr val="accent4"/>
+                </a:solidFill>
+              </a:rPr>
+              <a:t>工厂</a:t>
+            </a:r>
+            <a:r>
+              <a:rPr lang="zh-CN" altLang="en-US" sz="1400" dirty="0">
+                <a:solidFill>
+                  <a:schemeClr val="accent4"/>
+                </a:solidFill>
+              </a:rPr>
+              <a:t>，</a:t>
+            </a:r>
+            <a:r>
+              <a:rPr lang="zh-CN" altLang="en-US" sz="1400" dirty="0" smtClean="0">
+                <a:solidFill>
+                  <a:schemeClr val="accent4"/>
+                </a:solidFill>
+              </a:rPr>
+              <a:t>提供</a:t>
+            </a:r>
+            <a:r>
+              <a:rPr lang="zh-CN" altLang="en-US" sz="1400" dirty="0" smtClean="0">
+                <a:solidFill>
+                  <a:schemeClr val="accent4"/>
+                </a:solidFill>
+              </a:rPr>
+              <a:t>一个创建对象的简单方法</a:t>
             </a:r>
             <a:endParaRPr lang="en-US" altLang="zh-CN" sz="1400" dirty="0" smtClean="0">
               <a:solidFill>
@@ -15449,7 +16109,7 @@
             <a:r>
               <a:rPr lang="en-US" altLang="zh-CN" sz="1400" dirty="0" smtClean="0">
                 <a:solidFill>
-                  <a:schemeClr val="accent4"/>
+                  <a:srgbClr val="FF0000"/>
                 </a:solidFill>
               </a:rPr>
               <a:t>Method</a:t>
@@ -15663,7 +16323,23 @@
                   <a:schemeClr val="accent4"/>
                 </a:solidFill>
               </a:rPr>
-              <a:t>           重点在于提供创建</a:t>
+              <a:t>           </a:t>
+            </a:r>
+            <a:r>
+              <a:rPr lang="zh-CN" altLang="en-US" sz="1400" dirty="0" smtClean="0">
+                <a:solidFill>
+                  <a:schemeClr val="accent4"/>
+                </a:solidFill>
+              </a:rPr>
+              <a:t>     重点</a:t>
+            </a:r>
+            <a:r>
+              <a:rPr lang="zh-CN" altLang="en-US" sz="1400" dirty="0" smtClean="0">
+                <a:solidFill>
+                  <a:schemeClr val="accent4"/>
+                </a:solidFill>
+              </a:rPr>
+              <a:t>在于提供创建</a:t>
             </a:r>
             <a:r>
               <a:rPr lang="zh-CN" altLang="en-US" sz="1400" dirty="0">
@@ -15700,7 +16376,7 @@
             <a:r>
               <a:rPr lang="en-US" altLang="zh-CN" sz="1400" dirty="0" smtClean="0">
                 <a:solidFill>
-                  <a:schemeClr val="accent4"/>
+                  <a:srgbClr val="FF0000"/>
                 </a:solidFill>
               </a:rPr>
               <a:t>Factory</a:t>
@@ -15907,7 +16583,7 @@
 </p:sld>
 </file>
 
-<file path=ppt/slides/slide32.xml><?xml version="1.0" encoding="utf-8"?>
+<file path=ppt/slides/slide33.xml><?xml version="1.0" encoding="utf-8"?>
 <p:sld xmlns:a="http://schemas.openxmlformats.org/drawingml/2006/main" xmlns:r="http://schemas.openxmlformats.org/officeDocument/2006/relationships" xmlns:p="http://schemas.openxmlformats.org/presentationml/2006/main">
   <p:cSld>
     <p:spTree>
@@ -15978,7 +16654,7 @@
 </p:sld>
 </file>
 
-<file path=ppt/slides/slide33.xml><?xml version="1.0" encoding="utf-8"?>
+<file path=ppt/slides/slide34.xml><?xml version="1.0" encoding="utf-8"?>
 <p:sld xmlns:a="http://schemas.openxmlformats.org/drawingml/2006/main" xmlns:r="http://schemas.openxmlformats.org/officeDocument/2006/relationships" xmlns:p="http://schemas.openxmlformats.org/presentationml/2006/main">
   <p:cSld>
     <p:spTree>

</xml_diff>

<commit_message>
Updated PPT & Diagram.
</commit_message>
<xml_diff>
--- a/_Doc/Design Pattern (C#) - Part 1.pptx
+++ b/_Doc/Design Pattern (C#) - Part 1.pptx
@@ -225,7 +225,7 @@
           <a:p>
             <a:fld id="{E18479FA-1253-41AA-8ABD-DCCC0F2E9FAF}" type="datetimeFigureOut">
               <a:rPr lang="en-US" smtClean="0"/>
-              <a:t>4/8/2015</a:t>
+              <a:t>4/9/2015</a:t>
             </a:fld>
             <a:endParaRPr lang="en-US"/>
           </a:p>
@@ -2496,7 +2496,7 @@
           <a:p>
             <a:fld id="{530820CF-B880-4189-942D-D702A7CBA730}" type="datetimeFigureOut">
               <a:rPr lang="zh-CN" altLang="en-US" smtClean="0"/>
-              <a:t>2015/4/8</a:t>
+              <a:t>2015/4/9</a:t>
             </a:fld>
             <a:endParaRPr lang="zh-CN" altLang="en-US"/>
           </a:p>
@@ -2661,7 +2661,7 @@
           <a:p>
             <a:fld id="{530820CF-B880-4189-942D-D702A7CBA730}" type="datetimeFigureOut">
               <a:rPr lang="zh-CN" altLang="en-US" smtClean="0"/>
-              <a:t>2015/4/8</a:t>
+              <a:t>2015/4/9</a:t>
             </a:fld>
             <a:endParaRPr lang="zh-CN" altLang="en-US"/>
           </a:p>
@@ -2836,7 +2836,7 @@
           <a:p>
             <a:fld id="{530820CF-B880-4189-942D-D702A7CBA730}" type="datetimeFigureOut">
               <a:rPr lang="zh-CN" altLang="en-US" smtClean="0"/>
-              <a:t>2015/4/8</a:t>
+              <a:t>2015/4/9</a:t>
             </a:fld>
             <a:endParaRPr lang="zh-CN" altLang="en-US"/>
           </a:p>
@@ -3001,7 +3001,7 @@
           <a:p>
             <a:fld id="{530820CF-B880-4189-942D-D702A7CBA730}" type="datetimeFigureOut">
               <a:rPr lang="zh-CN" altLang="en-US" smtClean="0"/>
-              <a:t>2015/4/8</a:t>
+              <a:t>2015/4/9</a:t>
             </a:fld>
             <a:endParaRPr lang="zh-CN" altLang="en-US"/>
           </a:p>
@@ -3242,7 +3242,7 @@
           <a:p>
             <a:fld id="{530820CF-B880-4189-942D-D702A7CBA730}" type="datetimeFigureOut">
               <a:rPr lang="zh-CN" altLang="en-US" smtClean="0"/>
-              <a:t>2015/4/8</a:t>
+              <a:t>2015/4/9</a:t>
             </a:fld>
             <a:endParaRPr lang="zh-CN" altLang="en-US"/>
           </a:p>
@@ -3525,7 +3525,7 @@
           <a:p>
             <a:fld id="{530820CF-B880-4189-942D-D702A7CBA730}" type="datetimeFigureOut">
               <a:rPr lang="zh-CN" altLang="en-US" smtClean="0"/>
-              <a:t>2015/4/8</a:t>
+              <a:t>2015/4/9</a:t>
             </a:fld>
             <a:endParaRPr lang="zh-CN" altLang="en-US"/>
           </a:p>
@@ -3942,7 +3942,7 @@
           <a:p>
             <a:fld id="{530820CF-B880-4189-942D-D702A7CBA730}" type="datetimeFigureOut">
               <a:rPr lang="zh-CN" altLang="en-US" smtClean="0"/>
-              <a:t>2015/4/8</a:t>
+              <a:t>2015/4/9</a:t>
             </a:fld>
             <a:endParaRPr lang="zh-CN" altLang="en-US"/>
           </a:p>
@@ -4055,7 +4055,7 @@
           <a:p>
             <a:fld id="{530820CF-B880-4189-942D-D702A7CBA730}" type="datetimeFigureOut">
               <a:rPr lang="zh-CN" altLang="en-US" smtClean="0"/>
-              <a:t>2015/4/8</a:t>
+              <a:t>2015/4/9</a:t>
             </a:fld>
             <a:endParaRPr lang="zh-CN" altLang="en-US"/>
           </a:p>
@@ -4145,7 +4145,7 @@
           <a:p>
             <a:fld id="{530820CF-B880-4189-942D-D702A7CBA730}" type="datetimeFigureOut">
               <a:rPr lang="zh-CN" altLang="en-US" smtClean="0"/>
-              <a:t>2015/4/8</a:t>
+              <a:t>2015/4/9</a:t>
             </a:fld>
             <a:endParaRPr lang="zh-CN" altLang="en-US"/>
           </a:p>
@@ -4417,7 +4417,7 @@
           <a:p>
             <a:fld id="{530820CF-B880-4189-942D-D702A7CBA730}" type="datetimeFigureOut">
               <a:rPr lang="zh-CN" altLang="en-US" smtClean="0"/>
-              <a:t>2015/4/8</a:t>
+              <a:t>2015/4/9</a:t>
             </a:fld>
             <a:endParaRPr lang="zh-CN" altLang="en-US"/>
           </a:p>
@@ -4665,7 +4665,7 @@
           <a:p>
             <a:fld id="{530820CF-B880-4189-942D-D702A7CBA730}" type="datetimeFigureOut">
               <a:rPr lang="zh-CN" altLang="en-US" smtClean="0"/>
-              <a:t>2015/4/8</a:t>
+              <a:t>2015/4/9</a:t>
             </a:fld>
             <a:endParaRPr lang="zh-CN" altLang="en-US"/>
           </a:p>
@@ -4873,7 +4873,7 @@
           <a:p>
             <a:fld id="{530820CF-B880-4189-942D-D702A7CBA730}" type="datetimeFigureOut">
               <a:rPr lang="zh-CN" altLang="en-US" smtClean="0"/>
-              <a:t>2015/4/8</a:t>
+              <a:t>2015/4/9</a:t>
             </a:fld>
             <a:endParaRPr lang="zh-CN" altLang="en-US"/>
           </a:p>
@@ -6248,7 +6248,19 @@
               <a:rPr lang="en-US" altLang="zh-CN" sz="1900" dirty="0" smtClean="0">
                 <a:effectLst/>
               </a:rPr>
-              <a:t>    - Work Area</a:t>
+              <a:t>    - </a:t>
+            </a:r>
+            <a:r>
+              <a:rPr lang="en-US" altLang="zh-CN" sz="1900" dirty="0" err="1" smtClean="0">
+                <a:effectLst/>
+              </a:rPr>
+              <a:t>CreateWorkArea</a:t>
+            </a:r>
+            <a:r>
+              <a:rPr lang="en-US" altLang="zh-CN" sz="1900" dirty="0" smtClean="0">
+                <a:effectLst/>
+              </a:rPr>
+              <a:t>()</a:t>
             </a:r>
           </a:p>
           <a:p>
@@ -6490,13 +6502,13 @@
               <a:t>一致接口</a:t>
             </a:r>
             <a:r>
-              <a:rPr lang="en-US" altLang="zh-CN" sz="1900" dirty="0" err="1" smtClean="0">
+              <a:rPr lang="en-US" altLang="zh-CN" sz="1900" smtClean="0">
                 <a:solidFill>
                   <a:srgbClr val="FF0000"/>
                 </a:solidFill>
                 <a:effectLst/>
               </a:rPr>
-              <a:t>CreateArea</a:t>
+              <a:t>CreateWorkArea</a:t>
             </a:r>
             <a:r>
               <a:rPr lang="en-US" altLang="zh-CN" sz="1900" dirty="0" smtClean="0">
@@ -6998,7 +7010,7 @@
       </p:sp>
       <p:pic>
         <p:nvPicPr>
-          <p:cNvPr id="1028" name="Picture 4"/>
+          <p:cNvPr id="1026" name="Picture 2"/>
           <p:cNvPicPr>
             <a:picLocks noChangeAspect="1" noChangeArrowheads="1"/>
           </p:cNvPicPr>
@@ -7019,8 +7031,8 @@
         </p:blipFill>
         <p:spPr bwMode="auto">
           <a:xfrm>
-            <a:off x="20141" y="1700809"/>
-            <a:ext cx="9123859" cy="3203547"/>
+            <a:off x="0" y="1988840"/>
+            <a:ext cx="9144000" cy="3165487"/>
           </a:xfrm>
           <a:prstGeom prst="rect">
             <a:avLst/>
@@ -7193,9 +7205,61 @@
           </a:extLst>
         </p:spPr>
       </p:pic>
+      <p:sp>
+        <p:nvSpPr>
+          <p:cNvPr id="9" name="TextBox 8"/>
+          <p:cNvSpPr txBox="1"/>
+          <p:nvPr/>
+        </p:nvSpPr>
+        <p:spPr>
+          <a:xfrm>
+            <a:off x="1547664" y="5728652"/>
+            <a:ext cx="2304256" cy="338554"/>
+          </a:xfrm>
+          <a:prstGeom prst="rect">
+            <a:avLst/>
+          </a:prstGeom>
+          <a:noFill/>
+        </p:spPr>
+        <p:txBody>
+          <a:bodyPr wrap="square" rtlCol="0">
+            <a:spAutoFit/>
+          </a:bodyPr>
+          <a:lstStyle/>
+          <a:p>
+            <a:r>
+              <a:rPr lang="zh-CN" altLang="en-US" sz="1600" b="1" spc="50" dirty="0">
+                <a:ln w="12700">
+                  <a:noFill/>
+                  <a:prstDash val="solid"/>
+                </a:ln>
+                <a:solidFill>
+                  <a:schemeClr val="accent4"/>
+                </a:solidFill>
+                <a:latin typeface="+mj-lt"/>
+                <a:ea typeface="+mj-ea"/>
+                <a:cs typeface="+mj-cs"/>
+              </a:rPr>
+              <a:t>具体实现，参考代码</a:t>
+            </a:r>
+            <a:endParaRPr lang="en-US" sz="1600" b="1" spc="50" dirty="0">
+              <a:ln w="12700">
+                <a:noFill/>
+                <a:prstDash val="solid"/>
+              </a:ln>
+              <a:solidFill>
+                <a:schemeClr val="accent4"/>
+              </a:solidFill>
+              <a:latin typeface="+mj-lt"/>
+              <a:ea typeface="+mj-ea"/>
+              <a:cs typeface="+mj-cs"/>
+            </a:endParaRPr>
+          </a:p>
+        </p:txBody>
+      </p:sp>
       <p:pic>
         <p:nvPicPr>
-          <p:cNvPr id="3077" name="Picture 5"/>
+          <p:cNvPr id="2050" name="Picture 2"/>
           <p:cNvPicPr>
             <a:picLocks noChangeAspect="1" noChangeArrowheads="1"/>
           </p:cNvPicPr>
@@ -7216,8 +7280,8 @@
         </p:blipFill>
         <p:spPr bwMode="auto">
           <a:xfrm>
-            <a:off x="35043" y="2060848"/>
-            <a:ext cx="4800119" cy="3456384"/>
+            <a:off x="92690" y="1988840"/>
+            <a:ext cx="4911358" cy="3489240"/>
           </a:xfrm>
           <a:prstGeom prst="rect">
             <a:avLst/>
@@ -7257,58 +7321,6 @@
           </a:extLst>
         </p:spPr>
       </p:pic>
-      <p:sp>
-        <p:nvSpPr>
-          <p:cNvPr id="9" name="TextBox 8"/>
-          <p:cNvSpPr txBox="1"/>
-          <p:nvPr/>
-        </p:nvSpPr>
-        <p:spPr>
-          <a:xfrm>
-            <a:off x="1282974" y="5728652"/>
-            <a:ext cx="2304256" cy="338554"/>
-          </a:xfrm>
-          <a:prstGeom prst="rect">
-            <a:avLst/>
-          </a:prstGeom>
-          <a:noFill/>
-        </p:spPr>
-        <p:txBody>
-          <a:bodyPr wrap="square" rtlCol="0">
-            <a:spAutoFit/>
-          </a:bodyPr>
-          <a:lstStyle/>
-          <a:p>
-            <a:r>
-              <a:rPr lang="zh-CN" altLang="en-US" sz="1600" b="1" spc="50" dirty="0">
-                <a:ln w="12700">
-                  <a:noFill/>
-                  <a:prstDash val="solid"/>
-                </a:ln>
-                <a:solidFill>
-                  <a:schemeClr val="accent4"/>
-                </a:solidFill>
-                <a:latin typeface="+mj-lt"/>
-                <a:ea typeface="+mj-ea"/>
-                <a:cs typeface="+mj-cs"/>
-              </a:rPr>
-              <a:t>具体实现，参考代码</a:t>
-            </a:r>
-            <a:endParaRPr lang="en-US" sz="1600" b="1" spc="50" dirty="0">
-              <a:ln w="12700">
-                <a:noFill/>
-                <a:prstDash val="solid"/>
-              </a:ln>
-              <a:solidFill>
-                <a:schemeClr val="accent4"/>
-              </a:solidFill>
-              <a:latin typeface="+mj-lt"/>
-              <a:ea typeface="+mj-ea"/>
-              <a:cs typeface="+mj-cs"/>
-            </a:endParaRPr>
-          </a:p>
-        </p:txBody>
-      </p:sp>
     </p:spTree>
     <p:extLst>
       <p:ext uri="{BB962C8B-B14F-4D97-AF65-F5344CB8AC3E}">
@@ -7380,7 +7392,7 @@
       </p:sp>
       <p:pic>
         <p:nvPicPr>
-          <p:cNvPr id="4098" name="Picture 2"/>
+          <p:cNvPr id="4099" name="Picture 3"/>
           <p:cNvPicPr>
             <a:picLocks noChangeAspect="1" noChangeArrowheads="1"/>
           </p:cNvPicPr>
@@ -7401,71 +7413,7 @@
         </p:blipFill>
         <p:spPr bwMode="auto">
           <a:xfrm>
-            <a:off x="381353" y="1916832"/>
-            <a:ext cx="4910727" cy="3528392"/>
-          </a:xfrm>
-          <a:prstGeom prst="rect">
-            <a:avLst/>
-          </a:prstGeom>
-          <a:noFill/>
-          <a:ln>
-            <a:noFill/>
-          </a:ln>
-          <a:effectLst/>
-          <a:extLst>
-            <a:ext uri="{909E8E84-426E-40DD-AFC4-6F175D3DCCD1}">
-              <a14:hiddenFill xmlns:a14="http://schemas.microsoft.com/office/drawing/2010/main">
-                <a:solidFill>
-                  <a:schemeClr val="accent1"/>
-                </a:solidFill>
-              </a14:hiddenFill>
-            </a:ext>
-            <a:ext uri="{91240B29-F687-4F45-9708-019B960494DF}">
-              <a14:hiddenLine xmlns:a14="http://schemas.microsoft.com/office/drawing/2010/main" w="9525">
-                <a:solidFill>
-                  <a:schemeClr val="tx1"/>
-                </a:solidFill>
-                <a:miter lim="800000"/>
-                <a:headEnd/>
-                <a:tailEnd/>
-              </a14:hiddenLine>
-            </a:ext>
-            <a:ext uri="{AF507438-7753-43E0-B8FC-AC1667EBCBE1}">
-              <a14:hiddenEffects xmlns:a14="http://schemas.microsoft.com/office/drawing/2010/main">
-                <a:effectLst>
-                  <a:outerShdw dist="35921" dir="2700000" algn="ctr" rotWithShape="0">
-                    <a:schemeClr val="bg2"/>
-                  </a:outerShdw>
-                </a:effectLst>
-              </a14:hiddenEffects>
-            </a:ext>
-          </a:extLst>
-        </p:spPr>
-      </p:pic>
-      <p:pic>
-        <p:nvPicPr>
-          <p:cNvPr id="4099" name="Picture 3"/>
-          <p:cNvPicPr>
-            <a:picLocks noChangeAspect="1" noChangeArrowheads="1"/>
-          </p:cNvPicPr>
-          <p:nvPr/>
-        </p:nvPicPr>
-        <p:blipFill>
-          <a:blip r:embed="rId3">
-            <a:extLst>
-              <a:ext uri="{28A0092B-C50C-407E-A947-70E740481C1C}">
-                <a14:useLocalDpi xmlns:a14="http://schemas.microsoft.com/office/drawing/2010/main" val="0"/>
-              </a:ext>
-            </a:extLst>
-          </a:blip>
-          <a:srcRect/>
-          <a:stretch>
-            <a:fillRect/>
-          </a:stretch>
-        </p:blipFill>
-        <p:spPr bwMode="auto">
-          <a:xfrm>
-            <a:off x="5881067" y="1947312"/>
+            <a:off x="5508104" y="1947312"/>
             <a:ext cx="2219325" cy="1200150"/>
           </a:xfrm>
           <a:prstGeom prst="rect">
@@ -7558,6 +7506,70 @@
           </a:p>
         </p:txBody>
       </p:sp>
+      <p:pic>
+        <p:nvPicPr>
+          <p:cNvPr id="3074" name="Picture 2"/>
+          <p:cNvPicPr>
+            <a:picLocks noChangeAspect="1" noChangeArrowheads="1"/>
+          </p:cNvPicPr>
+          <p:nvPr/>
+        </p:nvPicPr>
+        <p:blipFill>
+          <a:blip r:embed="rId3">
+            <a:extLst>
+              <a:ext uri="{28A0092B-C50C-407E-A947-70E740481C1C}">
+                <a14:useLocalDpi xmlns:a14="http://schemas.microsoft.com/office/drawing/2010/main" val="0"/>
+              </a:ext>
+            </a:extLst>
+          </a:blip>
+          <a:srcRect/>
+          <a:stretch>
+            <a:fillRect/>
+          </a:stretch>
+        </p:blipFill>
+        <p:spPr bwMode="auto">
+          <a:xfrm>
+            <a:off x="179512" y="1996430"/>
+            <a:ext cx="5083719" cy="3664818"/>
+          </a:xfrm>
+          <a:prstGeom prst="rect">
+            <a:avLst/>
+          </a:prstGeom>
+          <a:noFill/>
+          <a:ln>
+            <a:noFill/>
+          </a:ln>
+          <a:effectLst/>
+          <a:extLst>
+            <a:ext uri="{909E8E84-426E-40DD-AFC4-6F175D3DCCD1}">
+              <a14:hiddenFill xmlns:a14="http://schemas.microsoft.com/office/drawing/2010/main">
+                <a:solidFill>
+                  <a:schemeClr val="accent1"/>
+                </a:solidFill>
+              </a14:hiddenFill>
+            </a:ext>
+            <a:ext uri="{91240B29-F687-4F45-9708-019B960494DF}">
+              <a14:hiddenLine xmlns:a14="http://schemas.microsoft.com/office/drawing/2010/main" w="9525">
+                <a:solidFill>
+                  <a:schemeClr val="tx1"/>
+                </a:solidFill>
+                <a:miter lim="800000"/>
+                <a:headEnd/>
+                <a:tailEnd/>
+              </a14:hiddenLine>
+            </a:ext>
+            <a:ext uri="{AF507438-7753-43E0-B8FC-AC1667EBCBE1}">
+              <a14:hiddenEffects xmlns:a14="http://schemas.microsoft.com/office/drawing/2010/main">
+                <a:effectLst>
+                  <a:outerShdw dist="35921" dir="2700000" algn="ctr" rotWithShape="0">
+                    <a:schemeClr val="bg2"/>
+                  </a:outerShdw>
+                </a:effectLst>
+              </a14:hiddenEffects>
+            </a:ext>
+          </a:extLst>
+        </p:spPr>
+      </p:pic>
     </p:spTree>
     <p:extLst>
       <p:ext uri="{BB962C8B-B14F-4D97-AF65-F5344CB8AC3E}">
@@ -9463,7 +9475,8 @@
           </a:p>
           <a:p>
             <a:pPr marL="342900" indent="-342900">
-              <a:buAutoNum type="arabicPeriod"/>
+              <a:buFont typeface="Arial" panose="020B0604020202020204" pitchFamily="34" charset="0"/>
+              <a:buChar char="•"/>
             </a:pPr>
             <a:r>
               <a:rPr lang="en-US" altLang="zh-CN" sz="1400" dirty="0" smtClean="0">
@@ -9492,7 +9505,8 @@
           </a:p>
           <a:p>
             <a:pPr marL="342900" indent="-342900">
-              <a:buAutoNum type="arabicPeriod"/>
+              <a:buFont typeface="Arial" panose="020B0604020202020204" pitchFamily="34" charset="0"/>
+              <a:buChar char="•"/>
             </a:pPr>
             <a:r>
               <a:rPr lang="en-US" altLang="zh-CN" sz="1400" dirty="0" smtClean="0">
@@ -9521,7 +9535,8 @@
           </a:p>
           <a:p>
             <a:pPr marL="342900" indent="-342900">
-              <a:buAutoNum type="arabicPeriod"/>
+              <a:buFont typeface="Arial" panose="020B0604020202020204" pitchFamily="34" charset="0"/>
+              <a:buChar char="•"/>
             </a:pPr>
             <a:r>
               <a:rPr lang="en-US" altLang="zh-CN" sz="1400" dirty="0" smtClean="0">
@@ -9550,7 +9565,8 @@
           </a:p>
           <a:p>
             <a:pPr marL="342900" indent="-342900">
-              <a:buAutoNum type="arabicPeriod"/>
+              <a:buFont typeface="Arial" panose="020B0604020202020204" pitchFamily="34" charset="0"/>
+              <a:buChar char="•"/>
             </a:pPr>
             <a:r>
               <a:rPr lang="en-US" altLang="zh-CN" sz="1400" dirty="0" smtClean="0">
@@ -9579,7 +9595,7 @@
           </a:p>
           <a:p>
             <a:r>
-              <a:rPr lang="en-US" altLang="zh-CN" sz="1400" dirty="0">
+              <a:rPr lang="en-US" altLang="zh-CN" sz="1200" dirty="0">
                 <a:solidFill>
                   <a:srgbClr val="002060"/>
                 </a:solidFill>
@@ -9590,17 +9606,28 @@
               <a:t>	</a:t>
             </a:r>
             <a:r>
-              <a:rPr lang="en-US" altLang="zh-CN" sz="1400" dirty="0" smtClean="0">
+              <a:rPr lang="en-US" altLang="zh-CN" sz="1200" dirty="0" smtClean="0">
                 <a:solidFill>
                   <a:srgbClr val="002060"/>
                 </a:solidFill>
                 <a:effectLst/>
                 <a:latin typeface="+mn-ea"/>
+                <a:ea typeface="+mn-ea"/>
+              </a:rPr>
+              <a:t>- </a:t>
+            </a:r>
+            <a:r>
+              <a:rPr lang="en-US" altLang="zh-CN" sz="1200" dirty="0" smtClean="0">
+                <a:solidFill>
+                  <a:srgbClr val="002060"/>
+                </a:solidFill>
+                <a:effectLst/>
+                <a:latin typeface="+mn-ea"/>
               </a:rPr>
               <a:t>Factory </a:t>
             </a:r>
             <a:r>
-              <a:rPr lang="en-US" altLang="zh-CN" sz="1400" dirty="0">
+              <a:rPr lang="en-US" altLang="zh-CN" sz="1200" dirty="0">
                 <a:solidFill>
                   <a:srgbClr val="002060"/>
                 </a:solidFill>
@@ -9609,7 +9636,7 @@
               </a:rPr>
               <a:t>Method </a:t>
             </a:r>
-            <a:endParaRPr lang="en-US" altLang="zh-CN" sz="1400" dirty="0" smtClean="0">
+            <a:endParaRPr lang="en-US" altLang="zh-CN" sz="1200" dirty="0" smtClean="0">
               <a:solidFill>
                 <a:srgbClr val="002060"/>
               </a:solidFill>
@@ -9618,6 +9645,101 @@
             </a:endParaRPr>
           </a:p>
           <a:p>
+            <a:endParaRPr lang="en-US" altLang="zh-CN" sz="1200" dirty="0">
+              <a:solidFill>
+                <a:srgbClr val="002060"/>
+              </a:solidFill>
+              <a:effectLst/>
+              <a:latin typeface="+mn-ea"/>
+            </a:endParaRPr>
+          </a:p>
+          <a:p>
+            <a:r>
+              <a:rPr lang="en-US" altLang="zh-CN" sz="1200" dirty="0" smtClean="0">
+                <a:solidFill>
+                  <a:srgbClr val="002060"/>
+                </a:solidFill>
+                <a:effectLst/>
+                <a:latin typeface="+mn-ea"/>
+              </a:rPr>
+              <a:t>	</a:t>
+            </a:r>
+            <a:r>
+              <a:rPr lang="en-US" altLang="zh-CN" sz="1200" dirty="0" smtClean="0">
+                <a:solidFill>
+                  <a:srgbClr val="002060"/>
+                </a:solidFill>
+                <a:effectLst/>
+                <a:latin typeface="+mn-ea"/>
+              </a:rPr>
+              <a:t>- </a:t>
+            </a:r>
+            <a:r>
+              <a:rPr lang="en-US" altLang="zh-CN" sz="1200" dirty="0" smtClean="0">
+                <a:solidFill>
+                  <a:srgbClr val="002060"/>
+                </a:solidFill>
+                <a:effectLst/>
+                <a:latin typeface="+mn-ea"/>
+              </a:rPr>
+              <a:t>Simple </a:t>
+            </a:r>
+            <a:r>
+              <a:rPr lang="en-US" altLang="zh-CN" sz="1200" dirty="0" smtClean="0">
+                <a:solidFill>
+                  <a:srgbClr val="002060"/>
+                </a:solidFill>
+                <a:effectLst/>
+                <a:latin typeface="+mn-ea"/>
+              </a:rPr>
+              <a:t>Factory</a:t>
+            </a:r>
+          </a:p>
+          <a:p>
+            <a:endParaRPr lang="en-US" altLang="zh-CN" sz="1200" dirty="0">
+              <a:solidFill>
+                <a:srgbClr val="002060"/>
+              </a:solidFill>
+              <a:effectLst/>
+              <a:latin typeface="+mn-ea"/>
+            </a:endParaRPr>
+          </a:p>
+          <a:p>
+            <a:r>
+              <a:rPr lang="en-US" altLang="zh-CN" sz="1200" dirty="0" smtClean="0">
+                <a:solidFill>
+                  <a:srgbClr val="002060"/>
+                </a:solidFill>
+                <a:effectLst/>
+                <a:latin typeface="+mn-ea"/>
+              </a:rPr>
+              <a:t>	</a:t>
+            </a:r>
+            <a:r>
+              <a:rPr lang="en-US" altLang="zh-CN" sz="1200" dirty="0" smtClean="0">
+                <a:solidFill>
+                  <a:srgbClr val="002060"/>
+                </a:solidFill>
+                <a:effectLst/>
+                <a:latin typeface="+mn-ea"/>
+              </a:rPr>
+              <a:t>- </a:t>
+            </a:r>
+            <a:r>
+              <a:rPr lang="en-US" altLang="zh-CN" sz="1200" dirty="0" smtClean="0">
+                <a:solidFill>
+                  <a:srgbClr val="002060"/>
+                </a:solidFill>
+                <a:effectLst/>
+                <a:latin typeface="+mn-ea"/>
+              </a:rPr>
+              <a:t>Abstract Factory</a:t>
+            </a:r>
+          </a:p>
+          <a:p>
+            <a:pPr marL="342900" indent="-342900">
+              <a:buAutoNum type="arabicPeriod"/>
+            </a:pPr>
             <a:endParaRPr lang="en-US" altLang="zh-CN" sz="1400" dirty="0">
               <a:solidFill>
                 <a:srgbClr val="002060"/>
@@ -9627,6 +9749,10 @@
             </a:endParaRPr>
           </a:p>
           <a:p>
+            <a:pPr marL="342900" indent="-342900">
+              <a:buFont typeface="Arial" panose="020B0604020202020204" pitchFamily="34" charset="0"/>
+              <a:buChar char="•"/>
+            </a:pPr>
             <a:r>
               <a:rPr lang="en-US" altLang="zh-CN" sz="1400" dirty="0" smtClean="0">
                 <a:solidFill>
@@ -9635,39 +9761,8 @@
                 <a:effectLst/>
                 <a:latin typeface="+mn-ea"/>
               </a:rPr>
-              <a:t>	Simple Factory</a:t>
-            </a:r>
-          </a:p>
-          <a:p>
-            <a:endParaRPr lang="en-US" altLang="zh-CN" sz="1400" dirty="0">
-              <a:solidFill>
-                <a:srgbClr val="002060"/>
-              </a:solidFill>
-              <a:effectLst/>
-              <a:latin typeface="+mn-ea"/>
-            </a:endParaRPr>
-          </a:p>
-          <a:p>
-            <a:r>
-              <a:rPr lang="en-US" altLang="zh-CN" sz="1400" dirty="0" smtClean="0">
-                <a:solidFill>
-                  <a:srgbClr val="002060"/>
-                </a:solidFill>
-                <a:effectLst/>
-                <a:latin typeface="+mn-ea"/>
-              </a:rPr>
-              <a:t>	Abstract Factory</a:t>
-            </a:r>
-            <a:endParaRPr lang="en-US" altLang="zh-CN" sz="1400" dirty="0">
-              <a:solidFill>
-                <a:srgbClr val="002060"/>
-              </a:solidFill>
-              <a:effectLst/>
-              <a:latin typeface="+mn-ea"/>
-              <a:ea typeface="+mn-ea"/>
-            </a:endParaRPr>
-          </a:p>
-          <a:p>
+              <a:t>Difference</a:t>
+            </a:r>
             <a:endParaRPr lang="zh-CN" altLang="en-US" sz="1400" dirty="0">
               <a:solidFill>
                 <a:srgbClr val="002060"/>
@@ -11828,7 +11923,16 @@
                 </a:solidFill>
                 <a:effectLst/>
               </a:rPr>
-              <a:t>一</a:t>
+              <a:t>一个系列</a:t>
+            </a:r>
+            <a:r>
+              <a:rPr lang="en-US" altLang="zh-CN" sz="1900" dirty="0" smtClean="0">
+                <a:solidFill>
+                  <a:srgbClr val="FF0000"/>
+                </a:solidFill>
+                <a:effectLst/>
+              </a:rPr>
+              <a:t>/</a:t>
             </a:r>
             <a:r>
               <a:rPr lang="zh-CN" altLang="en-US" sz="1900" dirty="0" smtClean="0">
@@ -11837,34 +11941,7 @@
                 </a:solidFill>
                 <a:effectLst/>
               </a:rPr>
-              <a:t>个系列</a:t>
-            </a:r>
-            <a:r>
-              <a:rPr lang="en-US" altLang="zh-CN" sz="1900" dirty="0" smtClean="0">
-                <a:solidFill>
-                  <a:srgbClr val="FF0000"/>
-                </a:solidFill>
-                <a:effectLst/>
-              </a:rPr>
-              <a:t>/</a:t>
-            </a:r>
-            <a:r>
-              <a:rPr lang="zh-CN" altLang="en-US" sz="1900" dirty="0" smtClean="0">
-                <a:solidFill>
-                  <a:srgbClr val="FF0000"/>
-                </a:solidFill>
-                <a:effectLst/>
-              </a:rPr>
-              <a:t>产品</a:t>
-            </a:r>
-            <a:r>
-              <a:rPr lang="zh-CN" altLang="en-US" sz="1900" dirty="0" smtClean="0">
-                <a:solidFill>
-                  <a:srgbClr val="FF0000"/>
-                </a:solidFill>
-                <a:effectLst/>
-              </a:rPr>
-              <a:t>族</a:t>
+              <a:t>产品族</a:t>
             </a:r>
             <a:r>
               <a:rPr lang="zh-CN" altLang="en-US" sz="1900" dirty="0" smtClean="0">
@@ -12142,16 +12219,7 @@
                 </a:solidFill>
                 <a:effectLst/>
               </a:rPr>
-              <a:t>提供一系列一致的产品生产</a:t>
-            </a:r>
-            <a:r>
-              <a:rPr lang="zh-CN" altLang="en-US" sz="1900" dirty="0" smtClean="0">
-                <a:solidFill>
-                  <a:srgbClr val="FF0000"/>
-                </a:solidFill>
-                <a:effectLst/>
-              </a:rPr>
-              <a:t>接口：抽象工厂</a:t>
+              <a:t>提供一系列一致的产品生产接口：抽象工厂</a:t>
             </a:r>
             <a:r>
               <a:rPr lang="zh-CN" altLang="en-US" sz="1900" dirty="0" smtClean="0">
@@ -13254,50 +13322,8 @@
                 <a:ea typeface="+mj-ea"/>
                 <a:cs typeface="+mj-cs"/>
               </a:rPr>
-              <a:t>Future: 	</a:t>
-            </a:r>
-            <a:r>
-              <a:rPr lang="en-US" sz="1600" b="1" spc="50" dirty="0">
-                <a:ln w="12700">
-                  <a:noFill/>
-                  <a:prstDash val="solid"/>
-                </a:ln>
-                <a:solidFill>
-                  <a:schemeClr val="accent4"/>
-                </a:solidFill>
-                <a:latin typeface="+mj-lt"/>
-                <a:ea typeface="+mj-ea"/>
-                <a:cs typeface="+mj-cs"/>
-              </a:rPr>
-              <a:t>GoogleFamilyFactoryV1</a:t>
-            </a:r>
-            <a:r>
-              <a:rPr lang="en-US" sz="1600" b="1" spc="50" dirty="0">
-                <a:ln w="12700">
-                  <a:noFill/>
-                  <a:prstDash val="solid"/>
-                </a:ln>
-                <a:solidFill>
-                  <a:schemeClr val="accent4"/>
-                </a:solidFill>
-                <a:latin typeface="+mj-lt"/>
-                <a:ea typeface="+mj-ea"/>
-                <a:cs typeface="+mj-cs"/>
-              </a:rPr>
-              <a:t>?</a:t>
-            </a:r>
-            <a:endParaRPr lang="en-US" sz="1600" b="1" spc="50" dirty="0">
-              <a:ln w="12700">
-                <a:noFill/>
-                <a:prstDash val="solid"/>
-              </a:ln>
-              <a:solidFill>
-                <a:schemeClr val="accent4"/>
-              </a:solidFill>
-              <a:latin typeface="+mj-lt"/>
-              <a:ea typeface="+mj-ea"/>
-              <a:cs typeface="+mj-cs"/>
-            </a:endParaRPr>
+              <a:t>Future: 	GoogleFamilyFactoryV1?</a:t>
+            </a:r>
           </a:p>
         </p:txBody>
       </p:sp>
@@ -15848,7 +15874,15 @@
                   <a:schemeClr val="accent4"/>
                 </a:solidFill>
               </a:rPr>
-              <a:t>简单的</a:t>
+              <a:t>简单的工厂</a:t>
+            </a:r>
+            <a:r>
+              <a:rPr lang="zh-CN" altLang="en-US" sz="1400" dirty="0">
+                <a:solidFill>
+                  <a:schemeClr val="accent4"/>
+                </a:solidFill>
+              </a:rPr>
+              <a:t>，</a:t>
             </a:r>
             <a:r>
               <a:rPr lang="zh-CN" altLang="en-US" sz="1400" dirty="0" smtClean="0">
@@ -15856,31 +15890,7 @@
                   <a:schemeClr val="accent4"/>
                 </a:solidFill>
               </a:rPr>
-              <a:t>工厂</a:t>
-            </a:r>
-            <a:r>
-              <a:rPr lang="zh-CN" altLang="en-US" sz="1400" dirty="0">
-                <a:solidFill>
-                  <a:schemeClr val="accent4"/>
-                </a:solidFill>
-              </a:rPr>
-              <a:t>，</a:t>
-            </a:r>
-            <a:r>
-              <a:rPr lang="zh-CN" altLang="en-US" sz="1400" dirty="0" smtClean="0">
-                <a:solidFill>
-                  <a:schemeClr val="accent4"/>
-                </a:solidFill>
-              </a:rPr>
-              <a:t>提供</a:t>
-            </a:r>
-            <a:r>
-              <a:rPr lang="zh-CN" altLang="en-US" sz="1400" dirty="0" smtClean="0">
-                <a:solidFill>
-                  <a:schemeClr val="accent4"/>
-                </a:solidFill>
-              </a:rPr>
-              <a:t>一个创建对象的简单方法</a:t>
+              <a:t>提供一个创建对象的简单方法</a:t>
             </a:r>
             <a:endParaRPr lang="en-US" altLang="zh-CN" sz="1400" dirty="0" smtClean="0">
               <a:solidFill>
@@ -16323,23 +16333,7 @@
                   <a:schemeClr val="accent4"/>
                 </a:solidFill>
               </a:rPr>
-              <a:t>           </a:t>
-            </a:r>
-            <a:r>
-              <a:rPr lang="zh-CN" altLang="en-US" sz="1400" dirty="0" smtClean="0">
-                <a:solidFill>
-                  <a:schemeClr val="accent4"/>
-                </a:solidFill>
-              </a:rPr>
-              <a:t>     重点</a:t>
-            </a:r>
-            <a:r>
-              <a:rPr lang="zh-CN" altLang="en-US" sz="1400" dirty="0" smtClean="0">
-                <a:solidFill>
-                  <a:schemeClr val="accent4"/>
-                </a:solidFill>
-              </a:rPr>
-              <a:t>在于提供创建</a:t>
+              <a:t>                重点在于提供创建</a:t>
             </a:r>
             <a:r>
               <a:rPr lang="zh-CN" altLang="en-US" sz="1400" dirty="0">

</xml_diff>